<commit_message>
added output size for transposed conv
</commit_message>
<xml_diff>
--- a/Slides_7.pptx
+++ b/Slides_7.pptx
@@ -4,11 +4,15 @@
   <p:sldMasterIdLst>
     <p:sldMasterId id="2147483648" r:id="rId1"/>
   </p:sldMasterIdLst>
+  <p:notesMasterIdLst>
+    <p:notesMasterId r:id="rId7"/>
+  </p:notesMasterIdLst>
   <p:sldIdLst>
     <p:sldId id="257" r:id="rId2"/>
     <p:sldId id="258" r:id="rId3"/>
     <p:sldId id="259" r:id="rId4"/>
     <p:sldId id="260" r:id="rId5"/>
+    <p:sldId id="281" r:id="rId6"/>
   </p:sldIdLst>
   <p:sldSz cx="12192000" cy="6858000"/>
   <p:notesSz cx="6858000" cy="9144000"/>
@@ -108,6 +112,439 @@
     </a:lvl9pPr>
   </p:defaultTextStyle>
 </p:presentation>
+</file>
+
+<file path=ppt/notesMasters/notesMaster1.xml><?xml version="1.0" encoding="utf-8"?>
+<p:notesMaster xmlns:a="http://schemas.openxmlformats.org/drawingml/2006/main" xmlns:r="http://schemas.openxmlformats.org/officeDocument/2006/relationships" xmlns:p="http://schemas.openxmlformats.org/presentationml/2006/main">
+  <p:cSld>
+    <p:bg>
+      <p:bgRef idx="1001">
+        <a:schemeClr val="bg1"/>
+      </p:bgRef>
+    </p:bg>
+    <p:spTree>
+      <p:nvGrpSpPr>
+        <p:cNvPr id="1" name=""/>
+        <p:cNvGrpSpPr/>
+        <p:nvPr/>
+      </p:nvGrpSpPr>
+      <p:grpSpPr>
+        <a:xfrm>
+          <a:off x="0" y="0"/>
+          <a:ext cx="0" cy="0"/>
+          <a:chOff x="0" y="0"/>
+          <a:chExt cx="0" cy="0"/>
+        </a:xfrm>
+      </p:grpSpPr>
+      <p:sp>
+        <p:nvSpPr>
+          <p:cNvPr id="2" name="Header Placeholder 1"/>
+          <p:cNvSpPr>
+            <a:spLocks noGrp="1"/>
+          </p:cNvSpPr>
+          <p:nvPr>
+            <p:ph type="hdr" sz="quarter"/>
+          </p:nvPr>
+        </p:nvSpPr>
+        <p:spPr>
+          <a:xfrm>
+            <a:off x="0" y="0"/>
+            <a:ext cx="2971800" cy="458788"/>
+          </a:xfrm>
+          <a:prstGeom prst="rect">
+            <a:avLst/>
+          </a:prstGeom>
+        </p:spPr>
+        <p:txBody>
+          <a:bodyPr vert="horz" lIns="91440" tIns="45720" rIns="91440" bIns="45720" rtlCol="0"/>
+          <a:lstStyle>
+            <a:lvl1pPr algn="l">
+              <a:defRPr sz="1200"/>
+            </a:lvl1pPr>
+          </a:lstStyle>
+          <a:p>
+            <a:endParaRPr lang="en-US"/>
+          </a:p>
+        </p:txBody>
+      </p:sp>
+      <p:sp>
+        <p:nvSpPr>
+          <p:cNvPr id="3" name="Date Placeholder 2"/>
+          <p:cNvSpPr>
+            <a:spLocks noGrp="1"/>
+          </p:cNvSpPr>
+          <p:nvPr>
+            <p:ph type="dt" idx="1"/>
+          </p:nvPr>
+        </p:nvSpPr>
+        <p:spPr>
+          <a:xfrm>
+            <a:off x="3884613" y="0"/>
+            <a:ext cx="2971800" cy="458788"/>
+          </a:xfrm>
+          <a:prstGeom prst="rect">
+            <a:avLst/>
+          </a:prstGeom>
+        </p:spPr>
+        <p:txBody>
+          <a:bodyPr vert="horz" lIns="91440" tIns="45720" rIns="91440" bIns="45720" rtlCol="0"/>
+          <a:lstStyle>
+            <a:lvl1pPr algn="r">
+              <a:defRPr sz="1200"/>
+            </a:lvl1pPr>
+          </a:lstStyle>
+          <a:p>
+            <a:fld id="{4732C3A8-66EE-470D-A85F-35A0229A4BF4}" type="datetimeFigureOut">
+              <a:rPr lang="en-US" smtClean="0"/>
+              <a:t>2/1/2023</a:t>
+            </a:fld>
+            <a:endParaRPr lang="en-US"/>
+          </a:p>
+        </p:txBody>
+      </p:sp>
+      <p:sp>
+        <p:nvSpPr>
+          <p:cNvPr id="4" name="Slide Image Placeholder 3"/>
+          <p:cNvSpPr>
+            <a:spLocks noGrp="1" noRot="1" noChangeAspect="1"/>
+          </p:cNvSpPr>
+          <p:nvPr>
+            <p:ph type="sldImg" idx="2"/>
+          </p:nvPr>
+        </p:nvSpPr>
+        <p:spPr>
+          <a:xfrm>
+            <a:off x="685800" y="1143000"/>
+            <a:ext cx="5486400" cy="3086100"/>
+          </a:xfrm>
+          <a:prstGeom prst="rect">
+            <a:avLst/>
+          </a:prstGeom>
+          <a:noFill/>
+          <a:ln w="12700">
+            <a:solidFill>
+              <a:prstClr val="black"/>
+            </a:solidFill>
+          </a:ln>
+        </p:spPr>
+        <p:txBody>
+          <a:bodyPr vert="horz" lIns="91440" tIns="45720" rIns="91440" bIns="45720" rtlCol="0" anchor="ctr"/>
+          <a:lstStyle/>
+          <a:p>
+            <a:endParaRPr lang="en-US"/>
+          </a:p>
+        </p:txBody>
+      </p:sp>
+      <p:sp>
+        <p:nvSpPr>
+          <p:cNvPr id="5" name="Notes Placeholder 4"/>
+          <p:cNvSpPr>
+            <a:spLocks noGrp="1"/>
+          </p:cNvSpPr>
+          <p:nvPr>
+            <p:ph type="body" sz="quarter" idx="3"/>
+          </p:nvPr>
+        </p:nvSpPr>
+        <p:spPr>
+          <a:xfrm>
+            <a:off x="685800" y="4400550"/>
+            <a:ext cx="5486400" cy="3600450"/>
+          </a:xfrm>
+          <a:prstGeom prst="rect">
+            <a:avLst/>
+          </a:prstGeom>
+        </p:spPr>
+        <p:txBody>
+          <a:bodyPr vert="horz" lIns="91440" tIns="45720" rIns="91440" bIns="45720" rtlCol="0"/>
+          <a:lstStyle/>
+          <a:p>
+            <a:pPr lvl="0"/>
+            <a:r>
+              <a:rPr lang="en-US"/>
+              <a:t>Click to edit Master text styles</a:t>
+            </a:r>
+          </a:p>
+          <a:p>
+            <a:pPr lvl="1"/>
+            <a:r>
+              <a:rPr lang="en-US"/>
+              <a:t>Second level</a:t>
+            </a:r>
+          </a:p>
+          <a:p>
+            <a:pPr lvl="2"/>
+            <a:r>
+              <a:rPr lang="en-US"/>
+              <a:t>Third level</a:t>
+            </a:r>
+          </a:p>
+          <a:p>
+            <a:pPr lvl="3"/>
+            <a:r>
+              <a:rPr lang="en-US"/>
+              <a:t>Fourth level</a:t>
+            </a:r>
+          </a:p>
+          <a:p>
+            <a:pPr lvl="4"/>
+            <a:r>
+              <a:rPr lang="en-US"/>
+              <a:t>Fifth level</a:t>
+            </a:r>
+          </a:p>
+        </p:txBody>
+      </p:sp>
+      <p:sp>
+        <p:nvSpPr>
+          <p:cNvPr id="6" name="Footer Placeholder 5"/>
+          <p:cNvSpPr>
+            <a:spLocks noGrp="1"/>
+          </p:cNvSpPr>
+          <p:nvPr>
+            <p:ph type="ftr" sz="quarter" idx="4"/>
+          </p:nvPr>
+        </p:nvSpPr>
+        <p:spPr>
+          <a:xfrm>
+            <a:off x="0" y="8685213"/>
+            <a:ext cx="2971800" cy="458787"/>
+          </a:xfrm>
+          <a:prstGeom prst="rect">
+            <a:avLst/>
+          </a:prstGeom>
+        </p:spPr>
+        <p:txBody>
+          <a:bodyPr vert="horz" lIns="91440" tIns="45720" rIns="91440" bIns="45720" rtlCol="0" anchor="b"/>
+          <a:lstStyle>
+            <a:lvl1pPr algn="l">
+              <a:defRPr sz="1200"/>
+            </a:lvl1pPr>
+          </a:lstStyle>
+          <a:p>
+            <a:endParaRPr lang="en-US"/>
+          </a:p>
+        </p:txBody>
+      </p:sp>
+      <p:sp>
+        <p:nvSpPr>
+          <p:cNvPr id="7" name="Slide Number Placeholder 6"/>
+          <p:cNvSpPr>
+            <a:spLocks noGrp="1"/>
+          </p:cNvSpPr>
+          <p:nvPr>
+            <p:ph type="sldNum" sz="quarter" idx="5"/>
+          </p:nvPr>
+        </p:nvSpPr>
+        <p:spPr>
+          <a:xfrm>
+            <a:off x="3884613" y="8685213"/>
+            <a:ext cx="2971800" cy="458787"/>
+          </a:xfrm>
+          <a:prstGeom prst="rect">
+            <a:avLst/>
+          </a:prstGeom>
+        </p:spPr>
+        <p:txBody>
+          <a:bodyPr vert="horz" lIns="91440" tIns="45720" rIns="91440" bIns="45720" rtlCol="0" anchor="b"/>
+          <a:lstStyle>
+            <a:lvl1pPr algn="r">
+              <a:defRPr sz="1200"/>
+            </a:lvl1pPr>
+          </a:lstStyle>
+          <a:p>
+            <a:fld id="{AEB5A21D-F6DA-425F-9DBE-C9D0FC3A7ACA}" type="slidenum">
+              <a:rPr lang="en-US" smtClean="0"/>
+              <a:t>‹#›</a:t>
+            </a:fld>
+            <a:endParaRPr lang="en-US"/>
+          </a:p>
+        </p:txBody>
+      </p:sp>
+    </p:spTree>
+    <p:extLst>
+      <p:ext uri="{BB962C8B-B14F-4D97-AF65-F5344CB8AC3E}">
+        <p14:creationId xmlns:p14="http://schemas.microsoft.com/office/powerpoint/2010/main" val="1005245888"/>
+      </p:ext>
+    </p:extLst>
+  </p:cSld>
+  <p:clrMap bg1="lt1" tx1="dk1" bg2="lt2" tx2="dk2" accent1="accent1" accent2="accent2" accent3="accent3" accent4="accent4" accent5="accent5" accent6="accent6" hlink="hlink" folHlink="folHlink"/>
+  <p:notesStyle>
+    <a:lvl1pPr marL="0" algn="l" defTabSz="914400" rtl="0" eaLnBrk="1" latinLnBrk="0" hangingPunct="1">
+      <a:defRPr sz="1200" kern="1200">
+        <a:solidFill>
+          <a:schemeClr val="tx1"/>
+        </a:solidFill>
+        <a:latin typeface="+mn-lt"/>
+        <a:ea typeface="+mn-ea"/>
+        <a:cs typeface="+mn-cs"/>
+      </a:defRPr>
+    </a:lvl1pPr>
+    <a:lvl2pPr marL="457200" algn="l" defTabSz="914400" rtl="0" eaLnBrk="1" latinLnBrk="0" hangingPunct="1">
+      <a:defRPr sz="1200" kern="1200">
+        <a:solidFill>
+          <a:schemeClr val="tx1"/>
+        </a:solidFill>
+        <a:latin typeface="+mn-lt"/>
+        <a:ea typeface="+mn-ea"/>
+        <a:cs typeface="+mn-cs"/>
+      </a:defRPr>
+    </a:lvl2pPr>
+    <a:lvl3pPr marL="914400" algn="l" defTabSz="914400" rtl="0" eaLnBrk="1" latinLnBrk="0" hangingPunct="1">
+      <a:defRPr sz="1200" kern="1200">
+        <a:solidFill>
+          <a:schemeClr val="tx1"/>
+        </a:solidFill>
+        <a:latin typeface="+mn-lt"/>
+        <a:ea typeface="+mn-ea"/>
+        <a:cs typeface="+mn-cs"/>
+      </a:defRPr>
+    </a:lvl3pPr>
+    <a:lvl4pPr marL="1371600" algn="l" defTabSz="914400" rtl="0" eaLnBrk="1" latinLnBrk="0" hangingPunct="1">
+      <a:defRPr sz="1200" kern="1200">
+        <a:solidFill>
+          <a:schemeClr val="tx1"/>
+        </a:solidFill>
+        <a:latin typeface="+mn-lt"/>
+        <a:ea typeface="+mn-ea"/>
+        <a:cs typeface="+mn-cs"/>
+      </a:defRPr>
+    </a:lvl4pPr>
+    <a:lvl5pPr marL="1828800" algn="l" defTabSz="914400" rtl="0" eaLnBrk="1" latinLnBrk="0" hangingPunct="1">
+      <a:defRPr sz="1200" kern="1200">
+        <a:solidFill>
+          <a:schemeClr val="tx1"/>
+        </a:solidFill>
+        <a:latin typeface="+mn-lt"/>
+        <a:ea typeface="+mn-ea"/>
+        <a:cs typeface="+mn-cs"/>
+      </a:defRPr>
+    </a:lvl5pPr>
+    <a:lvl6pPr marL="2286000" algn="l" defTabSz="914400" rtl="0" eaLnBrk="1" latinLnBrk="0" hangingPunct="1">
+      <a:defRPr sz="1200" kern="1200">
+        <a:solidFill>
+          <a:schemeClr val="tx1"/>
+        </a:solidFill>
+        <a:latin typeface="+mn-lt"/>
+        <a:ea typeface="+mn-ea"/>
+        <a:cs typeface="+mn-cs"/>
+      </a:defRPr>
+    </a:lvl6pPr>
+    <a:lvl7pPr marL="2743200" algn="l" defTabSz="914400" rtl="0" eaLnBrk="1" latinLnBrk="0" hangingPunct="1">
+      <a:defRPr sz="1200" kern="1200">
+        <a:solidFill>
+          <a:schemeClr val="tx1"/>
+        </a:solidFill>
+        <a:latin typeface="+mn-lt"/>
+        <a:ea typeface="+mn-ea"/>
+        <a:cs typeface="+mn-cs"/>
+      </a:defRPr>
+    </a:lvl7pPr>
+    <a:lvl8pPr marL="3200400" algn="l" defTabSz="914400" rtl="0" eaLnBrk="1" latinLnBrk="0" hangingPunct="1">
+      <a:defRPr sz="1200" kern="1200">
+        <a:solidFill>
+          <a:schemeClr val="tx1"/>
+        </a:solidFill>
+        <a:latin typeface="+mn-lt"/>
+        <a:ea typeface="+mn-ea"/>
+        <a:cs typeface="+mn-cs"/>
+      </a:defRPr>
+    </a:lvl8pPr>
+    <a:lvl9pPr marL="3657600" algn="l" defTabSz="914400" rtl="0" eaLnBrk="1" latinLnBrk="0" hangingPunct="1">
+      <a:defRPr sz="1200" kern="1200">
+        <a:solidFill>
+          <a:schemeClr val="tx1"/>
+        </a:solidFill>
+        <a:latin typeface="+mn-lt"/>
+        <a:ea typeface="+mn-ea"/>
+        <a:cs typeface="+mn-cs"/>
+      </a:defRPr>
+    </a:lvl9pPr>
+  </p:notesStyle>
+</p:notesMaster>
+</file>
+
+<file path=ppt/notesSlides/notesSlide1.xml><?xml version="1.0" encoding="utf-8"?>
+<p:notes xmlns:a="http://schemas.openxmlformats.org/drawingml/2006/main" xmlns:r="http://schemas.openxmlformats.org/officeDocument/2006/relationships" xmlns:p="http://schemas.openxmlformats.org/presentationml/2006/main">
+  <p:cSld>
+    <p:spTree>
+      <p:nvGrpSpPr>
+        <p:cNvPr id="1" name=""/>
+        <p:cNvGrpSpPr/>
+        <p:nvPr/>
+      </p:nvGrpSpPr>
+      <p:grpSpPr>
+        <a:xfrm>
+          <a:off x="0" y="0"/>
+          <a:ext cx="0" cy="0"/>
+          <a:chOff x="0" y="0"/>
+          <a:chExt cx="0" cy="0"/>
+        </a:xfrm>
+      </p:grpSpPr>
+      <p:sp>
+        <p:nvSpPr>
+          <p:cNvPr id="2" name="Slide Image Placeholder 1"/>
+          <p:cNvSpPr>
+            <a:spLocks noGrp="1" noRot="1" noChangeAspect="1"/>
+          </p:cNvSpPr>
+          <p:nvPr>
+            <p:ph type="sldImg"/>
+          </p:nvPr>
+        </p:nvSpPr>
+        <p:spPr/>
+      </p:sp>
+      <p:sp>
+        <p:nvSpPr>
+          <p:cNvPr id="3" name="Notes Placeholder 2"/>
+          <p:cNvSpPr>
+            <a:spLocks noGrp="1"/>
+          </p:cNvSpPr>
+          <p:nvPr>
+            <p:ph type="body" idx="1"/>
+          </p:nvPr>
+        </p:nvSpPr>
+        <p:spPr/>
+        <p:txBody>
+          <a:bodyPr/>
+          <a:lstStyle/>
+          <a:p>
+            <a:endParaRPr lang="en-US" dirty="0"/>
+          </a:p>
+        </p:txBody>
+      </p:sp>
+      <p:sp>
+        <p:nvSpPr>
+          <p:cNvPr id="4" name="Slide Number Placeholder 3"/>
+          <p:cNvSpPr>
+            <a:spLocks noGrp="1"/>
+          </p:cNvSpPr>
+          <p:nvPr>
+            <p:ph type="sldNum" sz="quarter" idx="5"/>
+          </p:nvPr>
+        </p:nvSpPr>
+        <p:spPr/>
+        <p:txBody>
+          <a:bodyPr/>
+          <a:lstStyle/>
+          <a:p>
+            <a:fld id="{EF847D23-764C-4404-9D36-DEB150D4E174}" type="slidenum">
+              <a:rPr lang="en-US" smtClean="0"/>
+              <a:t>5</a:t>
+            </a:fld>
+            <a:endParaRPr lang="en-US"/>
+          </a:p>
+        </p:txBody>
+      </p:sp>
+    </p:spTree>
+    <p:extLst>
+      <p:ext uri="{BB962C8B-B14F-4D97-AF65-F5344CB8AC3E}">
+        <p14:creationId xmlns:p14="http://schemas.microsoft.com/office/powerpoint/2010/main" val="4160032639"/>
+      </p:ext>
+    </p:extLst>
+  </p:cSld>
+  <p:clrMapOvr>
+    <a:masterClrMapping/>
+  </p:clrMapOvr>
+</p:notes>
 </file>
 
 <file path=ppt/slideLayouts/slideLayout1.xml><?xml version="1.0" encoding="utf-8"?>
@@ -4342,6 +4779,1046 @@
 </p:sld>
 </file>
 
+<file path=ppt/slides/slide5.xml><?xml version="1.0" encoding="utf-8"?>
+<p:sld xmlns:a="http://schemas.openxmlformats.org/drawingml/2006/main" xmlns:r="http://schemas.openxmlformats.org/officeDocument/2006/relationships" xmlns:p="http://schemas.openxmlformats.org/presentationml/2006/main">
+  <p:cSld>
+    <p:spTree>
+      <p:nvGrpSpPr>
+        <p:cNvPr id="1" name=""/>
+        <p:cNvGrpSpPr/>
+        <p:nvPr/>
+      </p:nvGrpSpPr>
+      <p:grpSpPr>
+        <a:xfrm>
+          <a:off x="0" y="0"/>
+          <a:ext cx="0" cy="0"/>
+          <a:chOff x="0" y="0"/>
+          <a:chExt cx="0" cy="0"/>
+        </a:xfrm>
+      </p:grpSpPr>
+      <p:sp>
+        <p:nvSpPr>
+          <p:cNvPr id="2" name="Title 1">
+            <a:extLst>
+              <a:ext uri="{FF2B5EF4-FFF2-40B4-BE49-F238E27FC236}">
+                <a16:creationId xmlns:a16="http://schemas.microsoft.com/office/drawing/2014/main" id="{327BA092-8276-1750-487C-FD6B2148AEA0}"/>
+              </a:ext>
+            </a:extLst>
+          </p:cNvPr>
+          <p:cNvSpPr>
+            <a:spLocks noGrp="1"/>
+          </p:cNvSpPr>
+          <p:nvPr>
+            <p:ph type="title"/>
+          </p:nvPr>
+        </p:nvSpPr>
+        <p:spPr/>
+        <p:txBody>
+          <a:bodyPr/>
+          <a:lstStyle/>
+          <a:p>
+            <a:r>
+              <a:rPr lang="en-US" dirty="0"/>
+              <a:t>Transposed Convolution </a:t>
+            </a:r>
+            <a:r>
+              <a:rPr lang="en-US"/>
+              <a:t>Output Size</a:t>
+            </a:r>
+            <a:endParaRPr lang="en-US" dirty="0"/>
+          </a:p>
+        </p:txBody>
+      </p:sp>
+      <mc:AlternateContent xmlns:mc="http://schemas.openxmlformats.org/markup-compatibility/2006">
+        <mc:Choice xmlns:a14="http://schemas.microsoft.com/office/drawing/2010/main" Requires="a14">
+          <p:sp>
+            <p:nvSpPr>
+              <p:cNvPr id="3" name="Content Placeholder 2">
+                <a:extLst>
+                  <a:ext uri="{FF2B5EF4-FFF2-40B4-BE49-F238E27FC236}">
+                    <a16:creationId xmlns:a16="http://schemas.microsoft.com/office/drawing/2014/main" id="{B4BCBD0E-EB29-6951-EAC5-9C7D4BCEDF4D}"/>
+                  </a:ext>
+                </a:extLst>
+              </p:cNvPr>
+              <p:cNvSpPr>
+                <a:spLocks noGrp="1"/>
+              </p:cNvSpPr>
+              <p:nvPr>
+                <p:ph idx="1"/>
+              </p:nvPr>
+            </p:nvSpPr>
+            <p:spPr/>
+            <p:txBody>
+              <a:bodyPr>
+                <a:normAutofit/>
+              </a:bodyPr>
+              <a:lstStyle/>
+              <a:p>
+                <a:pPr marL="0" indent="0" algn="ctr">
+                  <a:buNone/>
+                </a:pPr>
+                <a:r>
+                  <a:rPr lang="en-US" dirty="0"/>
+                  <a:t>Kernel: 	</a:t>
+                </a:r>
+                <a14:m>
+                  <m:oMath xmlns:m="http://schemas.openxmlformats.org/officeDocument/2006/math">
+                    <m:sSub>
+                      <m:sSubPr>
+                        <m:ctrlPr>
+                          <a:rPr lang="en-US" b="0" i="1" smtClean="0">
+                            <a:latin typeface="Cambria Math" panose="02040503050406030204" pitchFamily="18" charset="0"/>
+                          </a:rPr>
+                        </m:ctrlPr>
+                      </m:sSubPr>
+                      <m:e>
+                        <m:r>
+                          <a:rPr lang="en-US" b="0" i="1" smtClean="0">
+                            <a:latin typeface="Cambria Math" panose="02040503050406030204" pitchFamily="18" charset="0"/>
+                          </a:rPr>
+                          <m:t>(</m:t>
+                        </m:r>
+                        <m:r>
+                          <a:rPr lang="en-US" i="1">
+                            <a:latin typeface="Cambria Math" panose="02040503050406030204" pitchFamily="18" charset="0"/>
+                          </a:rPr>
+                          <m:t>𝑘</m:t>
+                        </m:r>
+                      </m:e>
+                      <m:sub>
+                        <m:r>
+                          <a:rPr lang="en-US" b="0" i="1" smtClean="0">
+                            <a:latin typeface="Cambria Math" panose="02040503050406030204" pitchFamily="18" charset="0"/>
+                          </a:rPr>
+                          <m:t>1</m:t>
+                        </m:r>
+                      </m:sub>
+                    </m:sSub>
+                    <m:r>
+                      <a:rPr lang="en-US" b="0" i="1" smtClean="0">
+                        <a:latin typeface="Cambria Math" panose="02040503050406030204" pitchFamily="18" charset="0"/>
+                      </a:rPr>
+                      <m:t>, </m:t>
+                    </m:r>
+                    <m:sSub>
+                      <m:sSubPr>
+                        <m:ctrlPr>
+                          <a:rPr lang="en-US" b="0" i="1" smtClean="0">
+                            <a:latin typeface="Cambria Math" panose="02040503050406030204" pitchFamily="18" charset="0"/>
+                          </a:rPr>
+                        </m:ctrlPr>
+                      </m:sSubPr>
+                      <m:e>
+                        <m:r>
+                          <a:rPr lang="en-US" i="1">
+                            <a:latin typeface="Cambria Math" panose="02040503050406030204" pitchFamily="18" charset="0"/>
+                          </a:rPr>
+                          <m:t>𝑘</m:t>
+                        </m:r>
+                      </m:e>
+                      <m:sub>
+                        <m:r>
+                          <a:rPr lang="en-US" b="0" i="1" smtClean="0">
+                            <a:latin typeface="Cambria Math" panose="02040503050406030204" pitchFamily="18" charset="0"/>
+                          </a:rPr>
+                          <m:t>2</m:t>
+                        </m:r>
+                      </m:sub>
+                    </m:sSub>
+                    <m:r>
+                      <a:rPr lang="en-US" b="0" i="1" smtClean="0">
+                        <a:latin typeface="Cambria Math" panose="02040503050406030204" pitchFamily="18" charset="0"/>
+                      </a:rPr>
+                      <m:t>)</m:t>
+                    </m:r>
+                  </m:oMath>
+                </a14:m>
+                <a:endParaRPr lang="en-US" dirty="0"/>
+              </a:p>
+              <a:p>
+                <a:pPr marL="0" indent="0" algn="ctr">
+                  <a:buNone/>
+                </a:pPr>
+                <a:r>
+                  <a:rPr lang="en-US" dirty="0"/>
+                  <a:t>Input image:		 </a:t>
+                </a:r>
+                <a14:m>
+                  <m:oMath xmlns:m="http://schemas.openxmlformats.org/officeDocument/2006/math">
+                    <m:r>
+                      <a:rPr lang="en-US" b="0" i="0" smtClean="0">
+                        <a:latin typeface="Cambria Math" panose="02040503050406030204" pitchFamily="18" charset="0"/>
+                      </a:rPr>
+                      <m:t>(</m:t>
+                    </m:r>
+                    <m:r>
+                      <a:rPr lang="en-US" b="0" i="1" smtClean="0">
+                        <a:latin typeface="Cambria Math" panose="02040503050406030204" pitchFamily="18" charset="0"/>
+                      </a:rPr>
+                      <m:t>𝑖</m:t>
+                    </m:r>
+                    <m:sSub>
+                      <m:sSubPr>
+                        <m:ctrlPr>
+                          <a:rPr lang="en-US" b="0" i="1" smtClean="0">
+                            <a:latin typeface="Cambria Math" panose="02040503050406030204" pitchFamily="18" charset="0"/>
+                          </a:rPr>
+                        </m:ctrlPr>
+                      </m:sSubPr>
+                      <m:e>
+                        <m:r>
+                          <a:rPr lang="en-US" b="0" i="1" smtClean="0">
+                            <a:latin typeface="Cambria Math" panose="02040503050406030204" pitchFamily="18" charset="0"/>
+                          </a:rPr>
+                          <m:t>𝑛</m:t>
+                        </m:r>
+                      </m:e>
+                      <m:sub>
+                        <m:r>
+                          <a:rPr lang="en-US" b="0" i="1" smtClean="0">
+                            <a:latin typeface="Cambria Math" panose="02040503050406030204" pitchFamily="18" charset="0"/>
+                          </a:rPr>
+                          <m:t>1</m:t>
+                        </m:r>
+                      </m:sub>
+                    </m:sSub>
+                    <m:r>
+                      <a:rPr lang="en-US" b="0" i="1" smtClean="0">
+                        <a:latin typeface="Cambria Math" panose="02040503050406030204" pitchFamily="18" charset="0"/>
+                      </a:rPr>
+                      <m:t>,</m:t>
+                    </m:r>
+                    <m:r>
+                      <a:rPr lang="en-US" b="0" i="1" smtClean="0">
+                        <a:latin typeface="Cambria Math" panose="02040503050406030204" pitchFamily="18" charset="0"/>
+                      </a:rPr>
+                      <m:t>𝑖</m:t>
+                    </m:r>
+                    <m:sSub>
+                      <m:sSubPr>
+                        <m:ctrlPr>
+                          <a:rPr lang="en-US" b="0" i="1" smtClean="0">
+                            <a:latin typeface="Cambria Math" panose="02040503050406030204" pitchFamily="18" charset="0"/>
+                          </a:rPr>
+                        </m:ctrlPr>
+                      </m:sSubPr>
+                      <m:e>
+                        <m:r>
+                          <a:rPr lang="en-US" b="0" i="1" smtClean="0">
+                            <a:latin typeface="Cambria Math" panose="02040503050406030204" pitchFamily="18" charset="0"/>
+                          </a:rPr>
+                          <m:t>𝑛</m:t>
+                        </m:r>
+                      </m:e>
+                      <m:sub>
+                        <m:r>
+                          <a:rPr lang="en-US" b="0" i="1" smtClean="0">
+                            <a:latin typeface="Cambria Math" panose="02040503050406030204" pitchFamily="18" charset="0"/>
+                          </a:rPr>
+                          <m:t>2</m:t>
+                        </m:r>
+                      </m:sub>
+                    </m:sSub>
+                    <m:r>
+                      <a:rPr lang="en-US" b="0" i="1" smtClean="0">
+                        <a:latin typeface="Cambria Math" panose="02040503050406030204" pitchFamily="18" charset="0"/>
+                      </a:rPr>
+                      <m:t>)</m:t>
+                    </m:r>
+                  </m:oMath>
+                </a14:m>
+                <a:endParaRPr lang="en-US" dirty="0"/>
+              </a:p>
+              <a:p>
+                <a:pPr marL="0" indent="0" algn="ctr">
+                  <a:buNone/>
+                </a:pPr>
+                <a:r>
+                  <a:rPr lang="en-US" dirty="0"/>
+                  <a:t>Padding: 	</a:t>
+                </a:r>
+                <a14:m>
+                  <m:oMath xmlns:m="http://schemas.openxmlformats.org/officeDocument/2006/math">
+                    <m:r>
+                      <a:rPr lang="en-US" b="0" i="0" smtClean="0">
+                        <a:latin typeface="Cambria Math" panose="02040503050406030204" pitchFamily="18" charset="0"/>
+                      </a:rPr>
+                      <m:t>(</m:t>
+                    </m:r>
+                    <m:sSub>
+                      <m:sSubPr>
+                        <m:ctrlPr>
+                          <a:rPr lang="en-US" b="0" i="1" smtClean="0">
+                            <a:latin typeface="Cambria Math" panose="02040503050406030204" pitchFamily="18" charset="0"/>
+                          </a:rPr>
+                        </m:ctrlPr>
+                      </m:sSubPr>
+                      <m:e>
+                        <m:r>
+                          <a:rPr lang="en-US" b="0" i="1" smtClean="0">
+                            <a:latin typeface="Cambria Math" panose="02040503050406030204" pitchFamily="18" charset="0"/>
+                          </a:rPr>
+                          <m:t>𝑝</m:t>
+                        </m:r>
+                      </m:e>
+                      <m:sub>
+                        <m:r>
+                          <a:rPr lang="en-US" b="0" i="1" smtClean="0">
+                            <a:latin typeface="Cambria Math" panose="02040503050406030204" pitchFamily="18" charset="0"/>
+                          </a:rPr>
+                          <m:t>1</m:t>
+                        </m:r>
+                      </m:sub>
+                    </m:sSub>
+                    <m:r>
+                      <a:rPr lang="en-US" b="0" i="1" smtClean="0">
+                        <a:latin typeface="Cambria Math" panose="02040503050406030204" pitchFamily="18" charset="0"/>
+                      </a:rPr>
+                      <m:t>,</m:t>
+                    </m:r>
+                    <m:sSub>
+                      <m:sSubPr>
+                        <m:ctrlPr>
+                          <a:rPr lang="en-US" b="0" i="1" smtClean="0">
+                            <a:latin typeface="Cambria Math" panose="02040503050406030204" pitchFamily="18" charset="0"/>
+                          </a:rPr>
+                        </m:ctrlPr>
+                      </m:sSubPr>
+                      <m:e>
+                        <m:r>
+                          <a:rPr lang="en-US" b="0" i="1" smtClean="0">
+                            <a:latin typeface="Cambria Math" panose="02040503050406030204" pitchFamily="18" charset="0"/>
+                          </a:rPr>
+                          <m:t>𝑝</m:t>
+                        </m:r>
+                      </m:e>
+                      <m:sub>
+                        <m:r>
+                          <a:rPr lang="en-US" b="0" i="1" smtClean="0">
+                            <a:latin typeface="Cambria Math" panose="02040503050406030204" pitchFamily="18" charset="0"/>
+                          </a:rPr>
+                          <m:t>2</m:t>
+                        </m:r>
+                      </m:sub>
+                    </m:sSub>
+                    <m:r>
+                      <a:rPr lang="en-US" b="0" i="1" smtClean="0">
+                        <a:latin typeface="Cambria Math" panose="02040503050406030204" pitchFamily="18" charset="0"/>
+                      </a:rPr>
+                      <m:t>)</m:t>
+                    </m:r>
+                  </m:oMath>
+                </a14:m>
+                <a:endParaRPr lang="en-US" dirty="0"/>
+              </a:p>
+              <a:p>
+                <a:pPr marL="0" indent="0" algn="ctr">
+                  <a:buNone/>
+                </a:pPr>
+                <a:r>
+                  <a:rPr lang="en-US" dirty="0"/>
+                  <a:t>Striding:	</a:t>
+                </a:r>
+                <a14:m>
+                  <m:oMath xmlns:m="http://schemas.openxmlformats.org/officeDocument/2006/math">
+                    <m:r>
+                      <a:rPr lang="en-US">
+                        <a:latin typeface="Cambria Math" panose="02040503050406030204" pitchFamily="18" charset="0"/>
+                      </a:rPr>
+                      <m:t>(</m:t>
+                    </m:r>
+                    <m:sSub>
+                      <m:sSubPr>
+                        <m:ctrlPr>
+                          <a:rPr lang="en-US" i="1">
+                            <a:latin typeface="Cambria Math" panose="02040503050406030204" pitchFamily="18" charset="0"/>
+                          </a:rPr>
+                        </m:ctrlPr>
+                      </m:sSubPr>
+                      <m:e>
+                        <m:r>
+                          <m:rPr>
+                            <m:sty m:val="p"/>
+                          </m:rPr>
+                          <a:rPr lang="en-US">
+                            <a:latin typeface="Cambria Math" panose="02040503050406030204" pitchFamily="18" charset="0"/>
+                          </a:rPr>
+                          <m:t>s</m:t>
+                        </m:r>
+                      </m:e>
+                      <m:sub>
+                        <m:r>
+                          <a:rPr lang="en-US">
+                            <a:latin typeface="Cambria Math" panose="02040503050406030204" pitchFamily="18" charset="0"/>
+                          </a:rPr>
+                          <m:t>1</m:t>
+                        </m:r>
+                      </m:sub>
+                    </m:sSub>
+                    <m:r>
+                      <a:rPr lang="en-US">
+                        <a:latin typeface="Cambria Math" panose="02040503050406030204" pitchFamily="18" charset="0"/>
+                      </a:rPr>
+                      <m:t>,</m:t>
+                    </m:r>
+                    <m:sSub>
+                      <m:sSubPr>
+                        <m:ctrlPr>
+                          <a:rPr lang="en-US" i="1">
+                            <a:latin typeface="Cambria Math" panose="02040503050406030204" pitchFamily="18" charset="0"/>
+                          </a:rPr>
+                        </m:ctrlPr>
+                      </m:sSubPr>
+                      <m:e>
+                        <m:r>
+                          <m:rPr>
+                            <m:sty m:val="p"/>
+                          </m:rPr>
+                          <a:rPr lang="en-US">
+                            <a:latin typeface="Cambria Math" panose="02040503050406030204" pitchFamily="18" charset="0"/>
+                          </a:rPr>
+                          <m:t>s</m:t>
+                        </m:r>
+                      </m:e>
+                      <m:sub>
+                        <m:r>
+                          <a:rPr lang="en-US">
+                            <a:latin typeface="Cambria Math" panose="02040503050406030204" pitchFamily="18" charset="0"/>
+                          </a:rPr>
+                          <m:t>2</m:t>
+                        </m:r>
+                      </m:sub>
+                    </m:sSub>
+                    <m:r>
+                      <a:rPr lang="en-US">
+                        <a:latin typeface="Cambria Math" panose="02040503050406030204" pitchFamily="18" charset="0"/>
+                      </a:rPr>
+                      <m:t>)</m:t>
+                    </m:r>
+                  </m:oMath>
+                </a14:m>
+                <a:endParaRPr lang="en-US" dirty="0"/>
+              </a:p>
+              <a:p>
+                <a:pPr marL="0" indent="0" algn="ctr">
+                  <a:buNone/>
+                </a:pPr>
+                <a:r>
+                  <a:rPr lang="en-US" dirty="0"/>
+                  <a:t>Dilation:	</a:t>
+                </a:r>
+                <a14:m>
+                  <m:oMath xmlns:m="http://schemas.openxmlformats.org/officeDocument/2006/math">
+                    <m:r>
+                      <a:rPr lang="en-US" b="0" i="0" smtClean="0">
+                        <a:latin typeface="Cambria Math" panose="02040503050406030204" pitchFamily="18" charset="0"/>
+                      </a:rPr>
+                      <m:t>(</m:t>
+                    </m:r>
+                    <m:sSub>
+                      <m:sSubPr>
+                        <m:ctrlPr>
+                          <a:rPr lang="en-US" b="0" i="1" smtClean="0">
+                            <a:latin typeface="Cambria Math" panose="02040503050406030204" pitchFamily="18" charset="0"/>
+                          </a:rPr>
+                        </m:ctrlPr>
+                      </m:sSubPr>
+                      <m:e>
+                        <m:r>
+                          <a:rPr lang="en-US" b="0" i="1" smtClean="0">
+                            <a:latin typeface="Cambria Math" panose="02040503050406030204" pitchFamily="18" charset="0"/>
+                          </a:rPr>
+                          <m:t>𝑑</m:t>
+                        </m:r>
+                      </m:e>
+                      <m:sub>
+                        <m:r>
+                          <a:rPr lang="en-US" b="0" i="1" smtClean="0">
+                            <a:latin typeface="Cambria Math" panose="02040503050406030204" pitchFamily="18" charset="0"/>
+                          </a:rPr>
+                          <m:t>1</m:t>
+                        </m:r>
+                      </m:sub>
+                    </m:sSub>
+                    <m:r>
+                      <a:rPr lang="en-US" b="0" i="0" smtClean="0">
+                        <a:latin typeface="Cambria Math" panose="02040503050406030204" pitchFamily="18" charset="0"/>
+                      </a:rPr>
+                      <m:t>,</m:t>
+                    </m:r>
+                    <m:sSub>
+                      <m:sSubPr>
+                        <m:ctrlPr>
+                          <a:rPr lang="en-US" b="0" i="1" smtClean="0">
+                            <a:latin typeface="Cambria Math" panose="02040503050406030204" pitchFamily="18" charset="0"/>
+                          </a:rPr>
+                        </m:ctrlPr>
+                      </m:sSubPr>
+                      <m:e>
+                        <m:r>
+                          <a:rPr lang="en-US" b="0" i="1" smtClean="0">
+                            <a:latin typeface="Cambria Math" panose="02040503050406030204" pitchFamily="18" charset="0"/>
+                          </a:rPr>
+                          <m:t>𝑑</m:t>
+                        </m:r>
+                      </m:e>
+                      <m:sub>
+                        <m:r>
+                          <a:rPr lang="en-US" b="0" i="0" smtClean="0">
+                            <a:latin typeface="Cambria Math" panose="02040503050406030204" pitchFamily="18" charset="0"/>
+                          </a:rPr>
+                          <m:t>2</m:t>
+                        </m:r>
+                      </m:sub>
+                    </m:sSub>
+                    <m:r>
+                      <a:rPr lang="en-US" b="0" i="0" smtClean="0">
+                        <a:latin typeface="Cambria Math" panose="02040503050406030204" pitchFamily="18" charset="0"/>
+                      </a:rPr>
+                      <m:t>)</m:t>
+                    </m:r>
+                  </m:oMath>
+                </a14:m>
+                <a:endParaRPr lang="en-US" dirty="0"/>
+              </a:p>
+              <a:p>
+                <a:pPr marL="0" indent="0" algn="ctr">
+                  <a:buNone/>
+                </a:pPr>
+                <a:endParaRPr lang="en-US" dirty="0"/>
+              </a:p>
+              <a:p>
+                <a:pPr marL="0" indent="0" algn="ctr">
+                  <a:buNone/>
+                </a:pPr>
+                <a14:m>
+                  <m:oMathPara xmlns:m="http://schemas.openxmlformats.org/officeDocument/2006/math">
+                    <m:oMathParaPr>
+                      <m:jc m:val="centerGroup"/>
+                    </m:oMathParaPr>
+                    <m:oMath xmlns:m="http://schemas.openxmlformats.org/officeDocument/2006/math">
+                      <m:r>
+                        <a:rPr lang="en-US" b="0" i="1" smtClean="0">
+                          <a:latin typeface="Cambria Math" panose="02040503050406030204" pitchFamily="18" charset="0"/>
+                        </a:rPr>
+                        <m:t>𝑜𝑢</m:t>
+                      </m:r>
+                      <m:sSub>
+                        <m:sSubPr>
+                          <m:ctrlPr>
+                            <a:rPr lang="en-US" b="0" i="1" smtClean="0">
+                              <a:latin typeface="Cambria Math" panose="02040503050406030204" pitchFamily="18" charset="0"/>
+                            </a:rPr>
+                          </m:ctrlPr>
+                        </m:sSubPr>
+                        <m:e>
+                          <m:r>
+                            <a:rPr lang="en-US" b="0" i="1" smtClean="0">
+                              <a:latin typeface="Cambria Math" panose="02040503050406030204" pitchFamily="18" charset="0"/>
+                            </a:rPr>
+                            <m:t>𝑡</m:t>
+                          </m:r>
+                        </m:e>
+                        <m:sub>
+                          <m:r>
+                            <a:rPr lang="en-US" b="0" i="1" smtClean="0">
+                              <a:latin typeface="Cambria Math" panose="02040503050406030204" pitchFamily="18" charset="0"/>
+                            </a:rPr>
+                            <m:t>2</m:t>
+                          </m:r>
+                        </m:sub>
+                      </m:sSub>
+                      <m:r>
+                        <a:rPr lang="en-US" b="0" i="1" smtClean="0">
+                          <a:latin typeface="Cambria Math" panose="02040503050406030204" pitchFamily="18" charset="0"/>
+                        </a:rPr>
+                        <m:t>= </m:t>
+                      </m:r>
+                      <m:d>
+                        <m:dPr>
+                          <m:ctrlPr>
+                            <a:rPr lang="en-US" b="0" i="1" smtClean="0">
+                              <a:latin typeface="Cambria Math" panose="02040503050406030204" pitchFamily="18" charset="0"/>
+                            </a:rPr>
+                          </m:ctrlPr>
+                        </m:dPr>
+                        <m:e>
+                          <m:r>
+                            <a:rPr lang="en-US" b="0" i="1" smtClean="0">
+                              <a:latin typeface="Cambria Math" panose="02040503050406030204" pitchFamily="18" charset="0"/>
+                            </a:rPr>
+                            <m:t>𝑖</m:t>
+                          </m:r>
+                          <m:sSub>
+                            <m:sSubPr>
+                              <m:ctrlPr>
+                                <a:rPr lang="en-US" b="0" i="1" smtClean="0">
+                                  <a:latin typeface="Cambria Math" panose="02040503050406030204" pitchFamily="18" charset="0"/>
+                                </a:rPr>
+                              </m:ctrlPr>
+                            </m:sSubPr>
+                            <m:e>
+                              <m:r>
+                                <a:rPr lang="en-US" b="0" i="1" smtClean="0">
+                                  <a:latin typeface="Cambria Math" panose="02040503050406030204" pitchFamily="18" charset="0"/>
+                                </a:rPr>
+                                <m:t>𝑛</m:t>
+                              </m:r>
+                            </m:e>
+                            <m:sub>
+                              <m:r>
+                                <a:rPr lang="en-US" b="0" i="1" smtClean="0">
+                                  <a:latin typeface="Cambria Math" panose="02040503050406030204" pitchFamily="18" charset="0"/>
+                                </a:rPr>
+                                <m:t>1</m:t>
+                              </m:r>
+                            </m:sub>
+                          </m:sSub>
+                          <m:r>
+                            <a:rPr lang="en-US" b="0" i="1" smtClean="0">
+                              <a:latin typeface="Cambria Math" panose="02040503050406030204" pitchFamily="18" charset="0"/>
+                            </a:rPr>
+                            <m:t>−1</m:t>
+                          </m:r>
+                        </m:e>
+                      </m:d>
+                      <m:sSub>
+                        <m:sSubPr>
+                          <m:ctrlPr>
+                            <a:rPr lang="en-US" b="0" i="1" smtClean="0">
+                              <a:latin typeface="Cambria Math" panose="02040503050406030204" pitchFamily="18" charset="0"/>
+                            </a:rPr>
+                          </m:ctrlPr>
+                        </m:sSubPr>
+                        <m:e>
+                          <m:r>
+                            <a:rPr lang="en-US" b="0" i="1" smtClean="0">
+                              <a:latin typeface="Cambria Math" panose="02040503050406030204" pitchFamily="18" charset="0"/>
+                            </a:rPr>
+                            <m:t>𝑠</m:t>
+                          </m:r>
+                        </m:e>
+                        <m:sub>
+                          <m:r>
+                            <a:rPr lang="en-US" b="0" i="1" smtClean="0">
+                              <a:latin typeface="Cambria Math" panose="02040503050406030204" pitchFamily="18" charset="0"/>
+                            </a:rPr>
+                            <m:t>1</m:t>
+                          </m:r>
+                        </m:sub>
+                      </m:sSub>
+                      <m:r>
+                        <a:rPr lang="en-US" b="0" i="1" smtClean="0">
+                          <a:latin typeface="Cambria Math" panose="02040503050406030204" pitchFamily="18" charset="0"/>
+                        </a:rPr>
+                        <m:t>−2</m:t>
+                      </m:r>
+                      <m:sSub>
+                        <m:sSubPr>
+                          <m:ctrlPr>
+                            <a:rPr lang="en-US" b="0" i="1" smtClean="0">
+                              <a:latin typeface="Cambria Math" panose="02040503050406030204" pitchFamily="18" charset="0"/>
+                            </a:rPr>
+                          </m:ctrlPr>
+                        </m:sSubPr>
+                        <m:e>
+                          <m:r>
+                            <a:rPr lang="en-US" b="0" i="1" smtClean="0">
+                              <a:latin typeface="Cambria Math" panose="02040503050406030204" pitchFamily="18" charset="0"/>
+                            </a:rPr>
+                            <m:t>𝑝</m:t>
+                          </m:r>
+                        </m:e>
+                        <m:sub>
+                          <m:r>
+                            <a:rPr lang="en-US" b="0" i="1" smtClean="0">
+                              <a:latin typeface="Cambria Math" panose="02040503050406030204" pitchFamily="18" charset="0"/>
+                            </a:rPr>
+                            <m:t>1</m:t>
+                          </m:r>
+                        </m:sub>
+                      </m:sSub>
+                      <m:r>
+                        <a:rPr lang="en-US" b="0" i="1" smtClean="0">
+                          <a:latin typeface="Cambria Math" panose="02040503050406030204" pitchFamily="18" charset="0"/>
+                        </a:rPr>
+                        <m:t>+</m:t>
+                      </m:r>
+                      <m:sSub>
+                        <m:sSubPr>
+                          <m:ctrlPr>
+                            <a:rPr lang="en-US" b="0" i="1" smtClean="0">
+                              <a:latin typeface="Cambria Math" panose="02040503050406030204" pitchFamily="18" charset="0"/>
+                            </a:rPr>
+                          </m:ctrlPr>
+                        </m:sSubPr>
+                        <m:e>
+                          <m:r>
+                            <a:rPr lang="en-US" b="0" i="1" smtClean="0">
+                              <a:latin typeface="Cambria Math" panose="02040503050406030204" pitchFamily="18" charset="0"/>
+                            </a:rPr>
+                            <m:t>𝑑</m:t>
+                          </m:r>
+                        </m:e>
+                        <m:sub>
+                          <m:r>
+                            <a:rPr lang="en-US" b="0" i="1" smtClean="0">
+                              <a:latin typeface="Cambria Math" panose="02040503050406030204" pitchFamily="18" charset="0"/>
+                            </a:rPr>
+                            <m:t>1</m:t>
+                          </m:r>
+                        </m:sub>
+                      </m:sSub>
+                      <m:d>
+                        <m:dPr>
+                          <m:ctrlPr>
+                            <a:rPr lang="en-US" b="0" i="1" smtClean="0">
+                              <a:latin typeface="Cambria Math" panose="02040503050406030204" pitchFamily="18" charset="0"/>
+                            </a:rPr>
+                          </m:ctrlPr>
+                        </m:dPr>
+                        <m:e>
+                          <m:sSub>
+                            <m:sSubPr>
+                              <m:ctrlPr>
+                                <a:rPr lang="en-US" b="0" i="1" smtClean="0">
+                                  <a:latin typeface="Cambria Math" panose="02040503050406030204" pitchFamily="18" charset="0"/>
+                                </a:rPr>
+                              </m:ctrlPr>
+                            </m:sSubPr>
+                            <m:e>
+                              <m:r>
+                                <a:rPr lang="en-US" b="0" i="1" smtClean="0">
+                                  <a:latin typeface="Cambria Math" panose="02040503050406030204" pitchFamily="18" charset="0"/>
+                                </a:rPr>
+                                <m:t>𝑘</m:t>
+                              </m:r>
+                            </m:e>
+                            <m:sub>
+                              <m:r>
+                                <a:rPr lang="en-US" b="0" i="1" smtClean="0">
+                                  <a:latin typeface="Cambria Math" panose="02040503050406030204" pitchFamily="18" charset="0"/>
+                                </a:rPr>
+                                <m:t>1</m:t>
+                              </m:r>
+                            </m:sub>
+                          </m:sSub>
+                          <m:r>
+                            <a:rPr lang="en-US" b="0" i="1" smtClean="0">
+                              <a:latin typeface="Cambria Math" panose="02040503050406030204" pitchFamily="18" charset="0"/>
+                            </a:rPr>
+                            <m:t>−1</m:t>
+                          </m:r>
+                        </m:e>
+                      </m:d>
+                      <m:r>
+                        <a:rPr lang="en-US" b="0" i="1" smtClean="0">
+                          <a:latin typeface="Cambria Math" panose="02040503050406030204" pitchFamily="18" charset="0"/>
+                        </a:rPr>
+                        <m:t>+1</m:t>
+                      </m:r>
+                    </m:oMath>
+                  </m:oMathPara>
+                </a14:m>
+                <a:endParaRPr lang="en-US" dirty="0"/>
+              </a:p>
+              <a:p>
+                <a:pPr marL="0" indent="0" algn="ctr">
+                  <a:buNone/>
+                </a:pPr>
+                <a:endParaRPr lang="en-US" dirty="0"/>
+              </a:p>
+              <a:p>
+                <a:pPr marL="0" indent="0" algn="ctr">
+                  <a:buNone/>
+                </a:pPr>
+                <a14:m>
+                  <m:oMathPara xmlns:m="http://schemas.openxmlformats.org/officeDocument/2006/math">
+                    <m:oMathParaPr>
+                      <m:jc m:val="centerGroup"/>
+                    </m:oMathParaPr>
+                    <m:oMath xmlns:m="http://schemas.openxmlformats.org/officeDocument/2006/math">
+                      <m:r>
+                        <a:rPr lang="en-US" b="0" i="1" smtClean="0">
+                          <a:latin typeface="Cambria Math" panose="02040503050406030204" pitchFamily="18" charset="0"/>
+                        </a:rPr>
+                        <m:t>𝑜𝑢</m:t>
+                      </m:r>
+                      <m:sSub>
+                        <m:sSubPr>
+                          <m:ctrlPr>
+                            <a:rPr lang="en-US" b="0" i="1" smtClean="0">
+                              <a:latin typeface="Cambria Math" panose="02040503050406030204" pitchFamily="18" charset="0"/>
+                            </a:rPr>
+                          </m:ctrlPr>
+                        </m:sSubPr>
+                        <m:e>
+                          <m:r>
+                            <a:rPr lang="en-US" b="0" i="1" smtClean="0">
+                              <a:latin typeface="Cambria Math" panose="02040503050406030204" pitchFamily="18" charset="0"/>
+                            </a:rPr>
+                            <m:t>𝑡</m:t>
+                          </m:r>
+                        </m:e>
+                        <m:sub>
+                          <m:r>
+                            <a:rPr lang="en-US" b="0" i="1" smtClean="0">
+                              <a:latin typeface="Cambria Math" panose="02040503050406030204" pitchFamily="18" charset="0"/>
+                            </a:rPr>
+                            <m:t>1</m:t>
+                          </m:r>
+                        </m:sub>
+                      </m:sSub>
+                      <m:r>
+                        <a:rPr lang="en-US" b="0" i="1" smtClean="0">
+                          <a:latin typeface="Cambria Math" panose="02040503050406030204" pitchFamily="18" charset="0"/>
+                        </a:rPr>
+                        <m:t>= </m:t>
+                      </m:r>
+                      <m:d>
+                        <m:dPr>
+                          <m:ctrlPr>
+                            <a:rPr lang="en-US" b="0" i="1" smtClean="0">
+                              <a:latin typeface="Cambria Math" panose="02040503050406030204" pitchFamily="18" charset="0"/>
+                            </a:rPr>
+                          </m:ctrlPr>
+                        </m:dPr>
+                        <m:e>
+                          <m:r>
+                            <a:rPr lang="en-US" b="0" i="1" smtClean="0">
+                              <a:latin typeface="Cambria Math" panose="02040503050406030204" pitchFamily="18" charset="0"/>
+                            </a:rPr>
+                            <m:t>𝑖</m:t>
+                          </m:r>
+                          <m:sSub>
+                            <m:sSubPr>
+                              <m:ctrlPr>
+                                <a:rPr lang="en-US" b="0" i="1" smtClean="0">
+                                  <a:latin typeface="Cambria Math" panose="02040503050406030204" pitchFamily="18" charset="0"/>
+                                </a:rPr>
+                              </m:ctrlPr>
+                            </m:sSubPr>
+                            <m:e>
+                              <m:r>
+                                <a:rPr lang="en-US" b="0" i="1" smtClean="0">
+                                  <a:latin typeface="Cambria Math" panose="02040503050406030204" pitchFamily="18" charset="0"/>
+                                </a:rPr>
+                                <m:t>𝑛</m:t>
+                              </m:r>
+                            </m:e>
+                            <m:sub>
+                              <m:r>
+                                <a:rPr lang="en-US" b="0" i="1" smtClean="0">
+                                  <a:latin typeface="Cambria Math" panose="02040503050406030204" pitchFamily="18" charset="0"/>
+                                </a:rPr>
+                                <m:t>2</m:t>
+                              </m:r>
+                            </m:sub>
+                          </m:sSub>
+                          <m:r>
+                            <a:rPr lang="en-US" b="0" i="1" smtClean="0">
+                              <a:latin typeface="Cambria Math" panose="02040503050406030204" pitchFamily="18" charset="0"/>
+                            </a:rPr>
+                            <m:t>−1</m:t>
+                          </m:r>
+                        </m:e>
+                      </m:d>
+                      <m:sSub>
+                        <m:sSubPr>
+                          <m:ctrlPr>
+                            <a:rPr lang="en-US" b="0" i="1" smtClean="0">
+                              <a:latin typeface="Cambria Math" panose="02040503050406030204" pitchFamily="18" charset="0"/>
+                            </a:rPr>
+                          </m:ctrlPr>
+                        </m:sSubPr>
+                        <m:e>
+                          <m:r>
+                            <a:rPr lang="en-US" b="0" i="1" smtClean="0">
+                              <a:latin typeface="Cambria Math" panose="02040503050406030204" pitchFamily="18" charset="0"/>
+                            </a:rPr>
+                            <m:t>𝑠</m:t>
+                          </m:r>
+                        </m:e>
+                        <m:sub>
+                          <m:r>
+                            <a:rPr lang="en-US" b="0" i="1" smtClean="0">
+                              <a:latin typeface="Cambria Math" panose="02040503050406030204" pitchFamily="18" charset="0"/>
+                            </a:rPr>
+                            <m:t>2</m:t>
+                          </m:r>
+                        </m:sub>
+                      </m:sSub>
+                      <m:r>
+                        <a:rPr lang="en-US" b="0" i="1" smtClean="0">
+                          <a:latin typeface="Cambria Math" panose="02040503050406030204" pitchFamily="18" charset="0"/>
+                        </a:rPr>
+                        <m:t>−2</m:t>
+                      </m:r>
+                      <m:sSub>
+                        <m:sSubPr>
+                          <m:ctrlPr>
+                            <a:rPr lang="en-US" b="0" i="1" smtClean="0">
+                              <a:latin typeface="Cambria Math" panose="02040503050406030204" pitchFamily="18" charset="0"/>
+                            </a:rPr>
+                          </m:ctrlPr>
+                        </m:sSubPr>
+                        <m:e>
+                          <m:r>
+                            <a:rPr lang="en-US" b="0" i="1" smtClean="0">
+                              <a:latin typeface="Cambria Math" panose="02040503050406030204" pitchFamily="18" charset="0"/>
+                            </a:rPr>
+                            <m:t>𝑝</m:t>
+                          </m:r>
+                        </m:e>
+                        <m:sub>
+                          <m:r>
+                            <a:rPr lang="en-US" b="0" i="1" smtClean="0">
+                              <a:latin typeface="Cambria Math" panose="02040503050406030204" pitchFamily="18" charset="0"/>
+                            </a:rPr>
+                            <m:t>2</m:t>
+                          </m:r>
+                        </m:sub>
+                      </m:sSub>
+                      <m:r>
+                        <a:rPr lang="en-US" b="0" i="1" smtClean="0">
+                          <a:latin typeface="Cambria Math" panose="02040503050406030204" pitchFamily="18" charset="0"/>
+                        </a:rPr>
+                        <m:t>+</m:t>
+                      </m:r>
+                      <m:sSub>
+                        <m:sSubPr>
+                          <m:ctrlPr>
+                            <a:rPr lang="en-US" b="0" i="1" smtClean="0">
+                              <a:latin typeface="Cambria Math" panose="02040503050406030204" pitchFamily="18" charset="0"/>
+                            </a:rPr>
+                          </m:ctrlPr>
+                        </m:sSubPr>
+                        <m:e>
+                          <m:r>
+                            <a:rPr lang="en-US" b="0" i="1" smtClean="0">
+                              <a:latin typeface="Cambria Math" panose="02040503050406030204" pitchFamily="18" charset="0"/>
+                            </a:rPr>
+                            <m:t>𝑑</m:t>
+                          </m:r>
+                        </m:e>
+                        <m:sub>
+                          <m:r>
+                            <a:rPr lang="en-US" b="0" i="1" smtClean="0">
+                              <a:latin typeface="Cambria Math" panose="02040503050406030204" pitchFamily="18" charset="0"/>
+                            </a:rPr>
+                            <m:t>2</m:t>
+                          </m:r>
+                        </m:sub>
+                      </m:sSub>
+                      <m:d>
+                        <m:dPr>
+                          <m:ctrlPr>
+                            <a:rPr lang="en-US" b="0" i="1" smtClean="0">
+                              <a:latin typeface="Cambria Math" panose="02040503050406030204" pitchFamily="18" charset="0"/>
+                            </a:rPr>
+                          </m:ctrlPr>
+                        </m:dPr>
+                        <m:e>
+                          <m:sSub>
+                            <m:sSubPr>
+                              <m:ctrlPr>
+                                <a:rPr lang="en-US" b="0" i="1" smtClean="0">
+                                  <a:latin typeface="Cambria Math" panose="02040503050406030204" pitchFamily="18" charset="0"/>
+                                </a:rPr>
+                              </m:ctrlPr>
+                            </m:sSubPr>
+                            <m:e>
+                              <m:r>
+                                <a:rPr lang="en-US" b="0" i="1" smtClean="0">
+                                  <a:latin typeface="Cambria Math" panose="02040503050406030204" pitchFamily="18" charset="0"/>
+                                </a:rPr>
+                                <m:t>𝑘</m:t>
+                              </m:r>
+                            </m:e>
+                            <m:sub>
+                              <m:r>
+                                <a:rPr lang="en-US" b="0" i="1" smtClean="0">
+                                  <a:latin typeface="Cambria Math" panose="02040503050406030204" pitchFamily="18" charset="0"/>
+                                </a:rPr>
+                                <m:t>2</m:t>
+                              </m:r>
+                            </m:sub>
+                          </m:sSub>
+                          <m:r>
+                            <a:rPr lang="en-US" b="0" i="1" smtClean="0">
+                              <a:latin typeface="Cambria Math" panose="02040503050406030204" pitchFamily="18" charset="0"/>
+                            </a:rPr>
+                            <m:t>−1</m:t>
+                          </m:r>
+                        </m:e>
+                      </m:d>
+                      <m:r>
+                        <a:rPr lang="en-US" b="0" i="1" smtClean="0">
+                          <a:latin typeface="Cambria Math" panose="02040503050406030204" pitchFamily="18" charset="0"/>
+                        </a:rPr>
+                        <m:t>+1</m:t>
+                      </m:r>
+                    </m:oMath>
+                  </m:oMathPara>
+                </a14:m>
+                <a:endParaRPr lang="en-US" dirty="0"/>
+              </a:p>
+            </p:txBody>
+          </p:sp>
+        </mc:Choice>
+        <mc:Fallback>
+          <p:sp>
+            <p:nvSpPr>
+              <p:cNvPr id="3" name="Content Placeholder 2">
+                <a:extLst>
+                  <a:ext uri="{FF2B5EF4-FFF2-40B4-BE49-F238E27FC236}">
+                    <a16:creationId xmlns:a16="http://schemas.microsoft.com/office/drawing/2014/main" id="{B4BCBD0E-EB29-6951-EAC5-9C7D4BCEDF4D}"/>
+                  </a:ext>
+                </a:extLst>
+              </p:cNvPr>
+              <p:cNvSpPr>
+                <a:spLocks noGrp="1" noRot="1" noChangeAspect="1" noMove="1" noResize="1" noEditPoints="1" noAdjustHandles="1" noChangeArrowheads="1" noChangeShapeType="1" noTextEdit="1"/>
+              </p:cNvSpPr>
+              <p:nvPr>
+                <p:ph idx="1"/>
+              </p:nvPr>
+            </p:nvSpPr>
+            <p:spPr>
+              <a:blipFill>
+                <a:blip r:embed="rId3"/>
+                <a:stretch>
+                  <a:fillRect t="-2241" b="-420"/>
+                </a:stretch>
+              </a:blipFill>
+            </p:spPr>
+            <p:txBody>
+              <a:bodyPr/>
+              <a:lstStyle/>
+              <a:p>
+                <a:r>
+                  <a:rPr lang="en-US">
+                    <a:noFill/>
+                  </a:rPr>
+                  <a:t> </a:t>
+                </a:r>
+              </a:p>
+            </p:txBody>
+          </p:sp>
+        </mc:Fallback>
+      </mc:AlternateContent>
+    </p:spTree>
+    <p:extLst>
+      <p:ext uri="{BB962C8B-B14F-4D97-AF65-F5344CB8AC3E}">
+        <p14:creationId xmlns:p14="http://schemas.microsoft.com/office/powerpoint/2010/main" val="1687989521"/>
+      </p:ext>
+    </p:extLst>
+  </p:cSld>
+  <p:clrMapOvr>
+    <a:masterClrMapping/>
+  </p:clrMapOvr>
+</p:sld>
+</file>
+
 <file path=ppt/theme/theme1.xml><?xml version="1.0" encoding="utf-8"?>
 <a:theme xmlns:a="http://schemas.openxmlformats.org/drawingml/2006/main" name="Office Theme">
   <a:themeElements>
@@ -4635,4 +6112,299 @@
     </a:ext>
   </a:extLst>
 </a:theme>
+</file>
+
+<file path=ppt/theme/theme2.xml><?xml version="1.0" encoding="utf-8"?>
+<a:theme xmlns:a="http://schemas.openxmlformats.org/drawingml/2006/main" name="Office Theme">
+  <a:themeElements>
+    <a:clrScheme name="Office">
+      <a:dk1>
+        <a:sysClr val="windowText" lastClr="000000"/>
+      </a:dk1>
+      <a:lt1>
+        <a:sysClr val="window" lastClr="FFFFFF"/>
+      </a:lt1>
+      <a:dk2>
+        <a:srgbClr val="44546A"/>
+      </a:dk2>
+      <a:lt2>
+        <a:srgbClr val="E7E6E6"/>
+      </a:lt2>
+      <a:accent1>
+        <a:srgbClr val="4472C4"/>
+      </a:accent1>
+      <a:accent2>
+        <a:srgbClr val="ED7D31"/>
+      </a:accent2>
+      <a:accent3>
+        <a:srgbClr val="A5A5A5"/>
+      </a:accent3>
+      <a:accent4>
+        <a:srgbClr val="FFC000"/>
+      </a:accent4>
+      <a:accent5>
+        <a:srgbClr val="5B9BD5"/>
+      </a:accent5>
+      <a:accent6>
+        <a:srgbClr val="70AD47"/>
+      </a:accent6>
+      <a:hlink>
+        <a:srgbClr val="0563C1"/>
+      </a:hlink>
+      <a:folHlink>
+        <a:srgbClr val="954F72"/>
+      </a:folHlink>
+    </a:clrScheme>
+    <a:fontScheme name="Office">
+      <a:majorFont>
+        <a:latin typeface="Calibri Light" panose="020F0302020204030204"/>
+        <a:ea typeface=""/>
+        <a:cs typeface=""/>
+        <a:font script="Jpan" typeface="游ゴシック Light"/>
+        <a:font script="Hang" typeface="맑은 고딕"/>
+        <a:font script="Hans" typeface="等线 Light"/>
+        <a:font script="Hant" typeface="新細明體"/>
+        <a:font script="Arab" typeface="Times New Roman"/>
+        <a:font script="Hebr" typeface="Times New Roman"/>
+        <a:font script="Thai" typeface="Angsana New"/>
+        <a:font script="Ethi" typeface="Nyala"/>
+        <a:font script="Beng" typeface="Vrinda"/>
+        <a:font script="Gujr" typeface="Shruti"/>
+        <a:font script="Khmr" typeface="MoolBoran"/>
+        <a:font script="Knda" typeface="Tunga"/>
+        <a:font script="Guru" typeface="Raavi"/>
+        <a:font script="Cans" typeface="Euphemia"/>
+        <a:font script="Cher" typeface="Plantagenet Cherokee"/>
+        <a:font script="Yiii" typeface="Microsoft Yi Baiti"/>
+        <a:font script="Tibt" typeface="Microsoft Himalaya"/>
+        <a:font script="Thaa" typeface="MV Boli"/>
+        <a:font script="Deva" typeface="Mangal"/>
+        <a:font script="Telu" typeface="Gautami"/>
+        <a:font script="Taml" typeface="Latha"/>
+        <a:font script="Syrc" typeface="Estrangelo Edessa"/>
+        <a:font script="Orya" typeface="Kalinga"/>
+        <a:font script="Mlym" typeface="Kartika"/>
+        <a:font script="Laoo" typeface="DokChampa"/>
+        <a:font script="Sinh" typeface="Iskoola Pota"/>
+        <a:font script="Mong" typeface="Mongolian Baiti"/>
+        <a:font script="Viet" typeface="Times New Roman"/>
+        <a:font script="Uigh" typeface="Microsoft Uighur"/>
+        <a:font script="Geor" typeface="Sylfaen"/>
+        <a:font script="Armn" typeface="Arial"/>
+        <a:font script="Bugi" typeface="Leelawadee UI"/>
+        <a:font script="Bopo" typeface="Microsoft JhengHei"/>
+        <a:font script="Java" typeface="Javanese Text"/>
+        <a:font script="Lisu" typeface="Segoe UI"/>
+        <a:font script="Mymr" typeface="Myanmar Text"/>
+        <a:font script="Nkoo" typeface="Ebrima"/>
+        <a:font script="Olck" typeface="Nirmala UI"/>
+        <a:font script="Osma" typeface="Ebrima"/>
+        <a:font script="Phag" typeface="Phagspa"/>
+        <a:font script="Syrn" typeface="Estrangelo Edessa"/>
+        <a:font script="Syrj" typeface="Estrangelo Edessa"/>
+        <a:font script="Syre" typeface="Estrangelo Edessa"/>
+        <a:font script="Sora" typeface="Nirmala UI"/>
+        <a:font script="Tale" typeface="Microsoft Tai Le"/>
+        <a:font script="Talu" typeface="Microsoft New Tai Lue"/>
+        <a:font script="Tfng" typeface="Ebrima"/>
+      </a:majorFont>
+      <a:minorFont>
+        <a:latin typeface="Calibri" panose="020F0502020204030204"/>
+        <a:ea typeface=""/>
+        <a:cs typeface=""/>
+        <a:font script="Jpan" typeface="游ゴシック"/>
+        <a:font script="Hang" typeface="맑은 고딕"/>
+        <a:font script="Hans" typeface="等线"/>
+        <a:font script="Hant" typeface="新細明體"/>
+        <a:font script="Arab" typeface="Arial"/>
+        <a:font script="Hebr" typeface="Arial"/>
+        <a:font script="Thai" typeface="Cordia New"/>
+        <a:font script="Ethi" typeface="Nyala"/>
+        <a:font script="Beng" typeface="Vrinda"/>
+        <a:font script="Gujr" typeface="Shruti"/>
+        <a:font script="Khmr" typeface="DaunPenh"/>
+        <a:font script="Knda" typeface="Tunga"/>
+        <a:font script="Guru" typeface="Raavi"/>
+        <a:font script="Cans" typeface="Euphemia"/>
+        <a:font script="Cher" typeface="Plantagenet Cherokee"/>
+        <a:font script="Yiii" typeface="Microsoft Yi Baiti"/>
+        <a:font script="Tibt" typeface="Microsoft Himalaya"/>
+        <a:font script="Thaa" typeface="MV Boli"/>
+        <a:font script="Deva" typeface="Mangal"/>
+        <a:font script="Telu" typeface="Gautami"/>
+        <a:font script="Taml" typeface="Latha"/>
+        <a:font script="Syrc" typeface="Estrangelo Edessa"/>
+        <a:font script="Orya" typeface="Kalinga"/>
+        <a:font script="Mlym" typeface="Kartika"/>
+        <a:font script="Laoo" typeface="DokChampa"/>
+        <a:font script="Sinh" typeface="Iskoola Pota"/>
+        <a:font script="Mong" typeface="Mongolian Baiti"/>
+        <a:font script="Viet" typeface="Arial"/>
+        <a:font script="Uigh" typeface="Microsoft Uighur"/>
+        <a:font script="Geor" typeface="Sylfaen"/>
+        <a:font script="Armn" typeface="Arial"/>
+        <a:font script="Bugi" typeface="Leelawadee UI"/>
+        <a:font script="Bopo" typeface="Microsoft JhengHei"/>
+        <a:font script="Java" typeface="Javanese Text"/>
+        <a:font script="Lisu" typeface="Segoe UI"/>
+        <a:font script="Mymr" typeface="Myanmar Text"/>
+        <a:font script="Nkoo" typeface="Ebrima"/>
+        <a:font script="Olck" typeface="Nirmala UI"/>
+        <a:font script="Osma" typeface="Ebrima"/>
+        <a:font script="Phag" typeface="Phagspa"/>
+        <a:font script="Syrn" typeface="Estrangelo Edessa"/>
+        <a:font script="Syrj" typeface="Estrangelo Edessa"/>
+        <a:font script="Syre" typeface="Estrangelo Edessa"/>
+        <a:font script="Sora" typeface="Nirmala UI"/>
+        <a:font script="Tale" typeface="Microsoft Tai Le"/>
+        <a:font script="Talu" typeface="Microsoft New Tai Lue"/>
+        <a:font script="Tfng" typeface="Ebrima"/>
+      </a:minorFont>
+    </a:fontScheme>
+    <a:fmtScheme name="Office">
+      <a:fillStyleLst>
+        <a:solidFill>
+          <a:schemeClr val="phClr"/>
+        </a:solidFill>
+        <a:gradFill rotWithShape="1">
+          <a:gsLst>
+            <a:gs pos="0">
+              <a:schemeClr val="phClr">
+                <a:lumMod val="110000"/>
+                <a:satMod val="105000"/>
+                <a:tint val="67000"/>
+              </a:schemeClr>
+            </a:gs>
+            <a:gs pos="50000">
+              <a:schemeClr val="phClr">
+                <a:lumMod val="105000"/>
+                <a:satMod val="103000"/>
+                <a:tint val="73000"/>
+              </a:schemeClr>
+            </a:gs>
+            <a:gs pos="100000">
+              <a:schemeClr val="phClr">
+                <a:lumMod val="105000"/>
+                <a:satMod val="109000"/>
+                <a:tint val="81000"/>
+              </a:schemeClr>
+            </a:gs>
+          </a:gsLst>
+          <a:lin ang="5400000" scaled="0"/>
+        </a:gradFill>
+        <a:gradFill rotWithShape="1">
+          <a:gsLst>
+            <a:gs pos="0">
+              <a:schemeClr val="phClr">
+                <a:satMod val="103000"/>
+                <a:lumMod val="102000"/>
+                <a:tint val="94000"/>
+              </a:schemeClr>
+            </a:gs>
+            <a:gs pos="50000">
+              <a:schemeClr val="phClr">
+                <a:satMod val="110000"/>
+                <a:lumMod val="100000"/>
+                <a:shade val="100000"/>
+              </a:schemeClr>
+            </a:gs>
+            <a:gs pos="100000">
+              <a:schemeClr val="phClr">
+                <a:lumMod val="99000"/>
+                <a:satMod val="120000"/>
+                <a:shade val="78000"/>
+              </a:schemeClr>
+            </a:gs>
+          </a:gsLst>
+          <a:lin ang="5400000" scaled="0"/>
+        </a:gradFill>
+      </a:fillStyleLst>
+      <a:lnStyleLst>
+        <a:ln w="6350" cap="flat" cmpd="sng" algn="ctr">
+          <a:solidFill>
+            <a:schemeClr val="phClr"/>
+          </a:solidFill>
+          <a:prstDash val="solid"/>
+          <a:miter lim="800000"/>
+        </a:ln>
+        <a:ln w="12700" cap="flat" cmpd="sng" algn="ctr">
+          <a:solidFill>
+            <a:schemeClr val="phClr"/>
+          </a:solidFill>
+          <a:prstDash val="solid"/>
+          <a:miter lim="800000"/>
+        </a:ln>
+        <a:ln w="19050" cap="flat" cmpd="sng" algn="ctr">
+          <a:solidFill>
+            <a:schemeClr val="phClr"/>
+          </a:solidFill>
+          <a:prstDash val="solid"/>
+          <a:miter lim="800000"/>
+        </a:ln>
+      </a:lnStyleLst>
+      <a:effectStyleLst>
+        <a:effectStyle>
+          <a:effectLst/>
+        </a:effectStyle>
+        <a:effectStyle>
+          <a:effectLst/>
+        </a:effectStyle>
+        <a:effectStyle>
+          <a:effectLst>
+            <a:outerShdw blurRad="57150" dist="19050" dir="5400000" algn="ctr" rotWithShape="0">
+              <a:srgbClr val="000000">
+                <a:alpha val="63000"/>
+              </a:srgbClr>
+            </a:outerShdw>
+          </a:effectLst>
+        </a:effectStyle>
+      </a:effectStyleLst>
+      <a:bgFillStyleLst>
+        <a:solidFill>
+          <a:schemeClr val="phClr"/>
+        </a:solidFill>
+        <a:solidFill>
+          <a:schemeClr val="phClr">
+            <a:tint val="95000"/>
+            <a:satMod val="170000"/>
+          </a:schemeClr>
+        </a:solidFill>
+        <a:gradFill rotWithShape="1">
+          <a:gsLst>
+            <a:gs pos="0">
+              <a:schemeClr val="phClr">
+                <a:tint val="93000"/>
+                <a:satMod val="150000"/>
+                <a:shade val="98000"/>
+                <a:lumMod val="102000"/>
+              </a:schemeClr>
+            </a:gs>
+            <a:gs pos="50000">
+              <a:schemeClr val="phClr">
+                <a:tint val="98000"/>
+                <a:satMod val="130000"/>
+                <a:shade val="90000"/>
+                <a:lumMod val="103000"/>
+              </a:schemeClr>
+            </a:gs>
+            <a:gs pos="100000">
+              <a:schemeClr val="phClr">
+                <a:shade val="63000"/>
+                <a:satMod val="120000"/>
+              </a:schemeClr>
+            </a:gs>
+          </a:gsLst>
+          <a:lin ang="5400000" scaled="0"/>
+        </a:gradFill>
+      </a:bgFillStyleLst>
+    </a:fmtScheme>
+  </a:themeElements>
+  <a:objectDefaults/>
+  <a:extraClrSchemeLst/>
+  <a:extLst>
+    <a:ext uri="{05A4C25C-085E-4340-85A3-A5531E510DB2}">
+      <thm15:themeFamily xmlns:thm15="http://schemas.microsoft.com/office/thememl/2012/main" name="Office Theme 2013 - 2022" id="{62F939B6-93AF-4DB8-9C6B-D6C7DFDC589F}" vid="{4A3C46E8-61CC-4603-A589-7422A47A8E4A}"/>
+    </a:ext>
+  </a:extLst>
+</a:theme>
 </file>
</xml_diff>

<commit_message>
added out padding & cleaned
</commit_message>
<xml_diff>
--- a/Slides_7.pptx
+++ b/Slides_7.pptx
@@ -4819,13 +4819,8 @@
           <a:p>
             <a:r>
               <a:rPr lang="en-US" dirty="0"/>
-              <a:t>Transposed Convolution </a:t>
+              <a:t>Transposed Convolution Output Size</a:t>
             </a:r>
-            <a:r>
-              <a:rPr lang="en-US"/>
-              <a:t>Output Size</a:t>
-            </a:r>
-            <a:endParaRPr lang="en-US" dirty="0"/>
           </a:p>
         </p:txBody>
       </p:sp>
@@ -4847,446 +4842,17 @@
                 <p:ph idx="1"/>
               </p:nvPr>
             </p:nvSpPr>
-            <p:spPr/>
+            <p:spPr>
+              <a:xfrm>
+                <a:off x="838200" y="5669280"/>
+                <a:ext cx="10515600" cy="507682"/>
+              </a:xfrm>
+            </p:spPr>
             <p:txBody>
               <a:bodyPr>
                 <a:normAutofit/>
               </a:bodyPr>
               <a:lstStyle/>
-              <a:p>
-                <a:pPr marL="0" indent="0" algn="ctr">
-                  <a:buNone/>
-                </a:pPr>
-                <a:r>
-                  <a:rPr lang="en-US" dirty="0"/>
-                  <a:t>Kernel: 	</a:t>
-                </a:r>
-                <a14:m>
-                  <m:oMath xmlns:m="http://schemas.openxmlformats.org/officeDocument/2006/math">
-                    <m:sSub>
-                      <m:sSubPr>
-                        <m:ctrlPr>
-                          <a:rPr lang="en-US" b="0" i="1" smtClean="0">
-                            <a:latin typeface="Cambria Math" panose="02040503050406030204" pitchFamily="18" charset="0"/>
-                          </a:rPr>
-                        </m:ctrlPr>
-                      </m:sSubPr>
-                      <m:e>
-                        <m:r>
-                          <a:rPr lang="en-US" b="0" i="1" smtClean="0">
-                            <a:latin typeface="Cambria Math" panose="02040503050406030204" pitchFamily="18" charset="0"/>
-                          </a:rPr>
-                          <m:t>(</m:t>
-                        </m:r>
-                        <m:r>
-                          <a:rPr lang="en-US" i="1">
-                            <a:latin typeface="Cambria Math" panose="02040503050406030204" pitchFamily="18" charset="0"/>
-                          </a:rPr>
-                          <m:t>𝑘</m:t>
-                        </m:r>
-                      </m:e>
-                      <m:sub>
-                        <m:r>
-                          <a:rPr lang="en-US" b="0" i="1" smtClean="0">
-                            <a:latin typeface="Cambria Math" panose="02040503050406030204" pitchFamily="18" charset="0"/>
-                          </a:rPr>
-                          <m:t>1</m:t>
-                        </m:r>
-                      </m:sub>
-                    </m:sSub>
-                    <m:r>
-                      <a:rPr lang="en-US" b="0" i="1" smtClean="0">
-                        <a:latin typeface="Cambria Math" panose="02040503050406030204" pitchFamily="18" charset="0"/>
-                      </a:rPr>
-                      <m:t>, </m:t>
-                    </m:r>
-                    <m:sSub>
-                      <m:sSubPr>
-                        <m:ctrlPr>
-                          <a:rPr lang="en-US" b="0" i="1" smtClean="0">
-                            <a:latin typeface="Cambria Math" panose="02040503050406030204" pitchFamily="18" charset="0"/>
-                          </a:rPr>
-                        </m:ctrlPr>
-                      </m:sSubPr>
-                      <m:e>
-                        <m:r>
-                          <a:rPr lang="en-US" i="1">
-                            <a:latin typeface="Cambria Math" panose="02040503050406030204" pitchFamily="18" charset="0"/>
-                          </a:rPr>
-                          <m:t>𝑘</m:t>
-                        </m:r>
-                      </m:e>
-                      <m:sub>
-                        <m:r>
-                          <a:rPr lang="en-US" b="0" i="1" smtClean="0">
-                            <a:latin typeface="Cambria Math" panose="02040503050406030204" pitchFamily="18" charset="0"/>
-                          </a:rPr>
-                          <m:t>2</m:t>
-                        </m:r>
-                      </m:sub>
-                    </m:sSub>
-                    <m:r>
-                      <a:rPr lang="en-US" b="0" i="1" smtClean="0">
-                        <a:latin typeface="Cambria Math" panose="02040503050406030204" pitchFamily="18" charset="0"/>
-                      </a:rPr>
-                      <m:t>)</m:t>
-                    </m:r>
-                  </m:oMath>
-                </a14:m>
-                <a:endParaRPr lang="en-US" dirty="0"/>
-              </a:p>
-              <a:p>
-                <a:pPr marL="0" indent="0" algn="ctr">
-                  <a:buNone/>
-                </a:pPr>
-                <a:r>
-                  <a:rPr lang="en-US" dirty="0"/>
-                  <a:t>Input image:		 </a:t>
-                </a:r>
-                <a14:m>
-                  <m:oMath xmlns:m="http://schemas.openxmlformats.org/officeDocument/2006/math">
-                    <m:r>
-                      <a:rPr lang="en-US" b="0" i="0" smtClean="0">
-                        <a:latin typeface="Cambria Math" panose="02040503050406030204" pitchFamily="18" charset="0"/>
-                      </a:rPr>
-                      <m:t>(</m:t>
-                    </m:r>
-                    <m:r>
-                      <a:rPr lang="en-US" b="0" i="1" smtClean="0">
-                        <a:latin typeface="Cambria Math" panose="02040503050406030204" pitchFamily="18" charset="0"/>
-                      </a:rPr>
-                      <m:t>𝑖</m:t>
-                    </m:r>
-                    <m:sSub>
-                      <m:sSubPr>
-                        <m:ctrlPr>
-                          <a:rPr lang="en-US" b="0" i="1" smtClean="0">
-                            <a:latin typeface="Cambria Math" panose="02040503050406030204" pitchFamily="18" charset="0"/>
-                          </a:rPr>
-                        </m:ctrlPr>
-                      </m:sSubPr>
-                      <m:e>
-                        <m:r>
-                          <a:rPr lang="en-US" b="0" i="1" smtClean="0">
-                            <a:latin typeface="Cambria Math" panose="02040503050406030204" pitchFamily="18" charset="0"/>
-                          </a:rPr>
-                          <m:t>𝑛</m:t>
-                        </m:r>
-                      </m:e>
-                      <m:sub>
-                        <m:r>
-                          <a:rPr lang="en-US" b="0" i="1" smtClean="0">
-                            <a:latin typeface="Cambria Math" panose="02040503050406030204" pitchFamily="18" charset="0"/>
-                          </a:rPr>
-                          <m:t>1</m:t>
-                        </m:r>
-                      </m:sub>
-                    </m:sSub>
-                    <m:r>
-                      <a:rPr lang="en-US" b="0" i="1" smtClean="0">
-                        <a:latin typeface="Cambria Math" panose="02040503050406030204" pitchFamily="18" charset="0"/>
-                      </a:rPr>
-                      <m:t>,</m:t>
-                    </m:r>
-                    <m:r>
-                      <a:rPr lang="en-US" b="0" i="1" smtClean="0">
-                        <a:latin typeface="Cambria Math" panose="02040503050406030204" pitchFamily="18" charset="0"/>
-                      </a:rPr>
-                      <m:t>𝑖</m:t>
-                    </m:r>
-                    <m:sSub>
-                      <m:sSubPr>
-                        <m:ctrlPr>
-                          <a:rPr lang="en-US" b="0" i="1" smtClean="0">
-                            <a:latin typeface="Cambria Math" panose="02040503050406030204" pitchFamily="18" charset="0"/>
-                          </a:rPr>
-                        </m:ctrlPr>
-                      </m:sSubPr>
-                      <m:e>
-                        <m:r>
-                          <a:rPr lang="en-US" b="0" i="1" smtClean="0">
-                            <a:latin typeface="Cambria Math" panose="02040503050406030204" pitchFamily="18" charset="0"/>
-                          </a:rPr>
-                          <m:t>𝑛</m:t>
-                        </m:r>
-                      </m:e>
-                      <m:sub>
-                        <m:r>
-                          <a:rPr lang="en-US" b="0" i="1" smtClean="0">
-                            <a:latin typeface="Cambria Math" panose="02040503050406030204" pitchFamily="18" charset="0"/>
-                          </a:rPr>
-                          <m:t>2</m:t>
-                        </m:r>
-                      </m:sub>
-                    </m:sSub>
-                    <m:r>
-                      <a:rPr lang="en-US" b="0" i="1" smtClean="0">
-                        <a:latin typeface="Cambria Math" panose="02040503050406030204" pitchFamily="18" charset="0"/>
-                      </a:rPr>
-                      <m:t>)</m:t>
-                    </m:r>
-                  </m:oMath>
-                </a14:m>
-                <a:endParaRPr lang="en-US" dirty="0"/>
-              </a:p>
-              <a:p>
-                <a:pPr marL="0" indent="0" algn="ctr">
-                  <a:buNone/>
-                </a:pPr>
-                <a:r>
-                  <a:rPr lang="en-US" dirty="0"/>
-                  <a:t>Padding: 	</a:t>
-                </a:r>
-                <a14:m>
-                  <m:oMath xmlns:m="http://schemas.openxmlformats.org/officeDocument/2006/math">
-                    <m:r>
-                      <a:rPr lang="en-US" b="0" i="0" smtClean="0">
-                        <a:latin typeface="Cambria Math" panose="02040503050406030204" pitchFamily="18" charset="0"/>
-                      </a:rPr>
-                      <m:t>(</m:t>
-                    </m:r>
-                    <m:sSub>
-                      <m:sSubPr>
-                        <m:ctrlPr>
-                          <a:rPr lang="en-US" b="0" i="1" smtClean="0">
-                            <a:latin typeface="Cambria Math" panose="02040503050406030204" pitchFamily="18" charset="0"/>
-                          </a:rPr>
-                        </m:ctrlPr>
-                      </m:sSubPr>
-                      <m:e>
-                        <m:r>
-                          <a:rPr lang="en-US" b="0" i="1" smtClean="0">
-                            <a:latin typeface="Cambria Math" panose="02040503050406030204" pitchFamily="18" charset="0"/>
-                          </a:rPr>
-                          <m:t>𝑝</m:t>
-                        </m:r>
-                      </m:e>
-                      <m:sub>
-                        <m:r>
-                          <a:rPr lang="en-US" b="0" i="1" smtClean="0">
-                            <a:latin typeface="Cambria Math" panose="02040503050406030204" pitchFamily="18" charset="0"/>
-                          </a:rPr>
-                          <m:t>1</m:t>
-                        </m:r>
-                      </m:sub>
-                    </m:sSub>
-                    <m:r>
-                      <a:rPr lang="en-US" b="0" i="1" smtClean="0">
-                        <a:latin typeface="Cambria Math" panose="02040503050406030204" pitchFamily="18" charset="0"/>
-                      </a:rPr>
-                      <m:t>,</m:t>
-                    </m:r>
-                    <m:sSub>
-                      <m:sSubPr>
-                        <m:ctrlPr>
-                          <a:rPr lang="en-US" b="0" i="1" smtClean="0">
-                            <a:latin typeface="Cambria Math" panose="02040503050406030204" pitchFamily="18" charset="0"/>
-                          </a:rPr>
-                        </m:ctrlPr>
-                      </m:sSubPr>
-                      <m:e>
-                        <m:r>
-                          <a:rPr lang="en-US" b="0" i="1" smtClean="0">
-                            <a:latin typeface="Cambria Math" panose="02040503050406030204" pitchFamily="18" charset="0"/>
-                          </a:rPr>
-                          <m:t>𝑝</m:t>
-                        </m:r>
-                      </m:e>
-                      <m:sub>
-                        <m:r>
-                          <a:rPr lang="en-US" b="0" i="1" smtClean="0">
-                            <a:latin typeface="Cambria Math" panose="02040503050406030204" pitchFamily="18" charset="0"/>
-                          </a:rPr>
-                          <m:t>2</m:t>
-                        </m:r>
-                      </m:sub>
-                    </m:sSub>
-                    <m:r>
-                      <a:rPr lang="en-US" b="0" i="1" smtClean="0">
-                        <a:latin typeface="Cambria Math" panose="02040503050406030204" pitchFamily="18" charset="0"/>
-                      </a:rPr>
-                      <m:t>)</m:t>
-                    </m:r>
-                  </m:oMath>
-                </a14:m>
-                <a:endParaRPr lang="en-US" dirty="0"/>
-              </a:p>
-              <a:p>
-                <a:pPr marL="0" indent="0" algn="ctr">
-                  <a:buNone/>
-                </a:pPr>
-                <a:r>
-                  <a:rPr lang="en-US" dirty="0"/>
-                  <a:t>Striding:	</a:t>
-                </a:r>
-                <a14:m>
-                  <m:oMath xmlns:m="http://schemas.openxmlformats.org/officeDocument/2006/math">
-                    <m:r>
-                      <a:rPr lang="en-US">
-                        <a:latin typeface="Cambria Math" panose="02040503050406030204" pitchFamily="18" charset="0"/>
-                      </a:rPr>
-                      <m:t>(</m:t>
-                    </m:r>
-                    <m:sSub>
-                      <m:sSubPr>
-                        <m:ctrlPr>
-                          <a:rPr lang="en-US" i="1">
-                            <a:latin typeface="Cambria Math" panose="02040503050406030204" pitchFamily="18" charset="0"/>
-                          </a:rPr>
-                        </m:ctrlPr>
-                      </m:sSubPr>
-                      <m:e>
-                        <m:r>
-                          <m:rPr>
-                            <m:sty m:val="p"/>
-                          </m:rPr>
-                          <a:rPr lang="en-US">
-                            <a:latin typeface="Cambria Math" panose="02040503050406030204" pitchFamily="18" charset="0"/>
-                          </a:rPr>
-                          <m:t>s</m:t>
-                        </m:r>
-                      </m:e>
-                      <m:sub>
-                        <m:r>
-                          <a:rPr lang="en-US">
-                            <a:latin typeface="Cambria Math" panose="02040503050406030204" pitchFamily="18" charset="0"/>
-                          </a:rPr>
-                          <m:t>1</m:t>
-                        </m:r>
-                      </m:sub>
-                    </m:sSub>
-                    <m:r>
-                      <a:rPr lang="en-US">
-                        <a:latin typeface="Cambria Math" panose="02040503050406030204" pitchFamily="18" charset="0"/>
-                      </a:rPr>
-                      <m:t>,</m:t>
-                    </m:r>
-                    <m:sSub>
-                      <m:sSubPr>
-                        <m:ctrlPr>
-                          <a:rPr lang="en-US" i="1">
-                            <a:latin typeface="Cambria Math" panose="02040503050406030204" pitchFamily="18" charset="0"/>
-                          </a:rPr>
-                        </m:ctrlPr>
-                      </m:sSubPr>
-                      <m:e>
-                        <m:r>
-                          <m:rPr>
-                            <m:sty m:val="p"/>
-                          </m:rPr>
-                          <a:rPr lang="en-US">
-                            <a:latin typeface="Cambria Math" panose="02040503050406030204" pitchFamily="18" charset="0"/>
-                          </a:rPr>
-                          <m:t>s</m:t>
-                        </m:r>
-                      </m:e>
-                      <m:sub>
-                        <m:r>
-                          <a:rPr lang="en-US">
-                            <a:latin typeface="Cambria Math" panose="02040503050406030204" pitchFamily="18" charset="0"/>
-                          </a:rPr>
-                          <m:t>2</m:t>
-                        </m:r>
-                      </m:sub>
-                    </m:sSub>
-                    <m:r>
-                      <a:rPr lang="en-US">
-                        <a:latin typeface="Cambria Math" panose="02040503050406030204" pitchFamily="18" charset="0"/>
-                      </a:rPr>
-                      <m:t>)</m:t>
-                    </m:r>
-                  </m:oMath>
-                </a14:m>
-                <a:endParaRPr lang="en-US" dirty="0"/>
-              </a:p>
-              <a:p>
-                <a:pPr marL="0" indent="0" algn="ctr">
-                  <a:buNone/>
-                </a:pPr>
-                <a:r>
-                  <a:rPr lang="en-US" dirty="0"/>
-                  <a:t>Dilation:	</a:t>
-                </a:r>
-                <a14:m>
-                  <m:oMath xmlns:m="http://schemas.openxmlformats.org/officeDocument/2006/math">
-                    <m:r>
-                      <a:rPr lang="en-US" b="0" i="0" smtClean="0">
-                        <a:latin typeface="Cambria Math" panose="02040503050406030204" pitchFamily="18" charset="0"/>
-                      </a:rPr>
-                      <m:t>(</m:t>
-                    </m:r>
-                    <m:sSub>
-                      <m:sSubPr>
-                        <m:ctrlPr>
-                          <a:rPr lang="en-US" b="0" i="1" smtClean="0">
-                            <a:latin typeface="Cambria Math" panose="02040503050406030204" pitchFamily="18" charset="0"/>
-                          </a:rPr>
-                        </m:ctrlPr>
-                      </m:sSubPr>
-                      <m:e>
-                        <m:r>
-                          <a:rPr lang="en-US" b="0" i="1" smtClean="0">
-                            <a:latin typeface="Cambria Math" panose="02040503050406030204" pitchFamily="18" charset="0"/>
-                          </a:rPr>
-                          <m:t>𝑑</m:t>
-                        </m:r>
-                      </m:e>
-                      <m:sub>
-                        <m:r>
-                          <a:rPr lang="en-US" b="0" i="1" smtClean="0">
-                            <a:latin typeface="Cambria Math" panose="02040503050406030204" pitchFamily="18" charset="0"/>
-                          </a:rPr>
-                          <m:t>1</m:t>
-                        </m:r>
-                      </m:sub>
-                    </m:sSub>
-                    <m:r>
-                      <a:rPr lang="en-US" b="0" i="0" smtClean="0">
-                        <a:latin typeface="Cambria Math" panose="02040503050406030204" pitchFamily="18" charset="0"/>
-                      </a:rPr>
-                      <m:t>,</m:t>
-                    </m:r>
-                    <m:sSub>
-                      <m:sSubPr>
-                        <m:ctrlPr>
-                          <a:rPr lang="en-US" b="0" i="1" smtClean="0">
-                            <a:latin typeface="Cambria Math" panose="02040503050406030204" pitchFamily="18" charset="0"/>
-                          </a:rPr>
-                        </m:ctrlPr>
-                      </m:sSubPr>
-                      <m:e>
-                        <m:r>
-                          <a:rPr lang="en-US" b="0" i="1" smtClean="0">
-                            <a:latin typeface="Cambria Math" panose="02040503050406030204" pitchFamily="18" charset="0"/>
-                          </a:rPr>
-                          <m:t>𝑑</m:t>
-                        </m:r>
-                      </m:e>
-                      <m:sub>
-                        <m:r>
-                          <a:rPr lang="en-US" b="0" i="0" smtClean="0">
-                            <a:latin typeface="Cambria Math" panose="02040503050406030204" pitchFamily="18" charset="0"/>
-                          </a:rPr>
-                          <m:t>2</m:t>
-                        </m:r>
-                      </m:sub>
-                    </m:sSub>
-                    <m:r>
-                      <a:rPr lang="en-US" b="0" i="0" smtClean="0">
-                        <a:latin typeface="Cambria Math" panose="02040503050406030204" pitchFamily="18" charset="0"/>
-                      </a:rPr>
-                      <m:t>)</m:t>
-                    </m:r>
-                  </m:oMath>
-                </a14:m>
-                <a:endParaRPr lang="en-US" dirty="0"/>
-              </a:p>
-              <a:p>
-                <a:pPr marL="0" indent="0" algn="ctr">
-                  <a:buNone/>
-                </a:pPr>
-                <a:endParaRPr lang="en-US" dirty="0"/>
-              </a:p>
               <a:p>
                 <a:pPr marL="0" indent="0" algn="ctr">
                   <a:buNone/>
@@ -5324,7 +4890,7 @@
                             <a:rPr lang="en-US" b="0" i="1" smtClean="0">
                               <a:latin typeface="Cambria Math" panose="02040503050406030204" pitchFamily="18" charset="0"/>
                             </a:rPr>
-                            <m:t>2</m:t>
+                            <m:t>𝑖</m:t>
                           </m:r>
                         </m:sub>
                       </m:sSub>
@@ -5370,7 +4936,7 @@
                                 <a:rPr lang="en-US" b="0" i="1" smtClean="0">
                                   <a:latin typeface="Cambria Math" panose="02040503050406030204" pitchFamily="18" charset="0"/>
                                 </a:rPr>
-                                <m:t>1</m:t>
+                                <m:t>𝑖</m:t>
                               </m:r>
                             </m:sub>
                           </m:sSub>
@@ -5403,7 +4969,7 @@
                             <a:rPr lang="en-US" b="0" i="1" smtClean="0">
                               <a:latin typeface="Cambria Math" panose="02040503050406030204" pitchFamily="18" charset="0"/>
                             </a:rPr>
-                            <m:t>1</m:t>
+                            <m:t>𝑖</m:t>
                           </m:r>
                         </m:sub>
                       </m:sSub>
@@ -5434,7 +5000,7 @@
                             <a:rPr lang="en-US" b="0" i="1" smtClean="0">
                               <a:latin typeface="Cambria Math" panose="02040503050406030204" pitchFamily="18" charset="0"/>
                             </a:rPr>
-                            <m:t>1</m:t>
+                            <m:t>𝑖</m:t>
                           </m:r>
                         </m:sub>
                       </m:sSub>
@@ -5465,7 +5031,7 @@
                             <a:rPr lang="en-US" b="0" i="1" smtClean="0">
                               <a:latin typeface="Cambria Math" panose="02040503050406030204" pitchFamily="18" charset="0"/>
                             </a:rPr>
-                            <m:t>1</m:t>
+                            <m:t>𝑖</m:t>
                           </m:r>
                         </m:sub>
                       </m:sSub>
@@ -5499,7 +5065,7 @@
                                 <a:rPr lang="en-US" b="0" i="1" smtClean="0">
                                   <a:latin typeface="Cambria Math" panose="02040503050406030204" pitchFamily="18" charset="0"/>
                                 </a:rPr>
-                                <m:t>1</m:t>
+                                <m:t>𝑖</m:t>
                               </m:r>
                             </m:sub>
                           </m:sSub>
@@ -5515,174 +5081,6 @@
                         <a:rPr lang="en-US" b="0" i="1" smtClean="0">
                           <a:latin typeface="Cambria Math" panose="02040503050406030204" pitchFamily="18" charset="0"/>
                         </a:rPr>
-                        <m:t>+1</m:t>
-                      </m:r>
-                    </m:oMath>
-                  </m:oMathPara>
-                </a14:m>
-                <a:endParaRPr lang="en-US" dirty="0"/>
-              </a:p>
-              <a:p>
-                <a:pPr marL="0" indent="0" algn="ctr">
-                  <a:buNone/>
-                </a:pPr>
-                <a:endParaRPr lang="en-US" dirty="0"/>
-              </a:p>
-              <a:p>
-                <a:pPr marL="0" indent="0" algn="ctr">
-                  <a:buNone/>
-                </a:pPr>
-                <a14:m>
-                  <m:oMathPara xmlns:m="http://schemas.openxmlformats.org/officeDocument/2006/math">
-                    <m:oMathParaPr>
-                      <m:jc m:val="centerGroup"/>
-                    </m:oMathParaPr>
-                    <m:oMath xmlns:m="http://schemas.openxmlformats.org/officeDocument/2006/math">
-                      <m:r>
-                        <a:rPr lang="en-US" b="0" i="1" smtClean="0">
-                          <a:latin typeface="Cambria Math" panose="02040503050406030204" pitchFamily="18" charset="0"/>
-                        </a:rPr>
-                        <m:t>𝑜𝑢</m:t>
-                      </m:r>
-                      <m:sSub>
-                        <m:sSubPr>
-                          <m:ctrlPr>
-                            <a:rPr lang="en-US" b="0" i="1" smtClean="0">
-                              <a:latin typeface="Cambria Math" panose="02040503050406030204" pitchFamily="18" charset="0"/>
-                            </a:rPr>
-                          </m:ctrlPr>
-                        </m:sSubPr>
-                        <m:e>
-                          <m:r>
-                            <a:rPr lang="en-US" b="0" i="1" smtClean="0">
-                              <a:latin typeface="Cambria Math" panose="02040503050406030204" pitchFamily="18" charset="0"/>
-                            </a:rPr>
-                            <m:t>𝑡</m:t>
-                          </m:r>
-                        </m:e>
-                        <m:sub>
-                          <m:r>
-                            <a:rPr lang="en-US" b="0" i="1" smtClean="0">
-                              <a:latin typeface="Cambria Math" panose="02040503050406030204" pitchFamily="18" charset="0"/>
-                            </a:rPr>
-                            <m:t>1</m:t>
-                          </m:r>
-                        </m:sub>
-                      </m:sSub>
-                      <m:r>
-                        <a:rPr lang="en-US" b="0" i="1" smtClean="0">
-                          <a:latin typeface="Cambria Math" panose="02040503050406030204" pitchFamily="18" charset="0"/>
-                        </a:rPr>
-                        <m:t>= </m:t>
-                      </m:r>
-                      <m:d>
-                        <m:dPr>
-                          <m:ctrlPr>
-                            <a:rPr lang="en-US" b="0" i="1" smtClean="0">
-                              <a:latin typeface="Cambria Math" panose="02040503050406030204" pitchFamily="18" charset="0"/>
-                            </a:rPr>
-                          </m:ctrlPr>
-                        </m:dPr>
-                        <m:e>
-                          <m:r>
-                            <a:rPr lang="en-US" b="0" i="1" smtClean="0">
-                              <a:latin typeface="Cambria Math" panose="02040503050406030204" pitchFamily="18" charset="0"/>
-                            </a:rPr>
-                            <m:t>𝑖</m:t>
-                          </m:r>
-                          <m:sSub>
-                            <m:sSubPr>
-                              <m:ctrlPr>
-                                <a:rPr lang="en-US" b="0" i="1" smtClean="0">
-                                  <a:latin typeface="Cambria Math" panose="02040503050406030204" pitchFamily="18" charset="0"/>
-                                </a:rPr>
-                              </m:ctrlPr>
-                            </m:sSubPr>
-                            <m:e>
-                              <m:r>
-                                <a:rPr lang="en-US" b="0" i="1" smtClean="0">
-                                  <a:latin typeface="Cambria Math" panose="02040503050406030204" pitchFamily="18" charset="0"/>
-                                </a:rPr>
-                                <m:t>𝑛</m:t>
-                              </m:r>
-                            </m:e>
-                            <m:sub>
-                              <m:r>
-                                <a:rPr lang="en-US" b="0" i="1" smtClean="0">
-                                  <a:latin typeface="Cambria Math" panose="02040503050406030204" pitchFamily="18" charset="0"/>
-                                </a:rPr>
-                                <m:t>2</m:t>
-                              </m:r>
-                            </m:sub>
-                          </m:sSub>
-                          <m:r>
-                            <a:rPr lang="en-US" b="0" i="1" smtClean="0">
-                              <a:latin typeface="Cambria Math" panose="02040503050406030204" pitchFamily="18" charset="0"/>
-                            </a:rPr>
-                            <m:t>−1</m:t>
-                          </m:r>
-                        </m:e>
-                      </m:d>
-                      <m:sSub>
-                        <m:sSubPr>
-                          <m:ctrlPr>
-                            <a:rPr lang="en-US" b="0" i="1" smtClean="0">
-                              <a:latin typeface="Cambria Math" panose="02040503050406030204" pitchFamily="18" charset="0"/>
-                            </a:rPr>
-                          </m:ctrlPr>
-                        </m:sSubPr>
-                        <m:e>
-                          <m:r>
-                            <a:rPr lang="en-US" b="0" i="1" smtClean="0">
-                              <a:latin typeface="Cambria Math" panose="02040503050406030204" pitchFamily="18" charset="0"/>
-                            </a:rPr>
-                            <m:t>𝑠</m:t>
-                          </m:r>
-                        </m:e>
-                        <m:sub>
-                          <m:r>
-                            <a:rPr lang="en-US" b="0" i="1" smtClean="0">
-                              <a:latin typeface="Cambria Math" panose="02040503050406030204" pitchFamily="18" charset="0"/>
-                            </a:rPr>
-                            <m:t>2</m:t>
-                          </m:r>
-                        </m:sub>
-                      </m:sSub>
-                      <m:r>
-                        <a:rPr lang="en-US" b="0" i="1" smtClean="0">
-                          <a:latin typeface="Cambria Math" panose="02040503050406030204" pitchFamily="18" charset="0"/>
-                        </a:rPr>
-                        <m:t>−2</m:t>
-                      </m:r>
-                      <m:sSub>
-                        <m:sSubPr>
-                          <m:ctrlPr>
-                            <a:rPr lang="en-US" b="0" i="1" smtClean="0">
-                              <a:latin typeface="Cambria Math" panose="02040503050406030204" pitchFamily="18" charset="0"/>
-                            </a:rPr>
-                          </m:ctrlPr>
-                        </m:sSubPr>
-                        <m:e>
-                          <m:r>
-                            <a:rPr lang="en-US" b="0" i="1" smtClean="0">
-                              <a:latin typeface="Cambria Math" panose="02040503050406030204" pitchFamily="18" charset="0"/>
-                            </a:rPr>
-                            <m:t>𝑝</m:t>
-                          </m:r>
-                        </m:e>
-                        <m:sub>
-                          <m:r>
-                            <a:rPr lang="en-US" b="0" i="1" smtClean="0">
-                              <a:latin typeface="Cambria Math" panose="02040503050406030204" pitchFamily="18" charset="0"/>
-                            </a:rPr>
-                            <m:t>2</m:t>
-                          </m:r>
-                        </m:sub>
-                      </m:sSub>
-                      <m:r>
-                        <a:rPr lang="en-US" b="0" i="1" smtClean="0">
-                          <a:latin typeface="Cambria Math" panose="02040503050406030204" pitchFamily="18" charset="0"/>
-                        </a:rPr>
                         <m:t>+</m:t>
                       </m:r>
                       <m:sSub>
@@ -5694,69 +5092,45 @@
                           </m:ctrlPr>
                         </m:sSubPr>
                         <m:e>
-                          <m:r>
-                            <a:rPr lang="en-US" b="0" i="1" smtClean="0">
-                              <a:latin typeface="Cambria Math" panose="02040503050406030204" pitchFamily="18" charset="0"/>
-                            </a:rPr>
-                            <m:t>𝑑</m:t>
-                          </m:r>
+                          <m:acc>
+                            <m:accPr>
+                              <m:chr m:val="̃"/>
+                              <m:ctrlPr>
+                                <a:rPr lang="en-US" b="0" i="1" smtClean="0">
+                                  <a:latin typeface="Cambria Math" panose="02040503050406030204" pitchFamily="18" charset="0"/>
+                                </a:rPr>
+                              </m:ctrlPr>
+                            </m:accPr>
+                            <m:e>
+                              <m:r>
+                                <a:rPr lang="en-US" b="0" i="1" smtClean="0">
+                                  <a:latin typeface="Cambria Math" panose="02040503050406030204" pitchFamily="18" charset="0"/>
+                                </a:rPr>
+                                <m:t>𝑝</m:t>
+                              </m:r>
+                            </m:e>
+                          </m:acc>
                         </m:e>
                         <m:sub>
                           <m:r>
                             <a:rPr lang="en-US" b="0" i="1" smtClean="0">
                               <a:latin typeface="Cambria Math" panose="02040503050406030204" pitchFamily="18" charset="0"/>
                             </a:rPr>
-                            <m:t>2</m:t>
+                            <m:t>𝑖</m:t>
                           </m:r>
                         </m:sub>
                       </m:sSub>
-                      <m:d>
-                        <m:dPr>
-                          <m:ctrlPr>
-                            <a:rPr lang="en-US" b="0" i="1" smtClean="0">
-                              <a:latin typeface="Cambria Math" panose="02040503050406030204" pitchFamily="18" charset="0"/>
-                            </a:rPr>
-                          </m:ctrlPr>
-                        </m:dPr>
-                        <m:e>
-                          <m:sSub>
-                            <m:sSubPr>
-                              <m:ctrlPr>
-                                <a:rPr lang="en-US" b="0" i="1" smtClean="0">
-                                  <a:latin typeface="Cambria Math" panose="02040503050406030204" pitchFamily="18" charset="0"/>
-                                </a:rPr>
-                              </m:ctrlPr>
-                            </m:sSubPr>
-                            <m:e>
-                              <m:r>
-                                <a:rPr lang="en-US" b="0" i="1" smtClean="0">
-                                  <a:latin typeface="Cambria Math" panose="02040503050406030204" pitchFamily="18" charset="0"/>
-                                </a:rPr>
-                                <m:t>𝑘</m:t>
-                              </m:r>
-                            </m:e>
-                            <m:sub>
-                              <m:r>
-                                <a:rPr lang="en-US" b="0" i="1" smtClean="0">
-                                  <a:latin typeface="Cambria Math" panose="02040503050406030204" pitchFamily="18" charset="0"/>
-                                </a:rPr>
-                                <m:t>2</m:t>
-                              </m:r>
-                            </m:sub>
-                          </m:sSub>
-                          <m:r>
-                            <a:rPr lang="en-US" b="0" i="1" smtClean="0">
-                              <a:latin typeface="Cambria Math" panose="02040503050406030204" pitchFamily="18" charset="0"/>
-                            </a:rPr>
-                            <m:t>−1</m:t>
-                          </m:r>
-                        </m:e>
-                      </m:d>
                       <m:r>
                         <a:rPr lang="en-US" b="0" i="1" smtClean="0">
                           <a:latin typeface="Cambria Math" panose="02040503050406030204" pitchFamily="18" charset="0"/>
                         </a:rPr>
-                        <m:t>+1</m:t>
+                        <m:t>+</m:t>
+                      </m:r>
+                      <m:r>
+                        <a:rPr lang="en-US" b="0" i="1" smtClean="0">
+                          <a:latin typeface="Cambria Math" panose="02040503050406030204" pitchFamily="18" charset="0"/>
+                        </a:rPr>
+                        <m:t>1</m:t>
                       </m:r>
                     </m:oMath>
                   </m:oMathPara>
@@ -5784,10 +5158,14 @@
               </p:nvPr>
             </p:nvSpPr>
             <p:spPr>
+              <a:xfrm>
+                <a:off x="838200" y="5669280"/>
+                <a:ext cx="10515600" cy="507682"/>
+              </a:xfrm>
               <a:blipFill>
                 <a:blip r:embed="rId3"/>
                 <a:stretch>
-                  <a:fillRect t="-2241" b="-420"/>
+                  <a:fillRect t="-6024" b="-6024"/>
                 </a:stretch>
               </a:blipFill>
             </p:spPr>
@@ -5804,6 +5182,2635 @@
               </a:p>
             </p:txBody>
           </p:sp>
+        </mc:Fallback>
+      </mc:AlternateContent>
+      <mc:AlternateContent xmlns:mc="http://schemas.openxmlformats.org/markup-compatibility/2006">
+        <mc:Choice xmlns:a14="http://schemas.microsoft.com/office/drawing/2010/main" Requires="a14">
+          <p:graphicFrame>
+            <p:nvGraphicFramePr>
+              <p:cNvPr id="4" name="Table 4">
+                <a:extLst>
+                  <a:ext uri="{FF2B5EF4-FFF2-40B4-BE49-F238E27FC236}">
+                    <a16:creationId xmlns:a16="http://schemas.microsoft.com/office/drawing/2014/main" id="{D1FCFCAB-B3D0-9841-4EDB-7C439FFFCDD6}"/>
+                  </a:ext>
+                </a:extLst>
+              </p:cNvPr>
+              <p:cNvGraphicFramePr>
+                <a:graphicFrameLocks noGrp="1"/>
+              </p:cNvGraphicFramePr>
+              <p:nvPr>
+                <p:extLst>
+                  <p:ext uri="{D42A27DB-BD31-4B8C-83A1-F6EECF244321}">
+                    <p14:modId xmlns:p14="http://schemas.microsoft.com/office/powerpoint/2010/main" val="234225056"/>
+                  </p:ext>
+                </p:extLst>
+              </p:nvPr>
+            </p:nvGraphicFramePr>
+            <p:xfrm>
+              <a:off x="3521423" y="1690688"/>
+              <a:ext cx="5149154" cy="3521392"/>
+            </p:xfrm>
+            <a:graphic>
+              <a:graphicData uri="http://schemas.openxmlformats.org/drawingml/2006/table">
+                <a:tbl>
+                  <a:tblPr firstRow="1" bandRow="1">
+                    <a:tableStyleId>{5C22544A-7EE6-4342-B048-85BDC9FD1C3A}</a:tableStyleId>
+                  </a:tblPr>
+                  <a:tblGrid>
+                    <a:gridCol w="2574577">
+                      <a:extLst>
+                        <a:ext uri="{9D8B030D-6E8A-4147-A177-3AD203B41FA5}">
+                          <a16:colId xmlns:a16="http://schemas.microsoft.com/office/drawing/2014/main" val="1867715976"/>
+                        </a:ext>
+                      </a:extLst>
+                    </a:gridCol>
+                    <a:gridCol w="2574577">
+                      <a:extLst>
+                        <a:ext uri="{9D8B030D-6E8A-4147-A177-3AD203B41FA5}">
+                          <a16:colId xmlns:a16="http://schemas.microsoft.com/office/drawing/2014/main" val="2067955847"/>
+                        </a:ext>
+                      </a:extLst>
+                    </a:gridCol>
+                  </a:tblGrid>
+                  <a:tr h="503056">
+                    <a:tc>
+                      <a:txBody>
+                        <a:bodyPr/>
+                        <a:lstStyle/>
+                        <a:p>
+                          <a:pPr marL="0" indent="0" algn="r">
+                            <a:buNone/>
+                          </a:pPr>
+                          <a:r>
+                            <a:rPr lang="en-US" sz="2400" b="0" dirty="0">
+                              <a:solidFill>
+                                <a:schemeClr val="tx1"/>
+                              </a:solidFill>
+                            </a:rPr>
+                            <a:t>Kernel:</a:t>
+                          </a:r>
+                        </a:p>
+                      </a:txBody>
+                      <a:tcPr marL="124041" marR="124041" marT="62021" marB="62021">
+                        <a:lnL w="12700" cap="flat" cmpd="sng" algn="ctr">
+                          <a:noFill/>
+                          <a:prstDash val="solid"/>
+                          <a:round/>
+                          <a:headEnd type="none" w="med" len="med"/>
+                          <a:tailEnd type="none" w="med" len="med"/>
+                        </a:lnL>
+                        <a:lnR w="12700" cap="flat" cmpd="sng" algn="ctr">
+                          <a:noFill/>
+                          <a:prstDash val="solid"/>
+                          <a:round/>
+                          <a:headEnd type="none" w="med" len="med"/>
+                          <a:tailEnd type="none" w="med" len="med"/>
+                        </a:lnR>
+                        <a:lnT w="12700" cap="flat" cmpd="sng" algn="ctr">
+                          <a:noFill/>
+                          <a:prstDash val="solid"/>
+                          <a:round/>
+                          <a:headEnd type="none" w="med" len="med"/>
+                          <a:tailEnd type="none" w="med" len="med"/>
+                        </a:lnT>
+                        <a:lnB w="12700" cap="flat" cmpd="sng" algn="ctr">
+                          <a:noFill/>
+                          <a:prstDash val="solid"/>
+                          <a:round/>
+                          <a:headEnd type="none" w="med" len="med"/>
+                          <a:tailEnd type="none" w="med" len="med"/>
+                        </a:lnB>
+                        <a:lnTlToBr w="12700" cmpd="sng">
+                          <a:noFill/>
+                          <a:prstDash val="solid"/>
+                        </a:lnTlToBr>
+                        <a:lnBlToTr w="12700" cmpd="sng">
+                          <a:noFill/>
+                          <a:prstDash val="solid"/>
+                        </a:lnBlToTr>
+                        <a:noFill/>
+                      </a:tcPr>
+                    </a:tc>
+                    <a:tc>
+                      <a:txBody>
+                        <a:bodyPr/>
+                        <a:lstStyle/>
+                        <a:p>
+                          <a:pPr marL="0" marR="0" lvl="0" indent="0" algn="l" defTabSz="914400" rtl="0" eaLnBrk="1" fontAlgn="auto" latinLnBrk="0" hangingPunct="1">
+                            <a:lnSpc>
+                              <a:spcPct val="100000"/>
+                            </a:lnSpc>
+                            <a:spcBef>
+                              <a:spcPts val="0"/>
+                            </a:spcBef>
+                            <a:spcAft>
+                              <a:spcPts val="0"/>
+                            </a:spcAft>
+                            <a:buClrTx/>
+                            <a:buSzTx/>
+                            <a:buFontTx/>
+                            <a:buNone/>
+                            <a:tabLst/>
+                            <a:defRPr/>
+                          </a:pPr>
+                          <a14:m>
+                            <m:oMathPara xmlns:m="http://schemas.openxmlformats.org/officeDocument/2006/math">
+                              <m:oMathParaPr>
+                                <m:jc m:val="centerGroup"/>
+                              </m:oMathParaPr>
+                              <m:oMath xmlns:m="http://schemas.openxmlformats.org/officeDocument/2006/math">
+                                <m:sSub>
+                                  <m:sSubPr>
+                                    <m:ctrlPr>
+                                      <a:rPr lang="en-US" sz="2400" b="0" i="1" smtClean="0">
+                                        <a:solidFill>
+                                          <a:schemeClr val="tx1"/>
+                                        </a:solidFill>
+                                        <a:latin typeface="Cambria Math" panose="02040503050406030204" pitchFamily="18" charset="0"/>
+                                      </a:rPr>
+                                    </m:ctrlPr>
+                                  </m:sSubPr>
+                                  <m:e>
+                                    <m:r>
+                                      <a:rPr lang="en-US" sz="2400" b="0" i="1" smtClean="0">
+                                        <a:solidFill>
+                                          <a:schemeClr val="tx1"/>
+                                        </a:solidFill>
+                                        <a:latin typeface="Cambria Math" panose="02040503050406030204" pitchFamily="18" charset="0"/>
+                                      </a:rPr>
+                                      <m:t>(</m:t>
+                                    </m:r>
+                                    <m:r>
+                                      <a:rPr lang="en-US" sz="2400" i="1">
+                                        <a:solidFill>
+                                          <a:schemeClr val="tx1"/>
+                                        </a:solidFill>
+                                        <a:latin typeface="Cambria Math" panose="02040503050406030204" pitchFamily="18" charset="0"/>
+                                      </a:rPr>
+                                      <m:t>𝑘</m:t>
+                                    </m:r>
+                                  </m:e>
+                                  <m:sub>
+                                    <m:r>
+                                      <a:rPr lang="en-US" sz="2400" b="0" i="1" smtClean="0">
+                                        <a:solidFill>
+                                          <a:schemeClr val="tx1"/>
+                                        </a:solidFill>
+                                        <a:latin typeface="Cambria Math" panose="02040503050406030204" pitchFamily="18" charset="0"/>
+                                      </a:rPr>
+                                      <m:t>1</m:t>
+                                    </m:r>
+                                  </m:sub>
+                                </m:sSub>
+                                <m:r>
+                                  <a:rPr lang="en-US" sz="2400" b="0" i="1" smtClean="0">
+                                    <a:solidFill>
+                                      <a:schemeClr val="tx1"/>
+                                    </a:solidFill>
+                                    <a:latin typeface="Cambria Math" panose="02040503050406030204" pitchFamily="18" charset="0"/>
+                                  </a:rPr>
+                                  <m:t>, </m:t>
+                                </m:r>
+                                <m:sSub>
+                                  <m:sSubPr>
+                                    <m:ctrlPr>
+                                      <a:rPr lang="en-US" sz="2400" b="0" i="1" smtClean="0">
+                                        <a:solidFill>
+                                          <a:schemeClr val="tx1"/>
+                                        </a:solidFill>
+                                        <a:latin typeface="Cambria Math" panose="02040503050406030204" pitchFamily="18" charset="0"/>
+                                      </a:rPr>
+                                    </m:ctrlPr>
+                                  </m:sSubPr>
+                                  <m:e>
+                                    <m:r>
+                                      <a:rPr lang="en-US" sz="2400" i="1">
+                                        <a:solidFill>
+                                          <a:schemeClr val="tx1"/>
+                                        </a:solidFill>
+                                        <a:latin typeface="Cambria Math" panose="02040503050406030204" pitchFamily="18" charset="0"/>
+                                      </a:rPr>
+                                      <m:t>𝑘</m:t>
+                                    </m:r>
+                                  </m:e>
+                                  <m:sub>
+                                    <m:r>
+                                      <a:rPr lang="en-US" sz="2400" b="0" i="1" smtClean="0">
+                                        <a:solidFill>
+                                          <a:schemeClr val="tx1"/>
+                                        </a:solidFill>
+                                        <a:latin typeface="Cambria Math" panose="02040503050406030204" pitchFamily="18" charset="0"/>
+                                      </a:rPr>
+                                      <m:t>2</m:t>
+                                    </m:r>
+                                  </m:sub>
+                                </m:sSub>
+                                <m:r>
+                                  <a:rPr lang="en-US" sz="2400" b="0" i="1" smtClean="0">
+                                    <a:solidFill>
+                                      <a:schemeClr val="tx1"/>
+                                    </a:solidFill>
+                                    <a:latin typeface="Cambria Math" panose="02040503050406030204" pitchFamily="18" charset="0"/>
+                                  </a:rPr>
+                                  <m:t>)</m:t>
+                                </m:r>
+                              </m:oMath>
+                            </m:oMathPara>
+                          </a14:m>
+                          <a:endParaRPr lang="en-US" sz="2400" dirty="0">
+                            <a:solidFill>
+                              <a:schemeClr val="tx1"/>
+                            </a:solidFill>
+                          </a:endParaRPr>
+                        </a:p>
+                      </a:txBody>
+                      <a:tcPr marL="124041" marR="124041" marT="62021" marB="62021">
+                        <a:lnL w="12700" cap="flat" cmpd="sng" algn="ctr">
+                          <a:noFill/>
+                          <a:prstDash val="solid"/>
+                          <a:round/>
+                          <a:headEnd type="none" w="med" len="med"/>
+                          <a:tailEnd type="none" w="med" len="med"/>
+                        </a:lnL>
+                        <a:lnR w="12700" cap="flat" cmpd="sng" algn="ctr">
+                          <a:noFill/>
+                          <a:prstDash val="solid"/>
+                          <a:round/>
+                          <a:headEnd type="none" w="med" len="med"/>
+                          <a:tailEnd type="none" w="med" len="med"/>
+                        </a:lnR>
+                        <a:lnT w="12700" cap="flat" cmpd="sng" algn="ctr">
+                          <a:noFill/>
+                          <a:prstDash val="solid"/>
+                          <a:round/>
+                          <a:headEnd type="none" w="med" len="med"/>
+                          <a:tailEnd type="none" w="med" len="med"/>
+                        </a:lnT>
+                        <a:lnB w="12700" cap="flat" cmpd="sng" algn="ctr">
+                          <a:noFill/>
+                          <a:prstDash val="solid"/>
+                          <a:round/>
+                          <a:headEnd type="none" w="med" len="med"/>
+                          <a:tailEnd type="none" w="med" len="med"/>
+                        </a:lnB>
+                        <a:lnTlToBr w="12700" cmpd="sng">
+                          <a:noFill/>
+                          <a:prstDash val="solid"/>
+                        </a:lnTlToBr>
+                        <a:lnBlToTr w="12700" cmpd="sng">
+                          <a:noFill/>
+                          <a:prstDash val="solid"/>
+                        </a:lnBlToTr>
+                        <a:noFill/>
+                      </a:tcPr>
+                    </a:tc>
+                    <a:extLst>
+                      <a:ext uri="{0D108BD9-81ED-4DB2-BD59-A6C34878D82A}">
+                        <a16:rowId xmlns:a16="http://schemas.microsoft.com/office/drawing/2014/main" val="447519452"/>
+                      </a:ext>
+                    </a:extLst>
+                  </a:tr>
+                  <a:tr h="503056">
+                    <a:tc>
+                      <a:txBody>
+                        <a:bodyPr/>
+                        <a:lstStyle/>
+                        <a:p>
+                          <a:pPr algn="r"/>
+                          <a:r>
+                            <a:rPr lang="en-US" sz="2400" dirty="0">
+                              <a:solidFill>
+                                <a:schemeClr val="tx1"/>
+                              </a:solidFill>
+                            </a:rPr>
+                            <a:t>Input image: </a:t>
+                          </a:r>
+                        </a:p>
+                      </a:txBody>
+                      <a:tcPr marL="124041" marR="124041" marT="62021" marB="62021">
+                        <a:lnL w="12700" cap="flat" cmpd="sng" algn="ctr">
+                          <a:noFill/>
+                          <a:prstDash val="solid"/>
+                          <a:round/>
+                          <a:headEnd type="none" w="med" len="med"/>
+                          <a:tailEnd type="none" w="med" len="med"/>
+                        </a:lnL>
+                        <a:lnR w="12700" cap="flat" cmpd="sng" algn="ctr">
+                          <a:noFill/>
+                          <a:prstDash val="solid"/>
+                          <a:round/>
+                          <a:headEnd type="none" w="med" len="med"/>
+                          <a:tailEnd type="none" w="med" len="med"/>
+                        </a:lnR>
+                        <a:lnT w="12700" cap="flat" cmpd="sng" algn="ctr">
+                          <a:noFill/>
+                          <a:prstDash val="solid"/>
+                          <a:round/>
+                          <a:headEnd type="none" w="med" len="med"/>
+                          <a:tailEnd type="none" w="med" len="med"/>
+                        </a:lnT>
+                        <a:lnB w="12700" cap="flat" cmpd="sng" algn="ctr">
+                          <a:noFill/>
+                          <a:prstDash val="solid"/>
+                          <a:round/>
+                          <a:headEnd type="none" w="med" len="med"/>
+                          <a:tailEnd type="none" w="med" len="med"/>
+                        </a:lnB>
+                        <a:lnTlToBr w="12700" cmpd="sng">
+                          <a:noFill/>
+                          <a:prstDash val="solid"/>
+                        </a:lnTlToBr>
+                        <a:lnBlToTr w="12700" cmpd="sng">
+                          <a:noFill/>
+                          <a:prstDash val="solid"/>
+                        </a:lnBlToTr>
+                        <a:noFill/>
+                      </a:tcPr>
+                    </a:tc>
+                    <a:tc>
+                      <a:txBody>
+                        <a:bodyPr/>
+                        <a:lstStyle/>
+                        <a:p>
+                          <a:pPr marL="0" marR="0" lvl="0" indent="0" algn="l" defTabSz="914400" rtl="0" eaLnBrk="1" fontAlgn="auto" latinLnBrk="0" hangingPunct="1">
+                            <a:lnSpc>
+                              <a:spcPct val="100000"/>
+                            </a:lnSpc>
+                            <a:spcBef>
+                              <a:spcPts val="0"/>
+                            </a:spcBef>
+                            <a:spcAft>
+                              <a:spcPts val="0"/>
+                            </a:spcAft>
+                            <a:buClrTx/>
+                            <a:buSzTx/>
+                            <a:buFontTx/>
+                            <a:buNone/>
+                            <a:tabLst/>
+                            <a:defRPr/>
+                          </a:pPr>
+                          <a14:m>
+                            <m:oMathPara xmlns:m="http://schemas.openxmlformats.org/officeDocument/2006/math">
+                              <m:oMathParaPr>
+                                <m:jc m:val="centerGroup"/>
+                              </m:oMathParaPr>
+                              <m:oMath xmlns:m="http://schemas.openxmlformats.org/officeDocument/2006/math">
+                                <m:r>
+                                  <a:rPr lang="en-US" sz="2400" b="0" i="0" smtClean="0">
+                                    <a:solidFill>
+                                      <a:schemeClr val="tx1"/>
+                                    </a:solidFill>
+                                    <a:latin typeface="Cambria Math" panose="02040503050406030204" pitchFamily="18" charset="0"/>
+                                  </a:rPr>
+                                  <m:t>(</m:t>
+                                </m:r>
+                                <m:r>
+                                  <a:rPr lang="en-US" sz="2400" b="0" i="1" smtClean="0">
+                                    <a:solidFill>
+                                      <a:schemeClr val="tx1"/>
+                                    </a:solidFill>
+                                    <a:latin typeface="Cambria Math" panose="02040503050406030204" pitchFamily="18" charset="0"/>
+                                  </a:rPr>
+                                  <m:t>𝑖</m:t>
+                                </m:r>
+                                <m:sSub>
+                                  <m:sSubPr>
+                                    <m:ctrlPr>
+                                      <a:rPr lang="en-US" sz="2400" b="0" i="1" smtClean="0">
+                                        <a:solidFill>
+                                          <a:schemeClr val="tx1"/>
+                                        </a:solidFill>
+                                        <a:latin typeface="Cambria Math" panose="02040503050406030204" pitchFamily="18" charset="0"/>
+                                      </a:rPr>
+                                    </m:ctrlPr>
+                                  </m:sSubPr>
+                                  <m:e>
+                                    <m:r>
+                                      <a:rPr lang="en-US" sz="2400" b="0" i="1" smtClean="0">
+                                        <a:solidFill>
+                                          <a:schemeClr val="tx1"/>
+                                        </a:solidFill>
+                                        <a:latin typeface="Cambria Math" panose="02040503050406030204" pitchFamily="18" charset="0"/>
+                                      </a:rPr>
+                                      <m:t>𝑛</m:t>
+                                    </m:r>
+                                  </m:e>
+                                  <m:sub>
+                                    <m:r>
+                                      <a:rPr lang="en-US" sz="2400" b="0" i="1" smtClean="0">
+                                        <a:solidFill>
+                                          <a:schemeClr val="tx1"/>
+                                        </a:solidFill>
+                                        <a:latin typeface="Cambria Math" panose="02040503050406030204" pitchFamily="18" charset="0"/>
+                                      </a:rPr>
+                                      <m:t>1</m:t>
+                                    </m:r>
+                                  </m:sub>
+                                </m:sSub>
+                                <m:r>
+                                  <a:rPr lang="en-US" sz="2400" b="0" i="1" smtClean="0">
+                                    <a:solidFill>
+                                      <a:schemeClr val="tx1"/>
+                                    </a:solidFill>
+                                    <a:latin typeface="Cambria Math" panose="02040503050406030204" pitchFamily="18" charset="0"/>
+                                  </a:rPr>
+                                  <m:t>,</m:t>
+                                </m:r>
+                                <m:r>
+                                  <a:rPr lang="en-US" sz="2400" b="0" i="1" smtClean="0">
+                                    <a:solidFill>
+                                      <a:schemeClr val="tx1"/>
+                                    </a:solidFill>
+                                    <a:latin typeface="Cambria Math" panose="02040503050406030204" pitchFamily="18" charset="0"/>
+                                  </a:rPr>
+                                  <m:t>𝑖</m:t>
+                                </m:r>
+                                <m:sSub>
+                                  <m:sSubPr>
+                                    <m:ctrlPr>
+                                      <a:rPr lang="en-US" sz="2400" b="0" i="1" smtClean="0">
+                                        <a:solidFill>
+                                          <a:schemeClr val="tx1"/>
+                                        </a:solidFill>
+                                        <a:latin typeface="Cambria Math" panose="02040503050406030204" pitchFamily="18" charset="0"/>
+                                      </a:rPr>
+                                    </m:ctrlPr>
+                                  </m:sSubPr>
+                                  <m:e>
+                                    <m:r>
+                                      <a:rPr lang="en-US" sz="2400" b="0" i="1" smtClean="0">
+                                        <a:solidFill>
+                                          <a:schemeClr val="tx1"/>
+                                        </a:solidFill>
+                                        <a:latin typeface="Cambria Math" panose="02040503050406030204" pitchFamily="18" charset="0"/>
+                                      </a:rPr>
+                                      <m:t>𝑛</m:t>
+                                    </m:r>
+                                  </m:e>
+                                  <m:sub>
+                                    <m:r>
+                                      <a:rPr lang="en-US" sz="2400" b="0" i="1" smtClean="0">
+                                        <a:solidFill>
+                                          <a:schemeClr val="tx1"/>
+                                        </a:solidFill>
+                                        <a:latin typeface="Cambria Math" panose="02040503050406030204" pitchFamily="18" charset="0"/>
+                                      </a:rPr>
+                                      <m:t>2</m:t>
+                                    </m:r>
+                                  </m:sub>
+                                </m:sSub>
+                                <m:r>
+                                  <a:rPr lang="en-US" sz="2400" b="0" i="1" smtClean="0">
+                                    <a:solidFill>
+                                      <a:schemeClr val="tx1"/>
+                                    </a:solidFill>
+                                    <a:latin typeface="Cambria Math" panose="02040503050406030204" pitchFamily="18" charset="0"/>
+                                  </a:rPr>
+                                  <m:t>)</m:t>
+                                </m:r>
+                              </m:oMath>
+                            </m:oMathPara>
+                          </a14:m>
+                          <a:endParaRPr lang="en-US" sz="2400" dirty="0">
+                            <a:solidFill>
+                              <a:schemeClr val="tx1"/>
+                            </a:solidFill>
+                          </a:endParaRPr>
+                        </a:p>
+                      </a:txBody>
+                      <a:tcPr marL="124041" marR="124041" marT="62021" marB="62021">
+                        <a:lnL w="12700" cap="flat" cmpd="sng" algn="ctr">
+                          <a:noFill/>
+                          <a:prstDash val="solid"/>
+                          <a:round/>
+                          <a:headEnd type="none" w="med" len="med"/>
+                          <a:tailEnd type="none" w="med" len="med"/>
+                        </a:lnL>
+                        <a:lnR w="12700" cap="flat" cmpd="sng" algn="ctr">
+                          <a:noFill/>
+                          <a:prstDash val="solid"/>
+                          <a:round/>
+                          <a:headEnd type="none" w="med" len="med"/>
+                          <a:tailEnd type="none" w="med" len="med"/>
+                        </a:lnR>
+                        <a:lnT w="12700" cap="flat" cmpd="sng" algn="ctr">
+                          <a:noFill/>
+                          <a:prstDash val="solid"/>
+                          <a:round/>
+                          <a:headEnd type="none" w="med" len="med"/>
+                          <a:tailEnd type="none" w="med" len="med"/>
+                        </a:lnT>
+                        <a:lnB w="12700" cap="flat" cmpd="sng" algn="ctr">
+                          <a:noFill/>
+                          <a:prstDash val="solid"/>
+                          <a:round/>
+                          <a:headEnd type="none" w="med" len="med"/>
+                          <a:tailEnd type="none" w="med" len="med"/>
+                        </a:lnB>
+                        <a:lnTlToBr w="12700" cmpd="sng">
+                          <a:noFill/>
+                          <a:prstDash val="solid"/>
+                        </a:lnTlToBr>
+                        <a:lnBlToTr w="12700" cmpd="sng">
+                          <a:noFill/>
+                          <a:prstDash val="solid"/>
+                        </a:lnBlToTr>
+                        <a:noFill/>
+                      </a:tcPr>
+                    </a:tc>
+                    <a:extLst>
+                      <a:ext uri="{0D108BD9-81ED-4DB2-BD59-A6C34878D82A}">
+                        <a16:rowId xmlns:a16="http://schemas.microsoft.com/office/drawing/2014/main" val="1623022831"/>
+                      </a:ext>
+                    </a:extLst>
+                  </a:tr>
+                  <a:tr h="503056">
+                    <a:tc>
+                      <a:txBody>
+                        <a:bodyPr/>
+                        <a:lstStyle/>
+                        <a:p>
+                          <a:pPr algn="r"/>
+                          <a:r>
+                            <a:rPr lang="en-US" sz="2400" dirty="0">
+                              <a:solidFill>
+                                <a:schemeClr val="tx1"/>
+                              </a:solidFill>
+                            </a:rPr>
+                            <a:t>Padding:</a:t>
+                          </a:r>
+                        </a:p>
+                      </a:txBody>
+                      <a:tcPr marL="124041" marR="124041" marT="62021" marB="62021">
+                        <a:lnL w="12700" cap="flat" cmpd="sng" algn="ctr">
+                          <a:noFill/>
+                          <a:prstDash val="solid"/>
+                          <a:round/>
+                          <a:headEnd type="none" w="med" len="med"/>
+                          <a:tailEnd type="none" w="med" len="med"/>
+                        </a:lnL>
+                        <a:lnR w="12700" cap="flat" cmpd="sng" algn="ctr">
+                          <a:noFill/>
+                          <a:prstDash val="solid"/>
+                          <a:round/>
+                          <a:headEnd type="none" w="med" len="med"/>
+                          <a:tailEnd type="none" w="med" len="med"/>
+                        </a:lnR>
+                        <a:lnT w="12700" cap="flat" cmpd="sng" algn="ctr">
+                          <a:noFill/>
+                          <a:prstDash val="solid"/>
+                          <a:round/>
+                          <a:headEnd type="none" w="med" len="med"/>
+                          <a:tailEnd type="none" w="med" len="med"/>
+                        </a:lnT>
+                        <a:lnB w="12700" cap="flat" cmpd="sng" algn="ctr">
+                          <a:noFill/>
+                          <a:prstDash val="solid"/>
+                          <a:round/>
+                          <a:headEnd type="none" w="med" len="med"/>
+                          <a:tailEnd type="none" w="med" len="med"/>
+                        </a:lnB>
+                        <a:lnTlToBr w="12700" cmpd="sng">
+                          <a:noFill/>
+                          <a:prstDash val="solid"/>
+                        </a:lnTlToBr>
+                        <a:lnBlToTr w="12700" cmpd="sng">
+                          <a:noFill/>
+                          <a:prstDash val="solid"/>
+                        </a:lnBlToTr>
+                        <a:noFill/>
+                      </a:tcPr>
+                    </a:tc>
+                    <a:tc>
+                      <a:txBody>
+                        <a:bodyPr/>
+                        <a:lstStyle/>
+                        <a:p>
+                          <a:pPr marL="0" marR="0" lvl="0" indent="0" algn="l" defTabSz="914400" rtl="0" eaLnBrk="1" fontAlgn="auto" latinLnBrk="0" hangingPunct="1">
+                            <a:lnSpc>
+                              <a:spcPct val="100000"/>
+                            </a:lnSpc>
+                            <a:spcBef>
+                              <a:spcPts val="0"/>
+                            </a:spcBef>
+                            <a:spcAft>
+                              <a:spcPts val="0"/>
+                            </a:spcAft>
+                            <a:buClrTx/>
+                            <a:buSzTx/>
+                            <a:buFontTx/>
+                            <a:buNone/>
+                            <a:tabLst/>
+                            <a:defRPr/>
+                          </a:pPr>
+                          <a14:m>
+                            <m:oMathPara xmlns:m="http://schemas.openxmlformats.org/officeDocument/2006/math">
+                              <m:oMathParaPr>
+                                <m:jc m:val="centerGroup"/>
+                              </m:oMathParaPr>
+                              <m:oMath xmlns:m="http://schemas.openxmlformats.org/officeDocument/2006/math">
+                                <m:r>
+                                  <a:rPr lang="en-US" sz="2400" b="0" i="0" smtClean="0">
+                                    <a:solidFill>
+                                      <a:schemeClr val="tx1"/>
+                                    </a:solidFill>
+                                    <a:latin typeface="Cambria Math" panose="02040503050406030204" pitchFamily="18" charset="0"/>
+                                  </a:rPr>
+                                  <m:t>(</m:t>
+                                </m:r>
+                                <m:sSub>
+                                  <m:sSubPr>
+                                    <m:ctrlPr>
+                                      <a:rPr lang="en-US" sz="2400" b="0" i="1" smtClean="0">
+                                        <a:solidFill>
+                                          <a:schemeClr val="tx1"/>
+                                        </a:solidFill>
+                                        <a:latin typeface="Cambria Math" panose="02040503050406030204" pitchFamily="18" charset="0"/>
+                                      </a:rPr>
+                                    </m:ctrlPr>
+                                  </m:sSubPr>
+                                  <m:e>
+                                    <m:r>
+                                      <a:rPr lang="en-US" sz="2400" b="0" i="1" smtClean="0">
+                                        <a:solidFill>
+                                          <a:schemeClr val="tx1"/>
+                                        </a:solidFill>
+                                        <a:latin typeface="Cambria Math" panose="02040503050406030204" pitchFamily="18" charset="0"/>
+                                      </a:rPr>
+                                      <m:t>𝑝</m:t>
+                                    </m:r>
+                                  </m:e>
+                                  <m:sub>
+                                    <m:r>
+                                      <a:rPr lang="en-US" sz="2400" b="0" i="1" smtClean="0">
+                                        <a:solidFill>
+                                          <a:schemeClr val="tx1"/>
+                                        </a:solidFill>
+                                        <a:latin typeface="Cambria Math" panose="02040503050406030204" pitchFamily="18" charset="0"/>
+                                      </a:rPr>
+                                      <m:t>1</m:t>
+                                    </m:r>
+                                  </m:sub>
+                                </m:sSub>
+                                <m:r>
+                                  <a:rPr lang="en-US" sz="2400" b="0" i="1" smtClean="0">
+                                    <a:solidFill>
+                                      <a:schemeClr val="tx1"/>
+                                    </a:solidFill>
+                                    <a:latin typeface="Cambria Math" panose="02040503050406030204" pitchFamily="18" charset="0"/>
+                                  </a:rPr>
+                                  <m:t>,</m:t>
+                                </m:r>
+                                <m:sSub>
+                                  <m:sSubPr>
+                                    <m:ctrlPr>
+                                      <a:rPr lang="en-US" sz="2400" b="0" i="1" smtClean="0">
+                                        <a:solidFill>
+                                          <a:schemeClr val="tx1"/>
+                                        </a:solidFill>
+                                        <a:latin typeface="Cambria Math" panose="02040503050406030204" pitchFamily="18" charset="0"/>
+                                      </a:rPr>
+                                    </m:ctrlPr>
+                                  </m:sSubPr>
+                                  <m:e>
+                                    <m:r>
+                                      <a:rPr lang="en-US" sz="2400" b="0" i="1" smtClean="0">
+                                        <a:solidFill>
+                                          <a:schemeClr val="tx1"/>
+                                        </a:solidFill>
+                                        <a:latin typeface="Cambria Math" panose="02040503050406030204" pitchFamily="18" charset="0"/>
+                                      </a:rPr>
+                                      <m:t>𝑝</m:t>
+                                    </m:r>
+                                  </m:e>
+                                  <m:sub>
+                                    <m:r>
+                                      <a:rPr lang="en-US" sz="2400" b="0" i="1" smtClean="0">
+                                        <a:solidFill>
+                                          <a:schemeClr val="tx1"/>
+                                        </a:solidFill>
+                                        <a:latin typeface="Cambria Math" panose="02040503050406030204" pitchFamily="18" charset="0"/>
+                                      </a:rPr>
+                                      <m:t>2</m:t>
+                                    </m:r>
+                                  </m:sub>
+                                </m:sSub>
+                                <m:r>
+                                  <a:rPr lang="en-US" sz="2400" b="0" i="1" smtClean="0">
+                                    <a:solidFill>
+                                      <a:schemeClr val="tx1"/>
+                                    </a:solidFill>
+                                    <a:latin typeface="Cambria Math" panose="02040503050406030204" pitchFamily="18" charset="0"/>
+                                  </a:rPr>
+                                  <m:t>)</m:t>
+                                </m:r>
+                              </m:oMath>
+                            </m:oMathPara>
+                          </a14:m>
+                          <a:endParaRPr lang="en-US" sz="2400" dirty="0">
+                            <a:solidFill>
+                              <a:schemeClr val="tx1"/>
+                            </a:solidFill>
+                          </a:endParaRPr>
+                        </a:p>
+                      </a:txBody>
+                      <a:tcPr marL="124041" marR="124041" marT="62021" marB="62021">
+                        <a:lnL w="12700" cap="flat" cmpd="sng" algn="ctr">
+                          <a:noFill/>
+                          <a:prstDash val="solid"/>
+                          <a:round/>
+                          <a:headEnd type="none" w="med" len="med"/>
+                          <a:tailEnd type="none" w="med" len="med"/>
+                        </a:lnL>
+                        <a:lnR w="12700" cap="flat" cmpd="sng" algn="ctr">
+                          <a:noFill/>
+                          <a:prstDash val="solid"/>
+                          <a:round/>
+                          <a:headEnd type="none" w="med" len="med"/>
+                          <a:tailEnd type="none" w="med" len="med"/>
+                        </a:lnR>
+                        <a:lnT w="12700" cap="flat" cmpd="sng" algn="ctr">
+                          <a:noFill/>
+                          <a:prstDash val="solid"/>
+                          <a:round/>
+                          <a:headEnd type="none" w="med" len="med"/>
+                          <a:tailEnd type="none" w="med" len="med"/>
+                        </a:lnT>
+                        <a:lnB w="12700" cap="flat" cmpd="sng" algn="ctr">
+                          <a:noFill/>
+                          <a:prstDash val="solid"/>
+                          <a:round/>
+                          <a:headEnd type="none" w="med" len="med"/>
+                          <a:tailEnd type="none" w="med" len="med"/>
+                        </a:lnB>
+                        <a:lnTlToBr w="12700" cmpd="sng">
+                          <a:noFill/>
+                          <a:prstDash val="solid"/>
+                        </a:lnTlToBr>
+                        <a:lnBlToTr w="12700" cmpd="sng">
+                          <a:noFill/>
+                          <a:prstDash val="solid"/>
+                        </a:lnBlToTr>
+                        <a:noFill/>
+                      </a:tcPr>
+                    </a:tc>
+                    <a:extLst>
+                      <a:ext uri="{0D108BD9-81ED-4DB2-BD59-A6C34878D82A}">
+                        <a16:rowId xmlns:a16="http://schemas.microsoft.com/office/drawing/2014/main" val="4005437046"/>
+                      </a:ext>
+                    </a:extLst>
+                  </a:tr>
+                  <a:tr h="503056">
+                    <a:tc>
+                      <a:txBody>
+                        <a:bodyPr/>
+                        <a:lstStyle/>
+                        <a:p>
+                          <a:pPr algn="r"/>
+                          <a:r>
+                            <a:rPr lang="en-US" sz="2400" dirty="0">
+                              <a:solidFill>
+                                <a:schemeClr val="tx1"/>
+                              </a:solidFill>
+                            </a:rPr>
+                            <a:t>Striding:</a:t>
+                          </a:r>
+                        </a:p>
+                      </a:txBody>
+                      <a:tcPr marL="124041" marR="124041" marT="62021" marB="62021">
+                        <a:lnL w="12700" cap="flat" cmpd="sng" algn="ctr">
+                          <a:noFill/>
+                          <a:prstDash val="solid"/>
+                          <a:round/>
+                          <a:headEnd type="none" w="med" len="med"/>
+                          <a:tailEnd type="none" w="med" len="med"/>
+                        </a:lnL>
+                        <a:lnR w="12700" cap="flat" cmpd="sng" algn="ctr">
+                          <a:noFill/>
+                          <a:prstDash val="solid"/>
+                          <a:round/>
+                          <a:headEnd type="none" w="med" len="med"/>
+                          <a:tailEnd type="none" w="med" len="med"/>
+                        </a:lnR>
+                        <a:lnT w="12700" cap="flat" cmpd="sng" algn="ctr">
+                          <a:noFill/>
+                          <a:prstDash val="solid"/>
+                          <a:round/>
+                          <a:headEnd type="none" w="med" len="med"/>
+                          <a:tailEnd type="none" w="med" len="med"/>
+                        </a:lnT>
+                        <a:lnB w="12700" cap="flat" cmpd="sng" algn="ctr">
+                          <a:noFill/>
+                          <a:prstDash val="solid"/>
+                          <a:round/>
+                          <a:headEnd type="none" w="med" len="med"/>
+                          <a:tailEnd type="none" w="med" len="med"/>
+                        </a:lnB>
+                        <a:lnTlToBr w="12700" cmpd="sng">
+                          <a:noFill/>
+                          <a:prstDash val="solid"/>
+                        </a:lnTlToBr>
+                        <a:lnBlToTr w="12700" cmpd="sng">
+                          <a:noFill/>
+                          <a:prstDash val="solid"/>
+                        </a:lnBlToTr>
+                        <a:noFill/>
+                      </a:tcPr>
+                    </a:tc>
+                    <a:tc>
+                      <a:txBody>
+                        <a:bodyPr/>
+                        <a:lstStyle/>
+                        <a:p>
+                          <a:pPr marL="0" marR="0" lvl="0" indent="0" algn="l" defTabSz="914400" rtl="0" eaLnBrk="1" fontAlgn="auto" latinLnBrk="0" hangingPunct="1">
+                            <a:lnSpc>
+                              <a:spcPct val="100000"/>
+                            </a:lnSpc>
+                            <a:spcBef>
+                              <a:spcPts val="0"/>
+                            </a:spcBef>
+                            <a:spcAft>
+                              <a:spcPts val="0"/>
+                            </a:spcAft>
+                            <a:buClrTx/>
+                            <a:buSzTx/>
+                            <a:buFontTx/>
+                            <a:buNone/>
+                            <a:tabLst/>
+                            <a:defRPr/>
+                          </a:pPr>
+                          <a14:m>
+                            <m:oMathPara xmlns:m="http://schemas.openxmlformats.org/officeDocument/2006/math">
+                              <m:oMathParaPr>
+                                <m:jc m:val="centerGroup"/>
+                              </m:oMathParaPr>
+                              <m:oMath xmlns:m="http://schemas.openxmlformats.org/officeDocument/2006/math">
+                                <m:r>
+                                  <a:rPr lang="en-US" sz="2400" smtClean="0">
+                                    <a:solidFill>
+                                      <a:schemeClr val="tx1"/>
+                                    </a:solidFill>
+                                    <a:latin typeface="Cambria Math" panose="02040503050406030204" pitchFamily="18" charset="0"/>
+                                  </a:rPr>
+                                  <m:t>(</m:t>
+                                </m:r>
+                                <m:sSub>
+                                  <m:sSubPr>
+                                    <m:ctrlPr>
+                                      <a:rPr lang="en-US" sz="2400" i="1">
+                                        <a:solidFill>
+                                          <a:schemeClr val="tx1"/>
+                                        </a:solidFill>
+                                        <a:latin typeface="Cambria Math" panose="02040503050406030204" pitchFamily="18" charset="0"/>
+                                      </a:rPr>
+                                    </m:ctrlPr>
+                                  </m:sSubPr>
+                                  <m:e>
+                                    <m:r>
+                                      <m:rPr>
+                                        <m:sty m:val="p"/>
+                                      </m:rPr>
+                                      <a:rPr lang="en-US" sz="2400">
+                                        <a:solidFill>
+                                          <a:schemeClr val="tx1"/>
+                                        </a:solidFill>
+                                        <a:latin typeface="Cambria Math" panose="02040503050406030204" pitchFamily="18" charset="0"/>
+                                      </a:rPr>
+                                      <m:t>s</m:t>
+                                    </m:r>
+                                  </m:e>
+                                  <m:sub>
+                                    <m:r>
+                                      <a:rPr lang="en-US" sz="2400">
+                                        <a:solidFill>
+                                          <a:schemeClr val="tx1"/>
+                                        </a:solidFill>
+                                        <a:latin typeface="Cambria Math" panose="02040503050406030204" pitchFamily="18" charset="0"/>
+                                      </a:rPr>
+                                      <m:t>1</m:t>
+                                    </m:r>
+                                  </m:sub>
+                                </m:sSub>
+                                <m:r>
+                                  <a:rPr lang="en-US" sz="2400">
+                                    <a:solidFill>
+                                      <a:schemeClr val="tx1"/>
+                                    </a:solidFill>
+                                    <a:latin typeface="Cambria Math" panose="02040503050406030204" pitchFamily="18" charset="0"/>
+                                  </a:rPr>
+                                  <m:t>,</m:t>
+                                </m:r>
+                                <m:sSub>
+                                  <m:sSubPr>
+                                    <m:ctrlPr>
+                                      <a:rPr lang="en-US" sz="2400" i="1">
+                                        <a:solidFill>
+                                          <a:schemeClr val="tx1"/>
+                                        </a:solidFill>
+                                        <a:latin typeface="Cambria Math" panose="02040503050406030204" pitchFamily="18" charset="0"/>
+                                      </a:rPr>
+                                    </m:ctrlPr>
+                                  </m:sSubPr>
+                                  <m:e>
+                                    <m:r>
+                                      <m:rPr>
+                                        <m:sty m:val="p"/>
+                                      </m:rPr>
+                                      <a:rPr lang="en-US" sz="2400">
+                                        <a:solidFill>
+                                          <a:schemeClr val="tx1"/>
+                                        </a:solidFill>
+                                        <a:latin typeface="Cambria Math" panose="02040503050406030204" pitchFamily="18" charset="0"/>
+                                      </a:rPr>
+                                      <m:t>s</m:t>
+                                    </m:r>
+                                  </m:e>
+                                  <m:sub>
+                                    <m:r>
+                                      <a:rPr lang="en-US" sz="2400">
+                                        <a:solidFill>
+                                          <a:schemeClr val="tx1"/>
+                                        </a:solidFill>
+                                        <a:latin typeface="Cambria Math" panose="02040503050406030204" pitchFamily="18" charset="0"/>
+                                      </a:rPr>
+                                      <m:t>2</m:t>
+                                    </m:r>
+                                  </m:sub>
+                                </m:sSub>
+                                <m:r>
+                                  <a:rPr lang="en-US" sz="2400">
+                                    <a:solidFill>
+                                      <a:schemeClr val="tx1"/>
+                                    </a:solidFill>
+                                    <a:latin typeface="Cambria Math" panose="02040503050406030204" pitchFamily="18" charset="0"/>
+                                  </a:rPr>
+                                  <m:t>)</m:t>
+                                </m:r>
+                              </m:oMath>
+                            </m:oMathPara>
+                          </a14:m>
+                          <a:endParaRPr lang="en-US" sz="2400" dirty="0">
+                            <a:solidFill>
+                              <a:schemeClr val="tx1"/>
+                            </a:solidFill>
+                          </a:endParaRPr>
+                        </a:p>
+                      </a:txBody>
+                      <a:tcPr marL="124041" marR="124041" marT="62021" marB="62021">
+                        <a:lnL w="12700" cap="flat" cmpd="sng" algn="ctr">
+                          <a:noFill/>
+                          <a:prstDash val="solid"/>
+                          <a:round/>
+                          <a:headEnd type="none" w="med" len="med"/>
+                          <a:tailEnd type="none" w="med" len="med"/>
+                        </a:lnL>
+                        <a:lnR w="12700" cap="flat" cmpd="sng" algn="ctr">
+                          <a:noFill/>
+                          <a:prstDash val="solid"/>
+                          <a:round/>
+                          <a:headEnd type="none" w="med" len="med"/>
+                          <a:tailEnd type="none" w="med" len="med"/>
+                        </a:lnR>
+                        <a:lnT w="12700" cap="flat" cmpd="sng" algn="ctr">
+                          <a:noFill/>
+                          <a:prstDash val="solid"/>
+                          <a:round/>
+                          <a:headEnd type="none" w="med" len="med"/>
+                          <a:tailEnd type="none" w="med" len="med"/>
+                        </a:lnT>
+                        <a:lnB w="12700" cap="flat" cmpd="sng" algn="ctr">
+                          <a:noFill/>
+                          <a:prstDash val="solid"/>
+                          <a:round/>
+                          <a:headEnd type="none" w="med" len="med"/>
+                          <a:tailEnd type="none" w="med" len="med"/>
+                        </a:lnB>
+                        <a:lnTlToBr w="12700" cmpd="sng">
+                          <a:noFill/>
+                          <a:prstDash val="solid"/>
+                        </a:lnTlToBr>
+                        <a:lnBlToTr w="12700" cmpd="sng">
+                          <a:noFill/>
+                          <a:prstDash val="solid"/>
+                        </a:lnBlToTr>
+                        <a:noFill/>
+                      </a:tcPr>
+                    </a:tc>
+                    <a:extLst>
+                      <a:ext uri="{0D108BD9-81ED-4DB2-BD59-A6C34878D82A}">
+                        <a16:rowId xmlns:a16="http://schemas.microsoft.com/office/drawing/2014/main" val="898271232"/>
+                      </a:ext>
+                    </a:extLst>
+                  </a:tr>
+                  <a:tr h="503056">
+                    <a:tc>
+                      <a:txBody>
+                        <a:bodyPr/>
+                        <a:lstStyle/>
+                        <a:p>
+                          <a:pPr algn="r"/>
+                          <a:r>
+                            <a:rPr lang="en-US" sz="2400" dirty="0">
+                              <a:solidFill>
+                                <a:schemeClr val="tx1"/>
+                              </a:solidFill>
+                            </a:rPr>
+                            <a:t>Dilation:</a:t>
+                          </a:r>
+                        </a:p>
+                      </a:txBody>
+                      <a:tcPr marL="124041" marR="124041" marT="62021" marB="62021">
+                        <a:lnL w="12700" cap="flat" cmpd="sng" algn="ctr">
+                          <a:noFill/>
+                          <a:prstDash val="solid"/>
+                          <a:round/>
+                          <a:headEnd type="none" w="med" len="med"/>
+                          <a:tailEnd type="none" w="med" len="med"/>
+                        </a:lnL>
+                        <a:lnR w="12700" cap="flat" cmpd="sng" algn="ctr">
+                          <a:noFill/>
+                          <a:prstDash val="solid"/>
+                          <a:round/>
+                          <a:headEnd type="none" w="med" len="med"/>
+                          <a:tailEnd type="none" w="med" len="med"/>
+                        </a:lnR>
+                        <a:lnT w="12700" cap="flat" cmpd="sng" algn="ctr">
+                          <a:noFill/>
+                          <a:prstDash val="solid"/>
+                          <a:round/>
+                          <a:headEnd type="none" w="med" len="med"/>
+                          <a:tailEnd type="none" w="med" len="med"/>
+                        </a:lnT>
+                        <a:lnB w="12700" cap="flat" cmpd="sng" algn="ctr">
+                          <a:noFill/>
+                          <a:prstDash val="solid"/>
+                          <a:round/>
+                          <a:headEnd type="none" w="med" len="med"/>
+                          <a:tailEnd type="none" w="med" len="med"/>
+                        </a:lnB>
+                        <a:lnTlToBr w="12700" cmpd="sng">
+                          <a:noFill/>
+                          <a:prstDash val="solid"/>
+                        </a:lnTlToBr>
+                        <a:lnBlToTr w="12700" cmpd="sng">
+                          <a:noFill/>
+                          <a:prstDash val="solid"/>
+                        </a:lnBlToTr>
+                        <a:noFill/>
+                      </a:tcPr>
+                    </a:tc>
+                    <a:tc>
+                      <a:txBody>
+                        <a:bodyPr/>
+                        <a:lstStyle/>
+                        <a:p>
+                          <a:pPr marL="0" marR="0" lvl="0" indent="0" algn="l" defTabSz="914400" rtl="0" eaLnBrk="1" fontAlgn="auto" latinLnBrk="0" hangingPunct="1">
+                            <a:lnSpc>
+                              <a:spcPct val="100000"/>
+                            </a:lnSpc>
+                            <a:spcBef>
+                              <a:spcPts val="0"/>
+                            </a:spcBef>
+                            <a:spcAft>
+                              <a:spcPts val="0"/>
+                            </a:spcAft>
+                            <a:buClrTx/>
+                            <a:buSzTx/>
+                            <a:buFontTx/>
+                            <a:buNone/>
+                            <a:tabLst/>
+                            <a:defRPr/>
+                          </a:pPr>
+                          <a14:m>
+                            <m:oMathPara xmlns:m="http://schemas.openxmlformats.org/officeDocument/2006/math">
+                              <m:oMathParaPr>
+                                <m:jc m:val="centerGroup"/>
+                              </m:oMathParaPr>
+                              <m:oMath xmlns:m="http://schemas.openxmlformats.org/officeDocument/2006/math">
+                                <m:r>
+                                  <a:rPr lang="en-US" sz="2400" b="0" i="0" smtClean="0">
+                                    <a:solidFill>
+                                      <a:schemeClr val="tx1"/>
+                                    </a:solidFill>
+                                    <a:latin typeface="Cambria Math" panose="02040503050406030204" pitchFamily="18" charset="0"/>
+                                  </a:rPr>
+                                  <m:t>(</m:t>
+                                </m:r>
+                                <m:sSub>
+                                  <m:sSubPr>
+                                    <m:ctrlPr>
+                                      <a:rPr lang="en-US" sz="2400" b="0" i="1" smtClean="0">
+                                        <a:solidFill>
+                                          <a:schemeClr val="tx1"/>
+                                        </a:solidFill>
+                                        <a:latin typeface="Cambria Math" panose="02040503050406030204" pitchFamily="18" charset="0"/>
+                                      </a:rPr>
+                                    </m:ctrlPr>
+                                  </m:sSubPr>
+                                  <m:e>
+                                    <m:r>
+                                      <a:rPr lang="en-US" sz="2400" b="0" i="1" smtClean="0">
+                                        <a:solidFill>
+                                          <a:schemeClr val="tx1"/>
+                                        </a:solidFill>
+                                        <a:latin typeface="Cambria Math" panose="02040503050406030204" pitchFamily="18" charset="0"/>
+                                      </a:rPr>
+                                      <m:t>𝑑</m:t>
+                                    </m:r>
+                                  </m:e>
+                                  <m:sub>
+                                    <m:r>
+                                      <a:rPr lang="en-US" sz="2400" b="0" i="1" smtClean="0">
+                                        <a:solidFill>
+                                          <a:schemeClr val="tx1"/>
+                                        </a:solidFill>
+                                        <a:latin typeface="Cambria Math" panose="02040503050406030204" pitchFamily="18" charset="0"/>
+                                      </a:rPr>
+                                      <m:t>1</m:t>
+                                    </m:r>
+                                  </m:sub>
+                                </m:sSub>
+                                <m:r>
+                                  <a:rPr lang="en-US" sz="2400" b="0" i="0" smtClean="0">
+                                    <a:solidFill>
+                                      <a:schemeClr val="tx1"/>
+                                    </a:solidFill>
+                                    <a:latin typeface="Cambria Math" panose="02040503050406030204" pitchFamily="18" charset="0"/>
+                                  </a:rPr>
+                                  <m:t>,</m:t>
+                                </m:r>
+                                <m:sSub>
+                                  <m:sSubPr>
+                                    <m:ctrlPr>
+                                      <a:rPr lang="en-US" sz="2400" b="0" i="1" smtClean="0">
+                                        <a:solidFill>
+                                          <a:schemeClr val="tx1"/>
+                                        </a:solidFill>
+                                        <a:latin typeface="Cambria Math" panose="02040503050406030204" pitchFamily="18" charset="0"/>
+                                      </a:rPr>
+                                    </m:ctrlPr>
+                                  </m:sSubPr>
+                                  <m:e>
+                                    <m:r>
+                                      <a:rPr lang="en-US" sz="2400" b="0" i="1" smtClean="0">
+                                        <a:solidFill>
+                                          <a:schemeClr val="tx1"/>
+                                        </a:solidFill>
+                                        <a:latin typeface="Cambria Math" panose="02040503050406030204" pitchFamily="18" charset="0"/>
+                                      </a:rPr>
+                                      <m:t>𝑑</m:t>
+                                    </m:r>
+                                  </m:e>
+                                  <m:sub>
+                                    <m:r>
+                                      <a:rPr lang="en-US" sz="2400" b="0" i="0" smtClean="0">
+                                        <a:solidFill>
+                                          <a:schemeClr val="tx1"/>
+                                        </a:solidFill>
+                                        <a:latin typeface="Cambria Math" panose="02040503050406030204" pitchFamily="18" charset="0"/>
+                                      </a:rPr>
+                                      <m:t>2</m:t>
+                                    </m:r>
+                                  </m:sub>
+                                </m:sSub>
+                                <m:r>
+                                  <a:rPr lang="en-US" sz="2400" b="0" i="0" smtClean="0">
+                                    <a:solidFill>
+                                      <a:schemeClr val="tx1"/>
+                                    </a:solidFill>
+                                    <a:latin typeface="Cambria Math" panose="02040503050406030204" pitchFamily="18" charset="0"/>
+                                  </a:rPr>
+                                  <m:t>)</m:t>
+                                </m:r>
+                              </m:oMath>
+                            </m:oMathPara>
+                          </a14:m>
+                          <a:endParaRPr lang="en-US" sz="2400" dirty="0">
+                            <a:solidFill>
+                              <a:schemeClr val="tx1"/>
+                            </a:solidFill>
+                          </a:endParaRPr>
+                        </a:p>
+                      </a:txBody>
+                      <a:tcPr marL="124041" marR="124041" marT="62021" marB="62021">
+                        <a:lnL w="12700" cap="flat" cmpd="sng" algn="ctr">
+                          <a:noFill/>
+                          <a:prstDash val="solid"/>
+                          <a:round/>
+                          <a:headEnd type="none" w="med" len="med"/>
+                          <a:tailEnd type="none" w="med" len="med"/>
+                        </a:lnL>
+                        <a:lnR w="12700" cap="flat" cmpd="sng" algn="ctr">
+                          <a:noFill/>
+                          <a:prstDash val="solid"/>
+                          <a:round/>
+                          <a:headEnd type="none" w="med" len="med"/>
+                          <a:tailEnd type="none" w="med" len="med"/>
+                        </a:lnR>
+                        <a:lnT w="12700" cap="flat" cmpd="sng" algn="ctr">
+                          <a:noFill/>
+                          <a:prstDash val="solid"/>
+                          <a:round/>
+                          <a:headEnd type="none" w="med" len="med"/>
+                          <a:tailEnd type="none" w="med" len="med"/>
+                        </a:lnT>
+                        <a:lnB w="12700" cap="flat" cmpd="sng" algn="ctr">
+                          <a:noFill/>
+                          <a:prstDash val="solid"/>
+                          <a:round/>
+                          <a:headEnd type="none" w="med" len="med"/>
+                          <a:tailEnd type="none" w="med" len="med"/>
+                        </a:lnB>
+                        <a:lnTlToBr w="12700" cmpd="sng">
+                          <a:noFill/>
+                          <a:prstDash val="solid"/>
+                        </a:lnTlToBr>
+                        <a:lnBlToTr w="12700" cmpd="sng">
+                          <a:noFill/>
+                          <a:prstDash val="solid"/>
+                        </a:lnBlToTr>
+                        <a:noFill/>
+                      </a:tcPr>
+                    </a:tc>
+                    <a:extLst>
+                      <a:ext uri="{0D108BD9-81ED-4DB2-BD59-A6C34878D82A}">
+                        <a16:rowId xmlns:a16="http://schemas.microsoft.com/office/drawing/2014/main" val="221637713"/>
+                      </a:ext>
+                    </a:extLst>
+                  </a:tr>
+                  <a:tr h="503056">
+                    <a:tc>
+                      <a:txBody>
+                        <a:bodyPr/>
+                        <a:lstStyle/>
+                        <a:p>
+                          <a:pPr algn="r"/>
+                          <a:r>
+                            <a:rPr lang="en-US" sz="2400" dirty="0">
+                              <a:solidFill>
+                                <a:schemeClr val="tx1"/>
+                              </a:solidFill>
+                            </a:rPr>
+                            <a:t>Output image:</a:t>
+                          </a:r>
+                        </a:p>
+                      </a:txBody>
+                      <a:tcPr marL="124041" marR="124041" marT="62021" marB="62021">
+                        <a:lnL w="12700" cap="flat" cmpd="sng" algn="ctr">
+                          <a:noFill/>
+                          <a:prstDash val="solid"/>
+                          <a:round/>
+                          <a:headEnd type="none" w="med" len="med"/>
+                          <a:tailEnd type="none" w="med" len="med"/>
+                        </a:lnL>
+                        <a:lnR w="12700" cap="flat" cmpd="sng" algn="ctr">
+                          <a:noFill/>
+                          <a:prstDash val="solid"/>
+                          <a:round/>
+                          <a:headEnd type="none" w="med" len="med"/>
+                          <a:tailEnd type="none" w="med" len="med"/>
+                        </a:lnR>
+                        <a:lnT w="12700" cap="flat" cmpd="sng" algn="ctr">
+                          <a:noFill/>
+                          <a:prstDash val="solid"/>
+                          <a:round/>
+                          <a:headEnd type="none" w="med" len="med"/>
+                          <a:tailEnd type="none" w="med" len="med"/>
+                        </a:lnT>
+                        <a:lnB w="12700" cap="flat" cmpd="sng" algn="ctr">
+                          <a:noFill/>
+                          <a:prstDash val="solid"/>
+                          <a:round/>
+                          <a:headEnd type="none" w="med" len="med"/>
+                          <a:tailEnd type="none" w="med" len="med"/>
+                        </a:lnB>
+                        <a:lnTlToBr w="12700" cmpd="sng">
+                          <a:noFill/>
+                          <a:prstDash val="solid"/>
+                        </a:lnTlToBr>
+                        <a:lnBlToTr w="12700" cmpd="sng">
+                          <a:noFill/>
+                          <a:prstDash val="solid"/>
+                        </a:lnBlToTr>
+                        <a:noFill/>
+                      </a:tcPr>
+                    </a:tc>
+                    <a:tc>
+                      <a:txBody>
+                        <a:bodyPr/>
+                        <a:lstStyle/>
+                        <a:p>
+                          <a14:m>
+                            <m:oMathPara xmlns:m="http://schemas.openxmlformats.org/officeDocument/2006/math">
+                              <m:oMathParaPr>
+                                <m:jc m:val="centerGroup"/>
+                              </m:oMathParaPr>
+                              <m:oMath xmlns:m="http://schemas.openxmlformats.org/officeDocument/2006/math">
+                                <m:r>
+                                  <a:rPr lang="en-US" sz="2400" b="0" i="0" smtClean="0">
+                                    <a:solidFill>
+                                      <a:schemeClr val="tx1"/>
+                                    </a:solidFill>
+                                    <a:latin typeface="Cambria Math" panose="02040503050406030204" pitchFamily="18" charset="0"/>
+                                  </a:rPr>
+                                  <m:t>(</m:t>
+                                </m:r>
+                                <m:r>
+                                  <a:rPr lang="en-US" sz="2400" b="0" i="1" smtClean="0">
+                                    <a:solidFill>
+                                      <a:schemeClr val="tx1"/>
+                                    </a:solidFill>
+                                    <a:latin typeface="Cambria Math" panose="02040503050406030204" pitchFamily="18" charset="0"/>
+                                  </a:rPr>
+                                  <m:t>𝑜𝑢</m:t>
+                                </m:r>
+                                <m:sSub>
+                                  <m:sSubPr>
+                                    <m:ctrlPr>
+                                      <a:rPr lang="en-US" sz="2400" b="0" i="1" smtClean="0">
+                                        <a:solidFill>
+                                          <a:schemeClr val="tx1"/>
+                                        </a:solidFill>
+                                        <a:latin typeface="Cambria Math" panose="02040503050406030204" pitchFamily="18" charset="0"/>
+                                      </a:rPr>
+                                    </m:ctrlPr>
+                                  </m:sSubPr>
+                                  <m:e>
+                                    <m:r>
+                                      <a:rPr lang="en-US" sz="2400" b="0" i="1" smtClean="0">
+                                        <a:solidFill>
+                                          <a:schemeClr val="tx1"/>
+                                        </a:solidFill>
+                                        <a:latin typeface="Cambria Math" panose="02040503050406030204" pitchFamily="18" charset="0"/>
+                                      </a:rPr>
+                                      <m:t>𝑡</m:t>
+                                    </m:r>
+                                  </m:e>
+                                  <m:sub>
+                                    <m:r>
+                                      <a:rPr lang="en-US" sz="2400" b="0" i="1" smtClean="0">
+                                        <a:solidFill>
+                                          <a:schemeClr val="tx1"/>
+                                        </a:solidFill>
+                                        <a:latin typeface="Cambria Math" panose="02040503050406030204" pitchFamily="18" charset="0"/>
+                                      </a:rPr>
+                                      <m:t>1</m:t>
+                                    </m:r>
+                                  </m:sub>
+                                </m:sSub>
+                                <m:r>
+                                  <a:rPr lang="en-US" sz="2400" b="0" i="1" smtClean="0">
+                                    <a:solidFill>
+                                      <a:schemeClr val="tx1"/>
+                                    </a:solidFill>
+                                    <a:latin typeface="Cambria Math" panose="02040503050406030204" pitchFamily="18" charset="0"/>
+                                  </a:rPr>
+                                  <m:t>,</m:t>
+                                </m:r>
+                                <m:r>
+                                  <a:rPr lang="en-US" sz="2400" b="0" i="1" smtClean="0">
+                                    <a:solidFill>
+                                      <a:schemeClr val="tx1"/>
+                                    </a:solidFill>
+                                    <a:latin typeface="Cambria Math" panose="02040503050406030204" pitchFamily="18" charset="0"/>
+                                  </a:rPr>
+                                  <m:t>𝑜𝑢</m:t>
+                                </m:r>
+                                <m:sSub>
+                                  <m:sSubPr>
+                                    <m:ctrlPr>
+                                      <a:rPr lang="en-US" sz="2400" b="0" i="1" smtClean="0">
+                                        <a:solidFill>
+                                          <a:schemeClr val="tx1"/>
+                                        </a:solidFill>
+                                        <a:latin typeface="Cambria Math" panose="02040503050406030204" pitchFamily="18" charset="0"/>
+                                      </a:rPr>
+                                    </m:ctrlPr>
+                                  </m:sSubPr>
+                                  <m:e>
+                                    <m:r>
+                                      <a:rPr lang="en-US" sz="2400" b="0" i="1" smtClean="0">
+                                        <a:solidFill>
+                                          <a:schemeClr val="tx1"/>
+                                        </a:solidFill>
+                                        <a:latin typeface="Cambria Math" panose="02040503050406030204" pitchFamily="18" charset="0"/>
+                                      </a:rPr>
+                                      <m:t>𝑡</m:t>
+                                    </m:r>
+                                  </m:e>
+                                  <m:sub>
+                                    <m:r>
+                                      <a:rPr lang="en-US" sz="2400" b="0" i="1" smtClean="0">
+                                        <a:solidFill>
+                                          <a:schemeClr val="tx1"/>
+                                        </a:solidFill>
+                                        <a:latin typeface="Cambria Math" panose="02040503050406030204" pitchFamily="18" charset="0"/>
+                                      </a:rPr>
+                                      <m:t>2</m:t>
+                                    </m:r>
+                                  </m:sub>
+                                </m:sSub>
+                                <m:r>
+                                  <a:rPr lang="en-US" sz="2400" b="0" i="1" smtClean="0">
+                                    <a:solidFill>
+                                      <a:schemeClr val="tx1"/>
+                                    </a:solidFill>
+                                    <a:latin typeface="Cambria Math" panose="02040503050406030204" pitchFamily="18" charset="0"/>
+                                  </a:rPr>
+                                  <m:t>)</m:t>
+                                </m:r>
+                              </m:oMath>
+                            </m:oMathPara>
+                          </a14:m>
+                          <a:endParaRPr lang="en-US" sz="2400" dirty="0">
+                            <a:solidFill>
+                              <a:schemeClr val="tx1"/>
+                            </a:solidFill>
+                          </a:endParaRPr>
+                        </a:p>
+                      </a:txBody>
+                      <a:tcPr marL="124041" marR="124041" marT="62021" marB="62021">
+                        <a:lnL w="12700" cap="flat" cmpd="sng" algn="ctr">
+                          <a:noFill/>
+                          <a:prstDash val="solid"/>
+                          <a:round/>
+                          <a:headEnd type="none" w="med" len="med"/>
+                          <a:tailEnd type="none" w="med" len="med"/>
+                        </a:lnL>
+                        <a:lnR w="12700" cap="flat" cmpd="sng" algn="ctr">
+                          <a:noFill/>
+                          <a:prstDash val="solid"/>
+                          <a:round/>
+                          <a:headEnd type="none" w="med" len="med"/>
+                          <a:tailEnd type="none" w="med" len="med"/>
+                        </a:lnR>
+                        <a:lnT w="12700" cap="flat" cmpd="sng" algn="ctr">
+                          <a:noFill/>
+                          <a:prstDash val="solid"/>
+                          <a:round/>
+                          <a:headEnd type="none" w="med" len="med"/>
+                          <a:tailEnd type="none" w="med" len="med"/>
+                        </a:lnT>
+                        <a:lnB w="12700" cap="flat" cmpd="sng" algn="ctr">
+                          <a:noFill/>
+                          <a:prstDash val="solid"/>
+                          <a:round/>
+                          <a:headEnd type="none" w="med" len="med"/>
+                          <a:tailEnd type="none" w="med" len="med"/>
+                        </a:lnB>
+                        <a:lnTlToBr w="12700" cmpd="sng">
+                          <a:noFill/>
+                          <a:prstDash val="solid"/>
+                        </a:lnTlToBr>
+                        <a:lnBlToTr w="12700" cmpd="sng">
+                          <a:noFill/>
+                          <a:prstDash val="solid"/>
+                        </a:lnBlToTr>
+                        <a:noFill/>
+                      </a:tcPr>
+                    </a:tc>
+                    <a:extLst>
+                      <a:ext uri="{0D108BD9-81ED-4DB2-BD59-A6C34878D82A}">
+                        <a16:rowId xmlns:a16="http://schemas.microsoft.com/office/drawing/2014/main" val="4135396076"/>
+                      </a:ext>
+                    </a:extLst>
+                  </a:tr>
+                  <a:tr h="503056">
+                    <a:tc>
+                      <a:txBody>
+                        <a:bodyPr/>
+                        <a:lstStyle/>
+                        <a:p>
+                          <a:pPr algn="r"/>
+                          <a:r>
+                            <a:rPr lang="en-US" sz="2400" dirty="0">
+                              <a:solidFill>
+                                <a:schemeClr val="tx1"/>
+                              </a:solidFill>
+                            </a:rPr>
+                            <a:t>Output padding:</a:t>
+                          </a:r>
+                        </a:p>
+                      </a:txBody>
+                      <a:tcPr marL="124041" marR="124041" marT="62021" marB="62021">
+                        <a:lnL w="12700" cap="flat" cmpd="sng" algn="ctr">
+                          <a:noFill/>
+                          <a:prstDash val="solid"/>
+                          <a:round/>
+                          <a:headEnd type="none" w="med" len="med"/>
+                          <a:tailEnd type="none" w="med" len="med"/>
+                        </a:lnL>
+                        <a:lnR w="12700" cap="flat" cmpd="sng" algn="ctr">
+                          <a:noFill/>
+                          <a:prstDash val="solid"/>
+                          <a:round/>
+                          <a:headEnd type="none" w="med" len="med"/>
+                          <a:tailEnd type="none" w="med" len="med"/>
+                        </a:lnR>
+                        <a:lnT w="12700" cap="flat" cmpd="sng" algn="ctr">
+                          <a:noFill/>
+                          <a:prstDash val="solid"/>
+                          <a:round/>
+                          <a:headEnd type="none" w="med" len="med"/>
+                          <a:tailEnd type="none" w="med" len="med"/>
+                        </a:lnT>
+                        <a:lnB w="12700" cap="flat" cmpd="sng" algn="ctr">
+                          <a:noFill/>
+                          <a:prstDash val="solid"/>
+                          <a:round/>
+                          <a:headEnd type="none" w="med" len="med"/>
+                          <a:tailEnd type="none" w="med" len="med"/>
+                        </a:lnB>
+                        <a:lnTlToBr w="12700" cmpd="sng">
+                          <a:noFill/>
+                          <a:prstDash val="solid"/>
+                        </a:lnTlToBr>
+                        <a:lnBlToTr w="12700" cmpd="sng">
+                          <a:noFill/>
+                          <a:prstDash val="solid"/>
+                        </a:lnBlToTr>
+                        <a:noFill/>
+                      </a:tcPr>
+                    </a:tc>
+                    <a:tc>
+                      <a:txBody>
+                        <a:bodyPr/>
+                        <a:lstStyle/>
+                        <a:p>
+                          <a:pPr marL="0" marR="0" lvl="0" indent="0" algn="l" defTabSz="914400" rtl="0" eaLnBrk="1" fontAlgn="auto" latinLnBrk="0" hangingPunct="1">
+                            <a:lnSpc>
+                              <a:spcPct val="100000"/>
+                            </a:lnSpc>
+                            <a:spcBef>
+                              <a:spcPts val="0"/>
+                            </a:spcBef>
+                            <a:spcAft>
+                              <a:spcPts val="0"/>
+                            </a:spcAft>
+                            <a:buClrTx/>
+                            <a:buSzTx/>
+                            <a:buFontTx/>
+                            <a:buNone/>
+                            <a:tabLst/>
+                            <a:defRPr/>
+                          </a:pPr>
+                          <a14:m>
+                            <m:oMathPara xmlns:m="http://schemas.openxmlformats.org/officeDocument/2006/math">
+                              <m:oMathParaPr>
+                                <m:jc m:val="centerGroup"/>
+                              </m:oMathParaPr>
+                              <m:oMath xmlns:m="http://schemas.openxmlformats.org/officeDocument/2006/math">
+                                <m:r>
+                                  <a:rPr lang="en-US" sz="2400" b="0" i="0" smtClean="0">
+                                    <a:solidFill>
+                                      <a:schemeClr val="tx1"/>
+                                    </a:solidFill>
+                                    <a:latin typeface="Cambria Math" panose="02040503050406030204" pitchFamily="18" charset="0"/>
+                                  </a:rPr>
+                                  <m:t>(</m:t>
+                                </m:r>
+                                <m:sSub>
+                                  <m:sSubPr>
+                                    <m:ctrlPr>
+                                      <a:rPr lang="en-US" sz="2400" b="0" i="1" smtClean="0">
+                                        <a:solidFill>
+                                          <a:schemeClr val="tx1"/>
+                                        </a:solidFill>
+                                        <a:latin typeface="Cambria Math" panose="02040503050406030204" pitchFamily="18" charset="0"/>
+                                      </a:rPr>
+                                    </m:ctrlPr>
+                                  </m:sSubPr>
+                                  <m:e>
+                                    <m:acc>
+                                      <m:accPr>
+                                        <m:chr m:val="̃"/>
+                                        <m:ctrlPr>
+                                          <a:rPr lang="en-US" sz="2400" b="0" i="1" smtClean="0">
+                                            <a:solidFill>
+                                              <a:schemeClr val="tx1"/>
+                                            </a:solidFill>
+                                            <a:latin typeface="Cambria Math" panose="02040503050406030204" pitchFamily="18" charset="0"/>
+                                          </a:rPr>
+                                        </m:ctrlPr>
+                                      </m:accPr>
+                                      <m:e>
+                                        <m:r>
+                                          <a:rPr lang="en-US" sz="2400" b="0" i="1" smtClean="0">
+                                            <a:solidFill>
+                                              <a:schemeClr val="tx1"/>
+                                            </a:solidFill>
+                                            <a:latin typeface="Cambria Math" panose="02040503050406030204" pitchFamily="18" charset="0"/>
+                                          </a:rPr>
+                                          <m:t>𝑝</m:t>
+                                        </m:r>
+                                      </m:e>
+                                    </m:acc>
+                                  </m:e>
+                                  <m:sub>
+                                    <m:r>
+                                      <a:rPr lang="en-US" sz="2400" b="0" i="1" smtClean="0">
+                                        <a:solidFill>
+                                          <a:schemeClr val="tx1"/>
+                                        </a:solidFill>
+                                        <a:latin typeface="Cambria Math" panose="02040503050406030204" pitchFamily="18" charset="0"/>
+                                      </a:rPr>
+                                      <m:t>1</m:t>
+                                    </m:r>
+                                  </m:sub>
+                                </m:sSub>
+                                <m:r>
+                                  <a:rPr lang="en-US" sz="2400" b="0" i="1" smtClean="0">
+                                    <a:solidFill>
+                                      <a:schemeClr val="tx1"/>
+                                    </a:solidFill>
+                                    <a:latin typeface="Cambria Math" panose="02040503050406030204" pitchFamily="18" charset="0"/>
+                                  </a:rPr>
+                                  <m:t>,</m:t>
+                                </m:r>
+                                <m:sSub>
+                                  <m:sSubPr>
+                                    <m:ctrlPr>
+                                      <a:rPr lang="en-US" sz="2400" b="0" i="1" smtClean="0">
+                                        <a:solidFill>
+                                          <a:schemeClr val="tx1"/>
+                                        </a:solidFill>
+                                        <a:latin typeface="Cambria Math" panose="02040503050406030204" pitchFamily="18" charset="0"/>
+                                      </a:rPr>
+                                    </m:ctrlPr>
+                                  </m:sSubPr>
+                                  <m:e>
+                                    <m:acc>
+                                      <m:accPr>
+                                        <m:chr m:val="̃"/>
+                                        <m:ctrlPr>
+                                          <a:rPr lang="en-US" sz="2400" b="0" i="1" smtClean="0">
+                                            <a:solidFill>
+                                              <a:schemeClr val="tx1"/>
+                                            </a:solidFill>
+                                            <a:latin typeface="Cambria Math" panose="02040503050406030204" pitchFamily="18" charset="0"/>
+                                          </a:rPr>
+                                        </m:ctrlPr>
+                                      </m:accPr>
+                                      <m:e>
+                                        <m:r>
+                                          <a:rPr lang="en-US" sz="2400" b="0" i="1" smtClean="0">
+                                            <a:solidFill>
+                                              <a:schemeClr val="tx1"/>
+                                            </a:solidFill>
+                                            <a:latin typeface="Cambria Math" panose="02040503050406030204" pitchFamily="18" charset="0"/>
+                                          </a:rPr>
+                                          <m:t>𝑝</m:t>
+                                        </m:r>
+                                      </m:e>
+                                    </m:acc>
+                                  </m:e>
+                                  <m:sub>
+                                    <m:r>
+                                      <a:rPr lang="en-US" sz="2400" b="0" i="1" smtClean="0">
+                                        <a:solidFill>
+                                          <a:schemeClr val="tx1"/>
+                                        </a:solidFill>
+                                        <a:latin typeface="Cambria Math" panose="02040503050406030204" pitchFamily="18" charset="0"/>
+                                      </a:rPr>
+                                      <m:t>2</m:t>
+                                    </m:r>
+                                  </m:sub>
+                                </m:sSub>
+                                <m:r>
+                                  <a:rPr lang="en-US" sz="2400" b="0" i="1" smtClean="0">
+                                    <a:solidFill>
+                                      <a:schemeClr val="tx1"/>
+                                    </a:solidFill>
+                                    <a:latin typeface="Cambria Math" panose="02040503050406030204" pitchFamily="18" charset="0"/>
+                                  </a:rPr>
+                                  <m:t>)</m:t>
+                                </m:r>
+                              </m:oMath>
+                            </m:oMathPara>
+                          </a14:m>
+                          <a:endParaRPr lang="en-US" sz="2400" dirty="0">
+                            <a:solidFill>
+                              <a:schemeClr val="tx1"/>
+                            </a:solidFill>
+                          </a:endParaRPr>
+                        </a:p>
+                      </a:txBody>
+                      <a:tcPr marL="124041" marR="124041" marT="62021" marB="62021">
+                        <a:lnL w="12700" cap="flat" cmpd="sng" algn="ctr">
+                          <a:noFill/>
+                          <a:prstDash val="solid"/>
+                          <a:round/>
+                          <a:headEnd type="none" w="med" len="med"/>
+                          <a:tailEnd type="none" w="med" len="med"/>
+                        </a:lnL>
+                        <a:lnR w="12700" cap="flat" cmpd="sng" algn="ctr">
+                          <a:noFill/>
+                          <a:prstDash val="solid"/>
+                          <a:round/>
+                          <a:headEnd type="none" w="med" len="med"/>
+                          <a:tailEnd type="none" w="med" len="med"/>
+                        </a:lnR>
+                        <a:lnT w="12700" cap="flat" cmpd="sng" algn="ctr">
+                          <a:noFill/>
+                          <a:prstDash val="solid"/>
+                          <a:round/>
+                          <a:headEnd type="none" w="med" len="med"/>
+                          <a:tailEnd type="none" w="med" len="med"/>
+                        </a:lnT>
+                        <a:lnB w="12700" cap="flat" cmpd="sng" algn="ctr">
+                          <a:noFill/>
+                          <a:prstDash val="solid"/>
+                          <a:round/>
+                          <a:headEnd type="none" w="med" len="med"/>
+                          <a:tailEnd type="none" w="med" len="med"/>
+                        </a:lnB>
+                        <a:lnTlToBr w="12700" cmpd="sng">
+                          <a:noFill/>
+                          <a:prstDash val="solid"/>
+                        </a:lnTlToBr>
+                        <a:lnBlToTr w="12700" cmpd="sng">
+                          <a:noFill/>
+                          <a:prstDash val="solid"/>
+                        </a:lnBlToTr>
+                        <a:noFill/>
+                      </a:tcPr>
+                    </a:tc>
+                    <a:extLst>
+                      <a:ext uri="{0D108BD9-81ED-4DB2-BD59-A6C34878D82A}">
+                        <a16:rowId xmlns:a16="http://schemas.microsoft.com/office/drawing/2014/main" val="2106922570"/>
+                      </a:ext>
+                    </a:extLst>
+                  </a:tr>
+                </a:tbl>
+              </a:graphicData>
+            </a:graphic>
+          </p:graphicFrame>
+        </mc:Choice>
+        <mc:Fallback>
+          <p:graphicFrame>
+            <p:nvGraphicFramePr>
+              <p:cNvPr id="4" name="Table 4">
+                <a:extLst>
+                  <a:ext uri="{FF2B5EF4-FFF2-40B4-BE49-F238E27FC236}">
+                    <a16:creationId xmlns:a16="http://schemas.microsoft.com/office/drawing/2014/main" id="{D1FCFCAB-B3D0-9841-4EDB-7C439FFFCDD6}"/>
+                  </a:ext>
+                </a:extLst>
+              </p:cNvPr>
+              <p:cNvGraphicFramePr>
+                <a:graphicFrameLocks noGrp="1"/>
+              </p:cNvGraphicFramePr>
+              <p:nvPr>
+                <p:extLst>
+                  <p:ext uri="{D42A27DB-BD31-4B8C-83A1-F6EECF244321}">
+                    <p14:modId xmlns:p14="http://schemas.microsoft.com/office/powerpoint/2010/main" val="234225056"/>
+                  </p:ext>
+                </p:extLst>
+              </p:nvPr>
+            </p:nvGraphicFramePr>
+            <p:xfrm>
+              <a:off x="3521423" y="1690688"/>
+              <a:ext cx="5149154" cy="3521392"/>
+            </p:xfrm>
+            <a:graphic>
+              <a:graphicData uri="http://schemas.openxmlformats.org/drawingml/2006/table">
+                <a:tbl>
+                  <a:tblPr firstRow="1" bandRow="1">
+                    <a:tableStyleId>{5C22544A-7EE6-4342-B048-85BDC9FD1C3A}</a:tableStyleId>
+                  </a:tblPr>
+                  <a:tblGrid>
+                    <a:gridCol w="2574577">
+                      <a:extLst>
+                        <a:ext uri="{9D8B030D-6E8A-4147-A177-3AD203B41FA5}">
+                          <a16:colId xmlns:a16="http://schemas.microsoft.com/office/drawing/2014/main" val="1867715976"/>
+                        </a:ext>
+                      </a:extLst>
+                    </a:gridCol>
+                    <a:gridCol w="2574577">
+                      <a:extLst>
+                        <a:ext uri="{9D8B030D-6E8A-4147-A177-3AD203B41FA5}">
+                          <a16:colId xmlns:a16="http://schemas.microsoft.com/office/drawing/2014/main" val="2067955847"/>
+                        </a:ext>
+                      </a:extLst>
+                    </a:gridCol>
+                  </a:tblGrid>
+                  <a:tr h="503056">
+                    <a:tc>
+                      <a:txBody>
+                        <a:bodyPr/>
+                        <a:lstStyle/>
+                        <a:p>
+                          <a:pPr marL="0" indent="0" algn="r">
+                            <a:buNone/>
+                          </a:pPr>
+                          <a:r>
+                            <a:rPr lang="en-US" sz="2400" b="0" dirty="0">
+                              <a:solidFill>
+                                <a:schemeClr val="tx1"/>
+                              </a:solidFill>
+                            </a:rPr>
+                            <a:t>Kernel:</a:t>
+                          </a:r>
+                        </a:p>
+                      </a:txBody>
+                      <a:tcPr marL="124041" marR="124041" marT="62021" marB="62021">
+                        <a:lnL w="12700" cap="flat" cmpd="sng" algn="ctr">
+                          <a:noFill/>
+                          <a:prstDash val="solid"/>
+                          <a:round/>
+                          <a:headEnd type="none" w="med" len="med"/>
+                          <a:tailEnd type="none" w="med" len="med"/>
+                        </a:lnL>
+                        <a:lnR w="12700" cap="flat" cmpd="sng" algn="ctr">
+                          <a:noFill/>
+                          <a:prstDash val="solid"/>
+                          <a:round/>
+                          <a:headEnd type="none" w="med" len="med"/>
+                          <a:tailEnd type="none" w="med" len="med"/>
+                        </a:lnR>
+                        <a:lnT w="12700" cap="flat" cmpd="sng" algn="ctr">
+                          <a:noFill/>
+                          <a:prstDash val="solid"/>
+                          <a:round/>
+                          <a:headEnd type="none" w="med" len="med"/>
+                          <a:tailEnd type="none" w="med" len="med"/>
+                        </a:lnT>
+                        <a:lnB w="12700" cap="flat" cmpd="sng" algn="ctr">
+                          <a:noFill/>
+                          <a:prstDash val="solid"/>
+                          <a:round/>
+                          <a:headEnd type="none" w="med" len="med"/>
+                          <a:tailEnd type="none" w="med" len="med"/>
+                        </a:lnB>
+                        <a:lnTlToBr w="12700" cmpd="sng">
+                          <a:noFill/>
+                          <a:prstDash val="solid"/>
+                        </a:lnTlToBr>
+                        <a:lnBlToTr w="12700" cmpd="sng">
+                          <a:noFill/>
+                          <a:prstDash val="solid"/>
+                        </a:lnBlToTr>
+                        <a:noFill/>
+                      </a:tcPr>
+                    </a:tc>
+                    <a:tc>
+                      <a:txBody>
+                        <a:bodyPr/>
+                        <a:lstStyle/>
+                        <a:p>
+                          <a:endParaRPr lang="en-US"/>
+                        </a:p>
+                      </a:txBody>
+                      <a:tcPr marL="124041" marR="124041" marT="62021" marB="62021">
+                        <a:lnL w="12700" cap="flat" cmpd="sng" algn="ctr">
+                          <a:noFill/>
+                          <a:prstDash val="solid"/>
+                          <a:round/>
+                          <a:headEnd type="none" w="med" len="med"/>
+                          <a:tailEnd type="none" w="med" len="med"/>
+                        </a:lnL>
+                        <a:lnR w="12700" cap="flat" cmpd="sng" algn="ctr">
+                          <a:noFill/>
+                          <a:prstDash val="solid"/>
+                          <a:round/>
+                          <a:headEnd type="none" w="med" len="med"/>
+                          <a:tailEnd type="none" w="med" len="med"/>
+                        </a:lnR>
+                        <a:lnT w="12700" cap="flat" cmpd="sng" algn="ctr">
+                          <a:noFill/>
+                          <a:prstDash val="solid"/>
+                          <a:round/>
+                          <a:headEnd type="none" w="med" len="med"/>
+                          <a:tailEnd type="none" w="med" len="med"/>
+                        </a:lnT>
+                        <a:lnB w="12700" cap="flat" cmpd="sng" algn="ctr">
+                          <a:noFill/>
+                          <a:prstDash val="solid"/>
+                          <a:round/>
+                          <a:headEnd type="none" w="med" len="med"/>
+                          <a:tailEnd type="none" w="med" len="med"/>
+                        </a:lnB>
+                        <a:lnTlToBr w="12700" cmpd="sng">
+                          <a:noFill/>
+                          <a:prstDash val="solid"/>
+                        </a:lnTlToBr>
+                        <a:lnBlToTr w="12700" cmpd="sng">
+                          <a:noFill/>
+                          <a:prstDash val="solid"/>
+                        </a:lnBlToTr>
+                        <a:blipFill>
+                          <a:blip r:embed="rId4"/>
+                          <a:stretch>
+                            <a:fillRect l="-100000" t="-6024" b="-618072"/>
+                          </a:stretch>
+                        </a:blipFill>
+                      </a:tcPr>
+                    </a:tc>
+                    <a:extLst>
+                      <a:ext uri="{0D108BD9-81ED-4DB2-BD59-A6C34878D82A}">
+                        <a16:rowId xmlns:a16="http://schemas.microsoft.com/office/drawing/2014/main" val="447519452"/>
+                      </a:ext>
+                    </a:extLst>
+                  </a:tr>
+                  <a:tr h="503056">
+                    <a:tc>
+                      <a:txBody>
+                        <a:bodyPr/>
+                        <a:lstStyle/>
+                        <a:p>
+                          <a:pPr algn="r"/>
+                          <a:r>
+                            <a:rPr lang="en-US" sz="2400" dirty="0">
+                              <a:solidFill>
+                                <a:schemeClr val="tx1"/>
+                              </a:solidFill>
+                            </a:rPr>
+                            <a:t>Input image: </a:t>
+                          </a:r>
+                        </a:p>
+                      </a:txBody>
+                      <a:tcPr marL="124041" marR="124041" marT="62021" marB="62021">
+                        <a:lnL w="12700" cap="flat" cmpd="sng" algn="ctr">
+                          <a:noFill/>
+                          <a:prstDash val="solid"/>
+                          <a:round/>
+                          <a:headEnd type="none" w="med" len="med"/>
+                          <a:tailEnd type="none" w="med" len="med"/>
+                        </a:lnL>
+                        <a:lnR w="12700" cap="flat" cmpd="sng" algn="ctr">
+                          <a:noFill/>
+                          <a:prstDash val="solid"/>
+                          <a:round/>
+                          <a:headEnd type="none" w="med" len="med"/>
+                          <a:tailEnd type="none" w="med" len="med"/>
+                        </a:lnR>
+                        <a:lnT w="12700" cap="flat" cmpd="sng" algn="ctr">
+                          <a:noFill/>
+                          <a:prstDash val="solid"/>
+                          <a:round/>
+                          <a:headEnd type="none" w="med" len="med"/>
+                          <a:tailEnd type="none" w="med" len="med"/>
+                        </a:lnT>
+                        <a:lnB w="12700" cap="flat" cmpd="sng" algn="ctr">
+                          <a:noFill/>
+                          <a:prstDash val="solid"/>
+                          <a:round/>
+                          <a:headEnd type="none" w="med" len="med"/>
+                          <a:tailEnd type="none" w="med" len="med"/>
+                        </a:lnB>
+                        <a:lnTlToBr w="12700" cmpd="sng">
+                          <a:noFill/>
+                          <a:prstDash val="solid"/>
+                        </a:lnTlToBr>
+                        <a:lnBlToTr w="12700" cmpd="sng">
+                          <a:noFill/>
+                          <a:prstDash val="solid"/>
+                        </a:lnBlToTr>
+                        <a:noFill/>
+                      </a:tcPr>
+                    </a:tc>
+                    <a:tc>
+                      <a:txBody>
+                        <a:bodyPr/>
+                        <a:lstStyle/>
+                        <a:p>
+                          <a:endParaRPr lang="en-US"/>
+                        </a:p>
+                      </a:txBody>
+                      <a:tcPr marL="124041" marR="124041" marT="62021" marB="62021">
+                        <a:lnL w="12700" cap="flat" cmpd="sng" algn="ctr">
+                          <a:noFill/>
+                          <a:prstDash val="solid"/>
+                          <a:round/>
+                          <a:headEnd type="none" w="med" len="med"/>
+                          <a:tailEnd type="none" w="med" len="med"/>
+                        </a:lnL>
+                        <a:lnR w="12700" cap="flat" cmpd="sng" algn="ctr">
+                          <a:noFill/>
+                          <a:prstDash val="solid"/>
+                          <a:round/>
+                          <a:headEnd type="none" w="med" len="med"/>
+                          <a:tailEnd type="none" w="med" len="med"/>
+                        </a:lnR>
+                        <a:lnT w="12700" cap="flat" cmpd="sng" algn="ctr">
+                          <a:noFill/>
+                          <a:prstDash val="solid"/>
+                          <a:round/>
+                          <a:headEnd type="none" w="med" len="med"/>
+                          <a:tailEnd type="none" w="med" len="med"/>
+                        </a:lnT>
+                        <a:lnB w="12700" cap="flat" cmpd="sng" algn="ctr">
+                          <a:noFill/>
+                          <a:prstDash val="solid"/>
+                          <a:round/>
+                          <a:headEnd type="none" w="med" len="med"/>
+                          <a:tailEnd type="none" w="med" len="med"/>
+                        </a:lnB>
+                        <a:lnTlToBr w="12700" cmpd="sng">
+                          <a:noFill/>
+                          <a:prstDash val="solid"/>
+                        </a:lnTlToBr>
+                        <a:lnBlToTr w="12700" cmpd="sng">
+                          <a:noFill/>
+                          <a:prstDash val="solid"/>
+                        </a:lnBlToTr>
+                        <a:blipFill>
+                          <a:blip r:embed="rId4"/>
+                          <a:stretch>
+                            <a:fillRect l="-100000" t="-107317" b="-525610"/>
+                          </a:stretch>
+                        </a:blipFill>
+                      </a:tcPr>
+                    </a:tc>
+                    <a:extLst>
+                      <a:ext uri="{0D108BD9-81ED-4DB2-BD59-A6C34878D82A}">
+                        <a16:rowId xmlns:a16="http://schemas.microsoft.com/office/drawing/2014/main" val="1623022831"/>
+                      </a:ext>
+                    </a:extLst>
+                  </a:tr>
+                  <a:tr h="503056">
+                    <a:tc>
+                      <a:txBody>
+                        <a:bodyPr/>
+                        <a:lstStyle/>
+                        <a:p>
+                          <a:pPr algn="r"/>
+                          <a:r>
+                            <a:rPr lang="en-US" sz="2400" dirty="0">
+                              <a:solidFill>
+                                <a:schemeClr val="tx1"/>
+                              </a:solidFill>
+                            </a:rPr>
+                            <a:t>Padding:</a:t>
+                          </a:r>
+                        </a:p>
+                      </a:txBody>
+                      <a:tcPr marL="124041" marR="124041" marT="62021" marB="62021">
+                        <a:lnL w="12700" cap="flat" cmpd="sng" algn="ctr">
+                          <a:noFill/>
+                          <a:prstDash val="solid"/>
+                          <a:round/>
+                          <a:headEnd type="none" w="med" len="med"/>
+                          <a:tailEnd type="none" w="med" len="med"/>
+                        </a:lnL>
+                        <a:lnR w="12700" cap="flat" cmpd="sng" algn="ctr">
+                          <a:noFill/>
+                          <a:prstDash val="solid"/>
+                          <a:round/>
+                          <a:headEnd type="none" w="med" len="med"/>
+                          <a:tailEnd type="none" w="med" len="med"/>
+                        </a:lnR>
+                        <a:lnT w="12700" cap="flat" cmpd="sng" algn="ctr">
+                          <a:noFill/>
+                          <a:prstDash val="solid"/>
+                          <a:round/>
+                          <a:headEnd type="none" w="med" len="med"/>
+                          <a:tailEnd type="none" w="med" len="med"/>
+                        </a:lnT>
+                        <a:lnB w="12700" cap="flat" cmpd="sng" algn="ctr">
+                          <a:noFill/>
+                          <a:prstDash val="solid"/>
+                          <a:round/>
+                          <a:headEnd type="none" w="med" len="med"/>
+                          <a:tailEnd type="none" w="med" len="med"/>
+                        </a:lnB>
+                        <a:lnTlToBr w="12700" cmpd="sng">
+                          <a:noFill/>
+                          <a:prstDash val="solid"/>
+                        </a:lnTlToBr>
+                        <a:lnBlToTr w="12700" cmpd="sng">
+                          <a:noFill/>
+                          <a:prstDash val="solid"/>
+                        </a:lnBlToTr>
+                        <a:noFill/>
+                      </a:tcPr>
+                    </a:tc>
+                    <a:tc>
+                      <a:txBody>
+                        <a:bodyPr/>
+                        <a:lstStyle/>
+                        <a:p>
+                          <a:endParaRPr lang="en-US"/>
+                        </a:p>
+                      </a:txBody>
+                      <a:tcPr marL="124041" marR="124041" marT="62021" marB="62021">
+                        <a:lnL w="12700" cap="flat" cmpd="sng" algn="ctr">
+                          <a:noFill/>
+                          <a:prstDash val="solid"/>
+                          <a:round/>
+                          <a:headEnd type="none" w="med" len="med"/>
+                          <a:tailEnd type="none" w="med" len="med"/>
+                        </a:lnL>
+                        <a:lnR w="12700" cap="flat" cmpd="sng" algn="ctr">
+                          <a:noFill/>
+                          <a:prstDash val="solid"/>
+                          <a:round/>
+                          <a:headEnd type="none" w="med" len="med"/>
+                          <a:tailEnd type="none" w="med" len="med"/>
+                        </a:lnR>
+                        <a:lnT w="12700" cap="flat" cmpd="sng" algn="ctr">
+                          <a:noFill/>
+                          <a:prstDash val="solid"/>
+                          <a:round/>
+                          <a:headEnd type="none" w="med" len="med"/>
+                          <a:tailEnd type="none" w="med" len="med"/>
+                        </a:lnT>
+                        <a:lnB w="12700" cap="flat" cmpd="sng" algn="ctr">
+                          <a:noFill/>
+                          <a:prstDash val="solid"/>
+                          <a:round/>
+                          <a:headEnd type="none" w="med" len="med"/>
+                          <a:tailEnd type="none" w="med" len="med"/>
+                        </a:lnB>
+                        <a:lnTlToBr w="12700" cmpd="sng">
+                          <a:noFill/>
+                          <a:prstDash val="solid"/>
+                        </a:lnTlToBr>
+                        <a:lnBlToTr w="12700" cmpd="sng">
+                          <a:noFill/>
+                          <a:prstDash val="solid"/>
+                        </a:lnBlToTr>
+                        <a:blipFill>
+                          <a:blip r:embed="rId4"/>
+                          <a:stretch>
+                            <a:fillRect l="-100000" t="-204819" b="-419277"/>
+                          </a:stretch>
+                        </a:blipFill>
+                      </a:tcPr>
+                    </a:tc>
+                    <a:extLst>
+                      <a:ext uri="{0D108BD9-81ED-4DB2-BD59-A6C34878D82A}">
+                        <a16:rowId xmlns:a16="http://schemas.microsoft.com/office/drawing/2014/main" val="4005437046"/>
+                      </a:ext>
+                    </a:extLst>
+                  </a:tr>
+                  <a:tr h="503056">
+                    <a:tc>
+                      <a:txBody>
+                        <a:bodyPr/>
+                        <a:lstStyle/>
+                        <a:p>
+                          <a:pPr algn="r"/>
+                          <a:r>
+                            <a:rPr lang="en-US" sz="2400" dirty="0">
+                              <a:solidFill>
+                                <a:schemeClr val="tx1"/>
+                              </a:solidFill>
+                            </a:rPr>
+                            <a:t>Striding:</a:t>
+                          </a:r>
+                        </a:p>
+                      </a:txBody>
+                      <a:tcPr marL="124041" marR="124041" marT="62021" marB="62021">
+                        <a:lnL w="12700" cap="flat" cmpd="sng" algn="ctr">
+                          <a:noFill/>
+                          <a:prstDash val="solid"/>
+                          <a:round/>
+                          <a:headEnd type="none" w="med" len="med"/>
+                          <a:tailEnd type="none" w="med" len="med"/>
+                        </a:lnL>
+                        <a:lnR w="12700" cap="flat" cmpd="sng" algn="ctr">
+                          <a:noFill/>
+                          <a:prstDash val="solid"/>
+                          <a:round/>
+                          <a:headEnd type="none" w="med" len="med"/>
+                          <a:tailEnd type="none" w="med" len="med"/>
+                        </a:lnR>
+                        <a:lnT w="12700" cap="flat" cmpd="sng" algn="ctr">
+                          <a:noFill/>
+                          <a:prstDash val="solid"/>
+                          <a:round/>
+                          <a:headEnd type="none" w="med" len="med"/>
+                          <a:tailEnd type="none" w="med" len="med"/>
+                        </a:lnT>
+                        <a:lnB w="12700" cap="flat" cmpd="sng" algn="ctr">
+                          <a:noFill/>
+                          <a:prstDash val="solid"/>
+                          <a:round/>
+                          <a:headEnd type="none" w="med" len="med"/>
+                          <a:tailEnd type="none" w="med" len="med"/>
+                        </a:lnB>
+                        <a:lnTlToBr w="12700" cmpd="sng">
+                          <a:noFill/>
+                          <a:prstDash val="solid"/>
+                        </a:lnTlToBr>
+                        <a:lnBlToTr w="12700" cmpd="sng">
+                          <a:noFill/>
+                          <a:prstDash val="solid"/>
+                        </a:lnBlToTr>
+                        <a:noFill/>
+                      </a:tcPr>
+                    </a:tc>
+                    <a:tc>
+                      <a:txBody>
+                        <a:bodyPr/>
+                        <a:lstStyle/>
+                        <a:p>
+                          <a:endParaRPr lang="en-US"/>
+                        </a:p>
+                      </a:txBody>
+                      <a:tcPr marL="124041" marR="124041" marT="62021" marB="62021">
+                        <a:lnL w="12700" cap="flat" cmpd="sng" algn="ctr">
+                          <a:noFill/>
+                          <a:prstDash val="solid"/>
+                          <a:round/>
+                          <a:headEnd type="none" w="med" len="med"/>
+                          <a:tailEnd type="none" w="med" len="med"/>
+                        </a:lnL>
+                        <a:lnR w="12700" cap="flat" cmpd="sng" algn="ctr">
+                          <a:noFill/>
+                          <a:prstDash val="solid"/>
+                          <a:round/>
+                          <a:headEnd type="none" w="med" len="med"/>
+                          <a:tailEnd type="none" w="med" len="med"/>
+                        </a:lnR>
+                        <a:lnT w="12700" cap="flat" cmpd="sng" algn="ctr">
+                          <a:noFill/>
+                          <a:prstDash val="solid"/>
+                          <a:round/>
+                          <a:headEnd type="none" w="med" len="med"/>
+                          <a:tailEnd type="none" w="med" len="med"/>
+                        </a:lnT>
+                        <a:lnB w="12700" cap="flat" cmpd="sng" algn="ctr">
+                          <a:noFill/>
+                          <a:prstDash val="solid"/>
+                          <a:round/>
+                          <a:headEnd type="none" w="med" len="med"/>
+                          <a:tailEnd type="none" w="med" len="med"/>
+                        </a:lnB>
+                        <a:lnTlToBr w="12700" cmpd="sng">
+                          <a:noFill/>
+                          <a:prstDash val="solid"/>
+                        </a:lnTlToBr>
+                        <a:lnBlToTr w="12700" cmpd="sng">
+                          <a:noFill/>
+                          <a:prstDash val="solid"/>
+                        </a:lnBlToTr>
+                        <a:blipFill>
+                          <a:blip r:embed="rId4"/>
+                          <a:stretch>
+                            <a:fillRect l="-100000" t="-308537" b="-324390"/>
+                          </a:stretch>
+                        </a:blipFill>
+                      </a:tcPr>
+                    </a:tc>
+                    <a:extLst>
+                      <a:ext uri="{0D108BD9-81ED-4DB2-BD59-A6C34878D82A}">
+                        <a16:rowId xmlns:a16="http://schemas.microsoft.com/office/drawing/2014/main" val="898271232"/>
+                      </a:ext>
+                    </a:extLst>
+                  </a:tr>
+                  <a:tr h="503056">
+                    <a:tc>
+                      <a:txBody>
+                        <a:bodyPr/>
+                        <a:lstStyle/>
+                        <a:p>
+                          <a:pPr algn="r"/>
+                          <a:r>
+                            <a:rPr lang="en-US" sz="2400" dirty="0">
+                              <a:solidFill>
+                                <a:schemeClr val="tx1"/>
+                              </a:solidFill>
+                            </a:rPr>
+                            <a:t>Dilation:</a:t>
+                          </a:r>
+                        </a:p>
+                      </a:txBody>
+                      <a:tcPr marL="124041" marR="124041" marT="62021" marB="62021">
+                        <a:lnL w="12700" cap="flat" cmpd="sng" algn="ctr">
+                          <a:noFill/>
+                          <a:prstDash val="solid"/>
+                          <a:round/>
+                          <a:headEnd type="none" w="med" len="med"/>
+                          <a:tailEnd type="none" w="med" len="med"/>
+                        </a:lnL>
+                        <a:lnR w="12700" cap="flat" cmpd="sng" algn="ctr">
+                          <a:noFill/>
+                          <a:prstDash val="solid"/>
+                          <a:round/>
+                          <a:headEnd type="none" w="med" len="med"/>
+                          <a:tailEnd type="none" w="med" len="med"/>
+                        </a:lnR>
+                        <a:lnT w="12700" cap="flat" cmpd="sng" algn="ctr">
+                          <a:noFill/>
+                          <a:prstDash val="solid"/>
+                          <a:round/>
+                          <a:headEnd type="none" w="med" len="med"/>
+                          <a:tailEnd type="none" w="med" len="med"/>
+                        </a:lnT>
+                        <a:lnB w="12700" cap="flat" cmpd="sng" algn="ctr">
+                          <a:noFill/>
+                          <a:prstDash val="solid"/>
+                          <a:round/>
+                          <a:headEnd type="none" w="med" len="med"/>
+                          <a:tailEnd type="none" w="med" len="med"/>
+                        </a:lnB>
+                        <a:lnTlToBr w="12700" cmpd="sng">
+                          <a:noFill/>
+                          <a:prstDash val="solid"/>
+                        </a:lnTlToBr>
+                        <a:lnBlToTr w="12700" cmpd="sng">
+                          <a:noFill/>
+                          <a:prstDash val="solid"/>
+                        </a:lnBlToTr>
+                        <a:noFill/>
+                      </a:tcPr>
+                    </a:tc>
+                    <a:tc>
+                      <a:txBody>
+                        <a:bodyPr/>
+                        <a:lstStyle/>
+                        <a:p>
+                          <a:endParaRPr lang="en-US"/>
+                        </a:p>
+                      </a:txBody>
+                      <a:tcPr marL="124041" marR="124041" marT="62021" marB="62021">
+                        <a:lnL w="12700" cap="flat" cmpd="sng" algn="ctr">
+                          <a:noFill/>
+                          <a:prstDash val="solid"/>
+                          <a:round/>
+                          <a:headEnd type="none" w="med" len="med"/>
+                          <a:tailEnd type="none" w="med" len="med"/>
+                        </a:lnL>
+                        <a:lnR w="12700" cap="flat" cmpd="sng" algn="ctr">
+                          <a:noFill/>
+                          <a:prstDash val="solid"/>
+                          <a:round/>
+                          <a:headEnd type="none" w="med" len="med"/>
+                          <a:tailEnd type="none" w="med" len="med"/>
+                        </a:lnR>
+                        <a:lnT w="12700" cap="flat" cmpd="sng" algn="ctr">
+                          <a:noFill/>
+                          <a:prstDash val="solid"/>
+                          <a:round/>
+                          <a:headEnd type="none" w="med" len="med"/>
+                          <a:tailEnd type="none" w="med" len="med"/>
+                        </a:lnT>
+                        <a:lnB w="12700" cap="flat" cmpd="sng" algn="ctr">
+                          <a:noFill/>
+                          <a:prstDash val="solid"/>
+                          <a:round/>
+                          <a:headEnd type="none" w="med" len="med"/>
+                          <a:tailEnd type="none" w="med" len="med"/>
+                        </a:lnB>
+                        <a:lnTlToBr w="12700" cmpd="sng">
+                          <a:noFill/>
+                          <a:prstDash val="solid"/>
+                        </a:lnTlToBr>
+                        <a:lnBlToTr w="12700" cmpd="sng">
+                          <a:noFill/>
+                          <a:prstDash val="solid"/>
+                        </a:lnBlToTr>
+                        <a:blipFill>
+                          <a:blip r:embed="rId4"/>
+                          <a:stretch>
+                            <a:fillRect l="-100000" t="-403614" b="-220482"/>
+                          </a:stretch>
+                        </a:blipFill>
+                      </a:tcPr>
+                    </a:tc>
+                    <a:extLst>
+                      <a:ext uri="{0D108BD9-81ED-4DB2-BD59-A6C34878D82A}">
+                        <a16:rowId xmlns:a16="http://schemas.microsoft.com/office/drawing/2014/main" val="221637713"/>
+                      </a:ext>
+                    </a:extLst>
+                  </a:tr>
+                  <a:tr h="503056">
+                    <a:tc>
+                      <a:txBody>
+                        <a:bodyPr/>
+                        <a:lstStyle/>
+                        <a:p>
+                          <a:pPr algn="r"/>
+                          <a:r>
+                            <a:rPr lang="en-US" sz="2400" dirty="0">
+                              <a:solidFill>
+                                <a:schemeClr val="tx1"/>
+                              </a:solidFill>
+                            </a:rPr>
+                            <a:t>Output image:</a:t>
+                          </a:r>
+                        </a:p>
+                      </a:txBody>
+                      <a:tcPr marL="124041" marR="124041" marT="62021" marB="62021">
+                        <a:lnL w="12700" cap="flat" cmpd="sng" algn="ctr">
+                          <a:noFill/>
+                          <a:prstDash val="solid"/>
+                          <a:round/>
+                          <a:headEnd type="none" w="med" len="med"/>
+                          <a:tailEnd type="none" w="med" len="med"/>
+                        </a:lnL>
+                        <a:lnR w="12700" cap="flat" cmpd="sng" algn="ctr">
+                          <a:noFill/>
+                          <a:prstDash val="solid"/>
+                          <a:round/>
+                          <a:headEnd type="none" w="med" len="med"/>
+                          <a:tailEnd type="none" w="med" len="med"/>
+                        </a:lnR>
+                        <a:lnT w="12700" cap="flat" cmpd="sng" algn="ctr">
+                          <a:noFill/>
+                          <a:prstDash val="solid"/>
+                          <a:round/>
+                          <a:headEnd type="none" w="med" len="med"/>
+                          <a:tailEnd type="none" w="med" len="med"/>
+                        </a:lnT>
+                        <a:lnB w="12700" cap="flat" cmpd="sng" algn="ctr">
+                          <a:noFill/>
+                          <a:prstDash val="solid"/>
+                          <a:round/>
+                          <a:headEnd type="none" w="med" len="med"/>
+                          <a:tailEnd type="none" w="med" len="med"/>
+                        </a:lnB>
+                        <a:lnTlToBr w="12700" cmpd="sng">
+                          <a:noFill/>
+                          <a:prstDash val="solid"/>
+                        </a:lnTlToBr>
+                        <a:lnBlToTr w="12700" cmpd="sng">
+                          <a:noFill/>
+                          <a:prstDash val="solid"/>
+                        </a:lnBlToTr>
+                        <a:noFill/>
+                      </a:tcPr>
+                    </a:tc>
+                    <a:tc>
+                      <a:txBody>
+                        <a:bodyPr/>
+                        <a:lstStyle/>
+                        <a:p>
+                          <a:endParaRPr lang="en-US"/>
+                        </a:p>
+                      </a:txBody>
+                      <a:tcPr marL="124041" marR="124041" marT="62021" marB="62021">
+                        <a:lnL w="12700" cap="flat" cmpd="sng" algn="ctr">
+                          <a:noFill/>
+                          <a:prstDash val="solid"/>
+                          <a:round/>
+                          <a:headEnd type="none" w="med" len="med"/>
+                          <a:tailEnd type="none" w="med" len="med"/>
+                        </a:lnL>
+                        <a:lnR w="12700" cap="flat" cmpd="sng" algn="ctr">
+                          <a:noFill/>
+                          <a:prstDash val="solid"/>
+                          <a:round/>
+                          <a:headEnd type="none" w="med" len="med"/>
+                          <a:tailEnd type="none" w="med" len="med"/>
+                        </a:lnR>
+                        <a:lnT w="12700" cap="flat" cmpd="sng" algn="ctr">
+                          <a:noFill/>
+                          <a:prstDash val="solid"/>
+                          <a:round/>
+                          <a:headEnd type="none" w="med" len="med"/>
+                          <a:tailEnd type="none" w="med" len="med"/>
+                        </a:lnT>
+                        <a:lnB w="12700" cap="flat" cmpd="sng" algn="ctr">
+                          <a:noFill/>
+                          <a:prstDash val="solid"/>
+                          <a:round/>
+                          <a:headEnd type="none" w="med" len="med"/>
+                          <a:tailEnd type="none" w="med" len="med"/>
+                        </a:lnB>
+                        <a:lnTlToBr w="12700" cmpd="sng">
+                          <a:noFill/>
+                          <a:prstDash val="solid"/>
+                        </a:lnTlToBr>
+                        <a:lnBlToTr w="12700" cmpd="sng">
+                          <a:noFill/>
+                          <a:prstDash val="solid"/>
+                        </a:lnBlToTr>
+                        <a:blipFill>
+                          <a:blip r:embed="rId4"/>
+                          <a:stretch>
+                            <a:fillRect l="-100000" t="-509756" b="-123171"/>
+                          </a:stretch>
+                        </a:blipFill>
+                      </a:tcPr>
+                    </a:tc>
+                    <a:extLst>
+                      <a:ext uri="{0D108BD9-81ED-4DB2-BD59-A6C34878D82A}">
+                        <a16:rowId xmlns:a16="http://schemas.microsoft.com/office/drawing/2014/main" val="4135396076"/>
+                      </a:ext>
+                    </a:extLst>
+                  </a:tr>
+                  <a:tr h="503056">
+                    <a:tc>
+                      <a:txBody>
+                        <a:bodyPr/>
+                        <a:lstStyle/>
+                        <a:p>
+                          <a:pPr algn="r"/>
+                          <a:r>
+                            <a:rPr lang="en-US" sz="2400" dirty="0">
+                              <a:solidFill>
+                                <a:schemeClr val="tx1"/>
+                              </a:solidFill>
+                            </a:rPr>
+                            <a:t>Output padding:</a:t>
+                          </a:r>
+                        </a:p>
+                      </a:txBody>
+                      <a:tcPr marL="124041" marR="124041" marT="62021" marB="62021">
+                        <a:lnL w="12700" cap="flat" cmpd="sng" algn="ctr">
+                          <a:noFill/>
+                          <a:prstDash val="solid"/>
+                          <a:round/>
+                          <a:headEnd type="none" w="med" len="med"/>
+                          <a:tailEnd type="none" w="med" len="med"/>
+                        </a:lnL>
+                        <a:lnR w="12700" cap="flat" cmpd="sng" algn="ctr">
+                          <a:noFill/>
+                          <a:prstDash val="solid"/>
+                          <a:round/>
+                          <a:headEnd type="none" w="med" len="med"/>
+                          <a:tailEnd type="none" w="med" len="med"/>
+                        </a:lnR>
+                        <a:lnT w="12700" cap="flat" cmpd="sng" algn="ctr">
+                          <a:noFill/>
+                          <a:prstDash val="solid"/>
+                          <a:round/>
+                          <a:headEnd type="none" w="med" len="med"/>
+                          <a:tailEnd type="none" w="med" len="med"/>
+                        </a:lnT>
+                        <a:lnB w="12700" cap="flat" cmpd="sng" algn="ctr">
+                          <a:noFill/>
+                          <a:prstDash val="solid"/>
+                          <a:round/>
+                          <a:headEnd type="none" w="med" len="med"/>
+                          <a:tailEnd type="none" w="med" len="med"/>
+                        </a:lnB>
+                        <a:lnTlToBr w="12700" cmpd="sng">
+                          <a:noFill/>
+                          <a:prstDash val="solid"/>
+                        </a:lnTlToBr>
+                        <a:lnBlToTr w="12700" cmpd="sng">
+                          <a:noFill/>
+                          <a:prstDash val="solid"/>
+                        </a:lnBlToTr>
+                        <a:noFill/>
+                      </a:tcPr>
+                    </a:tc>
+                    <a:tc>
+                      <a:txBody>
+                        <a:bodyPr/>
+                        <a:lstStyle/>
+                        <a:p>
+                          <a:endParaRPr lang="en-US"/>
+                        </a:p>
+                      </a:txBody>
+                      <a:tcPr marL="124041" marR="124041" marT="62021" marB="62021">
+                        <a:lnL w="12700" cap="flat" cmpd="sng" algn="ctr">
+                          <a:noFill/>
+                          <a:prstDash val="solid"/>
+                          <a:round/>
+                          <a:headEnd type="none" w="med" len="med"/>
+                          <a:tailEnd type="none" w="med" len="med"/>
+                        </a:lnL>
+                        <a:lnR w="12700" cap="flat" cmpd="sng" algn="ctr">
+                          <a:noFill/>
+                          <a:prstDash val="solid"/>
+                          <a:round/>
+                          <a:headEnd type="none" w="med" len="med"/>
+                          <a:tailEnd type="none" w="med" len="med"/>
+                        </a:lnR>
+                        <a:lnT w="12700" cap="flat" cmpd="sng" algn="ctr">
+                          <a:noFill/>
+                          <a:prstDash val="solid"/>
+                          <a:round/>
+                          <a:headEnd type="none" w="med" len="med"/>
+                          <a:tailEnd type="none" w="med" len="med"/>
+                        </a:lnT>
+                        <a:lnB w="12700" cap="flat" cmpd="sng" algn="ctr">
+                          <a:noFill/>
+                          <a:prstDash val="solid"/>
+                          <a:round/>
+                          <a:headEnd type="none" w="med" len="med"/>
+                          <a:tailEnd type="none" w="med" len="med"/>
+                        </a:lnB>
+                        <a:lnTlToBr w="12700" cmpd="sng">
+                          <a:noFill/>
+                          <a:prstDash val="solid"/>
+                        </a:lnTlToBr>
+                        <a:lnBlToTr w="12700" cmpd="sng">
+                          <a:noFill/>
+                          <a:prstDash val="solid"/>
+                        </a:lnBlToTr>
+                        <a:blipFill>
+                          <a:blip r:embed="rId4"/>
+                          <a:stretch>
+                            <a:fillRect l="-100000" t="-602410" b="-21687"/>
+                          </a:stretch>
+                        </a:blipFill>
+                      </a:tcPr>
+                    </a:tc>
+                    <a:extLst>
+                      <a:ext uri="{0D108BD9-81ED-4DB2-BD59-A6C34878D82A}">
+                        <a16:rowId xmlns:a16="http://schemas.microsoft.com/office/drawing/2014/main" val="2106922570"/>
+                      </a:ext>
+                    </a:extLst>
+                  </a:tr>
+                </a:tbl>
+              </a:graphicData>
+            </a:graphic>
+          </p:graphicFrame>
         </mc:Fallback>
       </mc:AlternateContent>
     </p:spTree>

</xml_diff>

<commit_message>
max unpool output size
</commit_message>
<xml_diff>
--- a/Slides_7.pptx
+++ b/Slides_7.pptx
@@ -5,7 +5,7 @@
     <p:sldMasterId id="2147483648" r:id="rId1"/>
   </p:sldMasterIdLst>
   <p:notesMasterIdLst>
-    <p:notesMasterId r:id="rId8"/>
+    <p:notesMasterId r:id="rId9"/>
   </p:notesMasterIdLst>
   <p:sldIdLst>
     <p:sldId id="257" r:id="rId2"/>
@@ -14,6 +14,7 @@
     <p:sldId id="260" r:id="rId5"/>
     <p:sldId id="281" r:id="rId6"/>
     <p:sldId id="282" r:id="rId7"/>
+    <p:sldId id="283" r:id="rId8"/>
   </p:sldIdLst>
   <p:sldSz cx="12192000" cy="6858000"/>
   <p:notesSz cx="6858000" cy="9144000"/>
@@ -544,6 +545,90 @@
     <p:extLst>
       <p:ext uri="{BB962C8B-B14F-4D97-AF65-F5344CB8AC3E}">
         <p14:creationId xmlns:p14="http://schemas.microsoft.com/office/powerpoint/2010/main" val="4160032639"/>
+      </p:ext>
+    </p:extLst>
+  </p:cSld>
+  <p:clrMapOvr>
+    <a:masterClrMapping/>
+  </p:clrMapOvr>
+</p:notes>
+</file>
+
+<file path=ppt/notesSlides/notesSlide2.xml><?xml version="1.0" encoding="utf-8"?>
+<p:notes xmlns:a="http://schemas.openxmlformats.org/drawingml/2006/main" xmlns:r="http://schemas.openxmlformats.org/officeDocument/2006/relationships" xmlns:p="http://schemas.openxmlformats.org/presentationml/2006/main">
+  <p:cSld>
+    <p:spTree>
+      <p:nvGrpSpPr>
+        <p:cNvPr id="1" name=""/>
+        <p:cNvGrpSpPr/>
+        <p:nvPr/>
+      </p:nvGrpSpPr>
+      <p:grpSpPr>
+        <a:xfrm>
+          <a:off x="0" y="0"/>
+          <a:ext cx="0" cy="0"/>
+          <a:chOff x="0" y="0"/>
+          <a:chExt cx="0" cy="0"/>
+        </a:xfrm>
+      </p:grpSpPr>
+      <p:sp>
+        <p:nvSpPr>
+          <p:cNvPr id="2" name="Slide Image Placeholder 1"/>
+          <p:cNvSpPr>
+            <a:spLocks noGrp="1" noRot="1" noChangeAspect="1"/>
+          </p:cNvSpPr>
+          <p:nvPr>
+            <p:ph type="sldImg"/>
+          </p:nvPr>
+        </p:nvSpPr>
+        <p:spPr/>
+      </p:sp>
+      <p:sp>
+        <p:nvSpPr>
+          <p:cNvPr id="3" name="Notes Placeholder 2"/>
+          <p:cNvSpPr>
+            <a:spLocks noGrp="1"/>
+          </p:cNvSpPr>
+          <p:nvPr>
+            <p:ph type="body" idx="1"/>
+          </p:nvPr>
+        </p:nvSpPr>
+        <p:spPr/>
+        <p:txBody>
+          <a:bodyPr/>
+          <a:lstStyle/>
+          <a:p>
+            <a:endParaRPr lang="en-US" dirty="0"/>
+          </a:p>
+        </p:txBody>
+      </p:sp>
+      <p:sp>
+        <p:nvSpPr>
+          <p:cNvPr id="4" name="Slide Number Placeholder 3"/>
+          <p:cNvSpPr>
+            <a:spLocks noGrp="1"/>
+          </p:cNvSpPr>
+          <p:nvPr>
+            <p:ph type="sldNum" sz="quarter" idx="5"/>
+          </p:nvPr>
+        </p:nvSpPr>
+        <p:spPr/>
+        <p:txBody>
+          <a:bodyPr/>
+          <a:lstStyle/>
+          <a:p>
+            <a:fld id="{EF847D23-764C-4404-9D36-DEB150D4E174}" type="slidenum">
+              <a:rPr lang="en-US" smtClean="0"/>
+              <a:t>7</a:t>
+            </a:fld>
+            <a:endParaRPr lang="en-US"/>
+          </a:p>
+        </p:txBody>
+      </p:sp>
+    </p:spTree>
+    <p:extLst>
+      <p:ext uri="{BB962C8B-B14F-4D97-AF65-F5344CB8AC3E}">
+        <p14:creationId xmlns:p14="http://schemas.microsoft.com/office/powerpoint/2010/main" val="1404808280"/>
       </p:ext>
     </p:extLst>
   </p:cSld>
@@ -8354,6 +8439,2957 @@
       <p:bldP spid="10" grpId="0" animBg="1"/>
     </p:bldLst>
   </p:timing>
+</p:sld>
+</file>
+
+<file path=ppt/slides/slide7.xml><?xml version="1.0" encoding="utf-8"?>
+<p:sld xmlns:a="http://schemas.openxmlformats.org/drawingml/2006/main" xmlns:r="http://schemas.openxmlformats.org/officeDocument/2006/relationships" xmlns:p="http://schemas.openxmlformats.org/presentationml/2006/main">
+  <p:cSld>
+    <p:spTree>
+      <p:nvGrpSpPr>
+        <p:cNvPr id="1" name=""/>
+        <p:cNvGrpSpPr/>
+        <p:nvPr/>
+      </p:nvGrpSpPr>
+      <p:grpSpPr>
+        <a:xfrm>
+          <a:off x="0" y="0"/>
+          <a:ext cx="0" cy="0"/>
+          <a:chOff x="0" y="0"/>
+          <a:chExt cx="0" cy="0"/>
+        </a:xfrm>
+      </p:grpSpPr>
+      <p:sp>
+        <p:nvSpPr>
+          <p:cNvPr id="2" name="Title 1">
+            <a:extLst>
+              <a:ext uri="{FF2B5EF4-FFF2-40B4-BE49-F238E27FC236}">
+                <a16:creationId xmlns:a16="http://schemas.microsoft.com/office/drawing/2014/main" id="{327BA092-8276-1750-487C-FD6B2148AEA0}"/>
+              </a:ext>
+            </a:extLst>
+          </p:cNvPr>
+          <p:cNvSpPr>
+            <a:spLocks noGrp="1"/>
+          </p:cNvSpPr>
+          <p:nvPr>
+            <p:ph type="title"/>
+          </p:nvPr>
+        </p:nvSpPr>
+        <p:spPr/>
+        <p:txBody>
+          <a:bodyPr/>
+          <a:lstStyle/>
+          <a:p>
+            <a:r>
+              <a:rPr lang="en-US" dirty="0"/>
+              <a:t>Max Unpool Output Size</a:t>
+            </a:r>
+          </a:p>
+        </p:txBody>
+      </p:sp>
+      <mc:AlternateContent xmlns:mc="http://schemas.openxmlformats.org/markup-compatibility/2006">
+        <mc:Choice xmlns:a14="http://schemas.microsoft.com/office/drawing/2010/main" Requires="a14">
+          <p:sp>
+            <p:nvSpPr>
+              <p:cNvPr id="3" name="Content Placeholder 2">
+                <a:extLst>
+                  <a:ext uri="{FF2B5EF4-FFF2-40B4-BE49-F238E27FC236}">
+                    <a16:creationId xmlns:a16="http://schemas.microsoft.com/office/drawing/2014/main" id="{B4BCBD0E-EB29-6951-EAC5-9C7D4BCEDF4D}"/>
+                  </a:ext>
+                </a:extLst>
+              </p:cNvPr>
+              <p:cNvSpPr>
+                <a:spLocks noGrp="1"/>
+              </p:cNvSpPr>
+              <p:nvPr>
+                <p:ph idx="1"/>
+              </p:nvPr>
+            </p:nvSpPr>
+            <p:spPr>
+              <a:xfrm>
+                <a:off x="838200" y="5669280"/>
+                <a:ext cx="10515600" cy="507682"/>
+              </a:xfrm>
+            </p:spPr>
+            <p:txBody>
+              <a:bodyPr>
+                <a:normAutofit/>
+              </a:bodyPr>
+              <a:lstStyle/>
+              <a:p>
+                <a:pPr marL="0" indent="0" algn="ctr">
+                  <a:buNone/>
+                </a:pPr>
+                <a14:m>
+                  <m:oMathPara xmlns:m="http://schemas.openxmlformats.org/officeDocument/2006/math">
+                    <m:oMathParaPr>
+                      <m:jc m:val="centerGroup"/>
+                    </m:oMathParaPr>
+                    <m:oMath xmlns:m="http://schemas.openxmlformats.org/officeDocument/2006/math">
+                      <m:r>
+                        <a:rPr lang="en-US" b="0" i="1" smtClean="0">
+                          <a:latin typeface="Cambria Math" panose="02040503050406030204" pitchFamily="18" charset="0"/>
+                        </a:rPr>
+                        <m:t>𝑜𝑢</m:t>
+                      </m:r>
+                      <m:sSub>
+                        <m:sSubPr>
+                          <m:ctrlPr>
+                            <a:rPr lang="en-US" b="0" i="1" smtClean="0">
+                              <a:latin typeface="Cambria Math" panose="02040503050406030204" pitchFamily="18" charset="0"/>
+                            </a:rPr>
+                          </m:ctrlPr>
+                        </m:sSubPr>
+                        <m:e>
+                          <m:r>
+                            <a:rPr lang="en-US" b="0" i="1" smtClean="0">
+                              <a:latin typeface="Cambria Math" panose="02040503050406030204" pitchFamily="18" charset="0"/>
+                            </a:rPr>
+                            <m:t>𝑡</m:t>
+                          </m:r>
+                        </m:e>
+                        <m:sub>
+                          <m:r>
+                            <a:rPr lang="en-US" b="0" i="1" smtClean="0">
+                              <a:latin typeface="Cambria Math" panose="02040503050406030204" pitchFamily="18" charset="0"/>
+                            </a:rPr>
+                            <m:t>𝑖</m:t>
+                          </m:r>
+                        </m:sub>
+                      </m:sSub>
+                      <m:r>
+                        <a:rPr lang="en-US" b="0" i="1" smtClean="0">
+                          <a:latin typeface="Cambria Math" panose="02040503050406030204" pitchFamily="18" charset="0"/>
+                        </a:rPr>
+                        <m:t>= </m:t>
+                      </m:r>
+                      <m:d>
+                        <m:dPr>
+                          <m:ctrlPr>
+                            <a:rPr lang="en-US" b="0" i="1" smtClean="0">
+                              <a:latin typeface="Cambria Math" panose="02040503050406030204" pitchFamily="18" charset="0"/>
+                            </a:rPr>
+                          </m:ctrlPr>
+                        </m:dPr>
+                        <m:e>
+                          <m:r>
+                            <a:rPr lang="en-US" b="0" i="1" smtClean="0">
+                              <a:latin typeface="Cambria Math" panose="02040503050406030204" pitchFamily="18" charset="0"/>
+                            </a:rPr>
+                            <m:t>𝑖</m:t>
+                          </m:r>
+                          <m:sSub>
+                            <m:sSubPr>
+                              <m:ctrlPr>
+                                <a:rPr lang="en-US" b="0" i="1" smtClean="0">
+                                  <a:latin typeface="Cambria Math" panose="02040503050406030204" pitchFamily="18" charset="0"/>
+                                </a:rPr>
+                              </m:ctrlPr>
+                            </m:sSubPr>
+                            <m:e>
+                              <m:r>
+                                <a:rPr lang="en-US" b="0" i="1" smtClean="0">
+                                  <a:latin typeface="Cambria Math" panose="02040503050406030204" pitchFamily="18" charset="0"/>
+                                </a:rPr>
+                                <m:t>𝑛</m:t>
+                              </m:r>
+                            </m:e>
+                            <m:sub>
+                              <m:r>
+                                <a:rPr lang="en-US" b="0" i="1" smtClean="0">
+                                  <a:latin typeface="Cambria Math" panose="02040503050406030204" pitchFamily="18" charset="0"/>
+                                </a:rPr>
+                                <m:t>𝑖</m:t>
+                              </m:r>
+                            </m:sub>
+                          </m:sSub>
+                          <m:r>
+                            <a:rPr lang="en-US" b="0" i="1" smtClean="0">
+                              <a:latin typeface="Cambria Math" panose="02040503050406030204" pitchFamily="18" charset="0"/>
+                            </a:rPr>
+                            <m:t>−1</m:t>
+                          </m:r>
+                        </m:e>
+                      </m:d>
+                      <m:sSub>
+                        <m:sSubPr>
+                          <m:ctrlPr>
+                            <a:rPr lang="en-US" b="0" i="1" smtClean="0">
+                              <a:latin typeface="Cambria Math" panose="02040503050406030204" pitchFamily="18" charset="0"/>
+                            </a:rPr>
+                          </m:ctrlPr>
+                        </m:sSubPr>
+                        <m:e>
+                          <m:r>
+                            <a:rPr lang="en-US" b="0" i="1" smtClean="0">
+                              <a:latin typeface="Cambria Math" panose="02040503050406030204" pitchFamily="18" charset="0"/>
+                            </a:rPr>
+                            <m:t>𝑠</m:t>
+                          </m:r>
+                        </m:e>
+                        <m:sub>
+                          <m:r>
+                            <a:rPr lang="en-US" b="0" i="1" smtClean="0">
+                              <a:latin typeface="Cambria Math" panose="02040503050406030204" pitchFamily="18" charset="0"/>
+                            </a:rPr>
+                            <m:t>𝑖</m:t>
+                          </m:r>
+                        </m:sub>
+                      </m:sSub>
+                      <m:r>
+                        <a:rPr lang="en-US" b="0" i="1" smtClean="0">
+                          <a:latin typeface="Cambria Math" panose="02040503050406030204" pitchFamily="18" charset="0"/>
+                        </a:rPr>
+                        <m:t>−2</m:t>
+                      </m:r>
+                      <m:sSub>
+                        <m:sSubPr>
+                          <m:ctrlPr>
+                            <a:rPr lang="en-US" b="0" i="1" smtClean="0">
+                              <a:latin typeface="Cambria Math" panose="02040503050406030204" pitchFamily="18" charset="0"/>
+                            </a:rPr>
+                          </m:ctrlPr>
+                        </m:sSubPr>
+                        <m:e>
+                          <m:r>
+                            <a:rPr lang="en-US" b="0" i="1" smtClean="0">
+                              <a:latin typeface="Cambria Math" panose="02040503050406030204" pitchFamily="18" charset="0"/>
+                            </a:rPr>
+                            <m:t>𝑝</m:t>
+                          </m:r>
+                        </m:e>
+                        <m:sub>
+                          <m:r>
+                            <a:rPr lang="en-US" b="0" i="1" smtClean="0">
+                              <a:latin typeface="Cambria Math" panose="02040503050406030204" pitchFamily="18" charset="0"/>
+                            </a:rPr>
+                            <m:t>𝑖</m:t>
+                          </m:r>
+                        </m:sub>
+                      </m:sSub>
+                      <m:r>
+                        <a:rPr lang="en-US" b="0" i="1" smtClean="0">
+                          <a:latin typeface="Cambria Math" panose="02040503050406030204" pitchFamily="18" charset="0"/>
+                        </a:rPr>
+                        <m:t>+</m:t>
+                      </m:r>
+                      <m:sSub>
+                        <m:sSubPr>
+                          <m:ctrlPr>
+                            <a:rPr lang="en-US" b="0" i="1" smtClean="0">
+                              <a:latin typeface="Cambria Math" panose="02040503050406030204" pitchFamily="18" charset="0"/>
+                            </a:rPr>
+                          </m:ctrlPr>
+                        </m:sSubPr>
+                        <m:e>
+                          <m:r>
+                            <a:rPr lang="en-US" b="0" i="1" smtClean="0">
+                              <a:latin typeface="Cambria Math" panose="02040503050406030204" pitchFamily="18" charset="0"/>
+                            </a:rPr>
+                            <m:t>𝑘</m:t>
+                          </m:r>
+                        </m:e>
+                        <m:sub>
+                          <m:r>
+                            <a:rPr lang="en-US" b="0" i="1" smtClean="0">
+                              <a:latin typeface="Cambria Math" panose="02040503050406030204" pitchFamily="18" charset="0"/>
+                            </a:rPr>
+                            <m:t>𝑖</m:t>
+                          </m:r>
+                        </m:sub>
+                      </m:sSub>
+                    </m:oMath>
+                  </m:oMathPara>
+                </a14:m>
+                <a:endParaRPr lang="en-US" dirty="0"/>
+              </a:p>
+            </p:txBody>
+          </p:sp>
+        </mc:Choice>
+        <mc:Fallback>
+          <p:sp>
+            <p:nvSpPr>
+              <p:cNvPr id="3" name="Content Placeholder 2">
+                <a:extLst>
+                  <a:ext uri="{FF2B5EF4-FFF2-40B4-BE49-F238E27FC236}">
+                    <a16:creationId xmlns:a16="http://schemas.microsoft.com/office/drawing/2014/main" id="{B4BCBD0E-EB29-6951-EAC5-9C7D4BCEDF4D}"/>
+                  </a:ext>
+                </a:extLst>
+              </p:cNvPr>
+              <p:cNvSpPr>
+                <a:spLocks noGrp="1" noRot="1" noChangeAspect="1" noMove="1" noResize="1" noEditPoints="1" noAdjustHandles="1" noChangeArrowheads="1" noChangeShapeType="1" noTextEdit="1"/>
+              </p:cNvSpPr>
+              <p:nvPr>
+                <p:ph idx="1"/>
+              </p:nvPr>
+            </p:nvSpPr>
+            <p:spPr>
+              <a:xfrm>
+                <a:off x="838200" y="5669280"/>
+                <a:ext cx="10515600" cy="507682"/>
+              </a:xfrm>
+              <a:blipFill>
+                <a:blip r:embed="rId3"/>
+                <a:stretch>
+                  <a:fillRect b="-6024"/>
+                </a:stretch>
+              </a:blipFill>
+            </p:spPr>
+            <p:txBody>
+              <a:bodyPr/>
+              <a:lstStyle/>
+              <a:p>
+                <a:r>
+                  <a:rPr lang="en-US">
+                    <a:noFill/>
+                  </a:rPr>
+                  <a:t> </a:t>
+                </a:r>
+              </a:p>
+            </p:txBody>
+          </p:sp>
+        </mc:Fallback>
+      </mc:AlternateContent>
+      <mc:AlternateContent xmlns:mc="http://schemas.openxmlformats.org/markup-compatibility/2006">
+        <mc:Choice xmlns:a14="http://schemas.microsoft.com/office/drawing/2010/main" Requires="a14">
+          <p:graphicFrame>
+            <p:nvGraphicFramePr>
+              <p:cNvPr id="4" name="Table 4">
+                <a:extLst>
+                  <a:ext uri="{FF2B5EF4-FFF2-40B4-BE49-F238E27FC236}">
+                    <a16:creationId xmlns:a16="http://schemas.microsoft.com/office/drawing/2014/main" id="{D1FCFCAB-B3D0-9841-4EDB-7C439FFFCDD6}"/>
+                  </a:ext>
+                </a:extLst>
+              </p:cNvPr>
+              <p:cNvGraphicFramePr>
+                <a:graphicFrameLocks noGrp="1"/>
+              </p:cNvGraphicFramePr>
+              <p:nvPr>
+                <p:extLst>
+                  <p:ext uri="{D42A27DB-BD31-4B8C-83A1-F6EECF244321}">
+                    <p14:modId xmlns:p14="http://schemas.microsoft.com/office/powerpoint/2010/main" val="941068782"/>
+                  </p:ext>
+                </p:extLst>
+              </p:nvPr>
+            </p:nvGraphicFramePr>
+            <p:xfrm>
+              <a:off x="3521423" y="1690688"/>
+              <a:ext cx="5149154" cy="3521392"/>
+            </p:xfrm>
+            <a:graphic>
+              <a:graphicData uri="http://schemas.openxmlformats.org/drawingml/2006/table">
+                <a:tbl>
+                  <a:tblPr firstRow="1" bandRow="1">
+                    <a:tableStyleId>{5C22544A-7EE6-4342-B048-85BDC9FD1C3A}</a:tableStyleId>
+                  </a:tblPr>
+                  <a:tblGrid>
+                    <a:gridCol w="2574577">
+                      <a:extLst>
+                        <a:ext uri="{9D8B030D-6E8A-4147-A177-3AD203B41FA5}">
+                          <a16:colId xmlns:a16="http://schemas.microsoft.com/office/drawing/2014/main" val="1867715976"/>
+                        </a:ext>
+                      </a:extLst>
+                    </a:gridCol>
+                    <a:gridCol w="2574577">
+                      <a:extLst>
+                        <a:ext uri="{9D8B030D-6E8A-4147-A177-3AD203B41FA5}">
+                          <a16:colId xmlns:a16="http://schemas.microsoft.com/office/drawing/2014/main" val="2067955847"/>
+                        </a:ext>
+                      </a:extLst>
+                    </a:gridCol>
+                  </a:tblGrid>
+                  <a:tr h="503056">
+                    <a:tc>
+                      <a:txBody>
+                        <a:bodyPr/>
+                        <a:lstStyle/>
+                        <a:p>
+                          <a:pPr marL="0" indent="0" algn="r">
+                            <a:buNone/>
+                          </a:pPr>
+                          <a:r>
+                            <a:rPr lang="en-US" sz="2400" b="0" dirty="0">
+                              <a:solidFill>
+                                <a:schemeClr val="tx1"/>
+                              </a:solidFill>
+                            </a:rPr>
+                            <a:t>Kernel:</a:t>
+                          </a:r>
+                        </a:p>
+                      </a:txBody>
+                      <a:tcPr marL="124041" marR="124041" marT="62021" marB="62021">
+                        <a:lnL w="12700" cap="flat" cmpd="sng" algn="ctr">
+                          <a:noFill/>
+                          <a:prstDash val="solid"/>
+                          <a:round/>
+                          <a:headEnd type="none" w="med" len="med"/>
+                          <a:tailEnd type="none" w="med" len="med"/>
+                        </a:lnL>
+                        <a:lnR w="12700" cap="flat" cmpd="sng" algn="ctr">
+                          <a:noFill/>
+                          <a:prstDash val="solid"/>
+                          <a:round/>
+                          <a:headEnd type="none" w="med" len="med"/>
+                          <a:tailEnd type="none" w="med" len="med"/>
+                        </a:lnR>
+                        <a:lnT w="12700" cap="flat" cmpd="sng" algn="ctr">
+                          <a:noFill/>
+                          <a:prstDash val="solid"/>
+                          <a:round/>
+                          <a:headEnd type="none" w="med" len="med"/>
+                          <a:tailEnd type="none" w="med" len="med"/>
+                        </a:lnT>
+                        <a:lnB w="12700" cap="flat" cmpd="sng" algn="ctr">
+                          <a:noFill/>
+                          <a:prstDash val="solid"/>
+                          <a:round/>
+                          <a:headEnd type="none" w="med" len="med"/>
+                          <a:tailEnd type="none" w="med" len="med"/>
+                        </a:lnB>
+                        <a:lnTlToBr w="12700" cmpd="sng">
+                          <a:noFill/>
+                          <a:prstDash val="solid"/>
+                        </a:lnTlToBr>
+                        <a:lnBlToTr w="12700" cmpd="sng">
+                          <a:noFill/>
+                          <a:prstDash val="solid"/>
+                        </a:lnBlToTr>
+                        <a:noFill/>
+                      </a:tcPr>
+                    </a:tc>
+                    <a:tc>
+                      <a:txBody>
+                        <a:bodyPr/>
+                        <a:lstStyle/>
+                        <a:p>
+                          <a:pPr marL="0" marR="0" lvl="0" indent="0" algn="l" defTabSz="914400" rtl="0" eaLnBrk="1" fontAlgn="auto" latinLnBrk="0" hangingPunct="1">
+                            <a:lnSpc>
+                              <a:spcPct val="100000"/>
+                            </a:lnSpc>
+                            <a:spcBef>
+                              <a:spcPts val="0"/>
+                            </a:spcBef>
+                            <a:spcAft>
+                              <a:spcPts val="0"/>
+                            </a:spcAft>
+                            <a:buClrTx/>
+                            <a:buSzTx/>
+                            <a:buFontTx/>
+                            <a:buNone/>
+                            <a:tabLst/>
+                            <a:defRPr/>
+                          </a:pPr>
+                          <a14:m>
+                            <m:oMathPara xmlns:m="http://schemas.openxmlformats.org/officeDocument/2006/math">
+                              <m:oMathParaPr>
+                                <m:jc m:val="centerGroup"/>
+                              </m:oMathParaPr>
+                              <m:oMath xmlns:m="http://schemas.openxmlformats.org/officeDocument/2006/math">
+                                <m:sSub>
+                                  <m:sSubPr>
+                                    <m:ctrlPr>
+                                      <a:rPr lang="en-US" sz="2400" b="0" i="1" smtClean="0">
+                                        <a:solidFill>
+                                          <a:schemeClr val="tx1"/>
+                                        </a:solidFill>
+                                        <a:latin typeface="Cambria Math" panose="02040503050406030204" pitchFamily="18" charset="0"/>
+                                      </a:rPr>
+                                    </m:ctrlPr>
+                                  </m:sSubPr>
+                                  <m:e>
+                                    <m:r>
+                                      <a:rPr lang="en-US" sz="2400" b="0" i="1" smtClean="0">
+                                        <a:solidFill>
+                                          <a:schemeClr val="tx1"/>
+                                        </a:solidFill>
+                                        <a:latin typeface="Cambria Math" panose="02040503050406030204" pitchFamily="18" charset="0"/>
+                                      </a:rPr>
+                                      <m:t>(</m:t>
+                                    </m:r>
+                                    <m:r>
+                                      <a:rPr lang="en-US" sz="2400" i="1">
+                                        <a:solidFill>
+                                          <a:schemeClr val="tx1"/>
+                                        </a:solidFill>
+                                        <a:latin typeface="Cambria Math" panose="02040503050406030204" pitchFamily="18" charset="0"/>
+                                      </a:rPr>
+                                      <m:t>𝑘</m:t>
+                                    </m:r>
+                                  </m:e>
+                                  <m:sub>
+                                    <m:r>
+                                      <a:rPr lang="en-US" sz="2400" b="0" i="1" smtClean="0">
+                                        <a:solidFill>
+                                          <a:schemeClr val="tx1"/>
+                                        </a:solidFill>
+                                        <a:latin typeface="Cambria Math" panose="02040503050406030204" pitchFamily="18" charset="0"/>
+                                      </a:rPr>
+                                      <m:t>1</m:t>
+                                    </m:r>
+                                  </m:sub>
+                                </m:sSub>
+                                <m:r>
+                                  <a:rPr lang="en-US" sz="2400" b="0" i="1" smtClean="0">
+                                    <a:solidFill>
+                                      <a:schemeClr val="tx1"/>
+                                    </a:solidFill>
+                                    <a:latin typeface="Cambria Math" panose="02040503050406030204" pitchFamily="18" charset="0"/>
+                                  </a:rPr>
+                                  <m:t>, </m:t>
+                                </m:r>
+                                <m:sSub>
+                                  <m:sSubPr>
+                                    <m:ctrlPr>
+                                      <a:rPr lang="en-US" sz="2400" b="0" i="1" smtClean="0">
+                                        <a:solidFill>
+                                          <a:schemeClr val="tx1"/>
+                                        </a:solidFill>
+                                        <a:latin typeface="Cambria Math" panose="02040503050406030204" pitchFamily="18" charset="0"/>
+                                      </a:rPr>
+                                    </m:ctrlPr>
+                                  </m:sSubPr>
+                                  <m:e>
+                                    <m:r>
+                                      <a:rPr lang="en-US" sz="2400" i="1">
+                                        <a:solidFill>
+                                          <a:schemeClr val="tx1"/>
+                                        </a:solidFill>
+                                        <a:latin typeface="Cambria Math" panose="02040503050406030204" pitchFamily="18" charset="0"/>
+                                      </a:rPr>
+                                      <m:t>𝑘</m:t>
+                                    </m:r>
+                                  </m:e>
+                                  <m:sub>
+                                    <m:r>
+                                      <a:rPr lang="en-US" sz="2400" b="0" i="1" smtClean="0">
+                                        <a:solidFill>
+                                          <a:schemeClr val="tx1"/>
+                                        </a:solidFill>
+                                        <a:latin typeface="Cambria Math" panose="02040503050406030204" pitchFamily="18" charset="0"/>
+                                      </a:rPr>
+                                      <m:t>2</m:t>
+                                    </m:r>
+                                  </m:sub>
+                                </m:sSub>
+                                <m:r>
+                                  <a:rPr lang="en-US" sz="2400" b="0" i="1" smtClean="0">
+                                    <a:solidFill>
+                                      <a:schemeClr val="tx1"/>
+                                    </a:solidFill>
+                                    <a:latin typeface="Cambria Math" panose="02040503050406030204" pitchFamily="18" charset="0"/>
+                                  </a:rPr>
+                                  <m:t>)</m:t>
+                                </m:r>
+                              </m:oMath>
+                            </m:oMathPara>
+                          </a14:m>
+                          <a:endParaRPr lang="en-US" sz="2400" dirty="0">
+                            <a:solidFill>
+                              <a:schemeClr val="tx1"/>
+                            </a:solidFill>
+                          </a:endParaRPr>
+                        </a:p>
+                      </a:txBody>
+                      <a:tcPr marL="124041" marR="124041" marT="62021" marB="62021">
+                        <a:lnL w="12700" cap="flat" cmpd="sng" algn="ctr">
+                          <a:noFill/>
+                          <a:prstDash val="solid"/>
+                          <a:round/>
+                          <a:headEnd type="none" w="med" len="med"/>
+                          <a:tailEnd type="none" w="med" len="med"/>
+                        </a:lnL>
+                        <a:lnR w="12700" cap="flat" cmpd="sng" algn="ctr">
+                          <a:noFill/>
+                          <a:prstDash val="solid"/>
+                          <a:round/>
+                          <a:headEnd type="none" w="med" len="med"/>
+                          <a:tailEnd type="none" w="med" len="med"/>
+                        </a:lnR>
+                        <a:lnT w="12700" cap="flat" cmpd="sng" algn="ctr">
+                          <a:noFill/>
+                          <a:prstDash val="solid"/>
+                          <a:round/>
+                          <a:headEnd type="none" w="med" len="med"/>
+                          <a:tailEnd type="none" w="med" len="med"/>
+                        </a:lnT>
+                        <a:lnB w="12700" cap="flat" cmpd="sng" algn="ctr">
+                          <a:noFill/>
+                          <a:prstDash val="solid"/>
+                          <a:round/>
+                          <a:headEnd type="none" w="med" len="med"/>
+                          <a:tailEnd type="none" w="med" len="med"/>
+                        </a:lnB>
+                        <a:lnTlToBr w="12700" cmpd="sng">
+                          <a:noFill/>
+                          <a:prstDash val="solid"/>
+                        </a:lnTlToBr>
+                        <a:lnBlToTr w="12700" cmpd="sng">
+                          <a:noFill/>
+                          <a:prstDash val="solid"/>
+                        </a:lnBlToTr>
+                        <a:noFill/>
+                      </a:tcPr>
+                    </a:tc>
+                    <a:extLst>
+                      <a:ext uri="{0D108BD9-81ED-4DB2-BD59-A6C34878D82A}">
+                        <a16:rowId xmlns:a16="http://schemas.microsoft.com/office/drawing/2014/main" val="447519452"/>
+                      </a:ext>
+                    </a:extLst>
+                  </a:tr>
+                  <a:tr h="503056">
+                    <a:tc>
+                      <a:txBody>
+                        <a:bodyPr/>
+                        <a:lstStyle/>
+                        <a:p>
+                          <a:pPr algn="r"/>
+                          <a:r>
+                            <a:rPr lang="en-US" sz="2400" dirty="0">
+                              <a:solidFill>
+                                <a:schemeClr val="tx1"/>
+                              </a:solidFill>
+                            </a:rPr>
+                            <a:t>Input image: </a:t>
+                          </a:r>
+                        </a:p>
+                      </a:txBody>
+                      <a:tcPr marL="124041" marR="124041" marT="62021" marB="62021">
+                        <a:lnL w="12700" cap="flat" cmpd="sng" algn="ctr">
+                          <a:noFill/>
+                          <a:prstDash val="solid"/>
+                          <a:round/>
+                          <a:headEnd type="none" w="med" len="med"/>
+                          <a:tailEnd type="none" w="med" len="med"/>
+                        </a:lnL>
+                        <a:lnR w="12700" cap="flat" cmpd="sng" algn="ctr">
+                          <a:noFill/>
+                          <a:prstDash val="solid"/>
+                          <a:round/>
+                          <a:headEnd type="none" w="med" len="med"/>
+                          <a:tailEnd type="none" w="med" len="med"/>
+                        </a:lnR>
+                        <a:lnT w="12700" cap="flat" cmpd="sng" algn="ctr">
+                          <a:noFill/>
+                          <a:prstDash val="solid"/>
+                          <a:round/>
+                          <a:headEnd type="none" w="med" len="med"/>
+                          <a:tailEnd type="none" w="med" len="med"/>
+                        </a:lnT>
+                        <a:lnB w="12700" cap="flat" cmpd="sng" algn="ctr">
+                          <a:noFill/>
+                          <a:prstDash val="solid"/>
+                          <a:round/>
+                          <a:headEnd type="none" w="med" len="med"/>
+                          <a:tailEnd type="none" w="med" len="med"/>
+                        </a:lnB>
+                        <a:lnTlToBr w="12700" cmpd="sng">
+                          <a:noFill/>
+                          <a:prstDash val="solid"/>
+                        </a:lnTlToBr>
+                        <a:lnBlToTr w="12700" cmpd="sng">
+                          <a:noFill/>
+                          <a:prstDash val="solid"/>
+                        </a:lnBlToTr>
+                        <a:noFill/>
+                      </a:tcPr>
+                    </a:tc>
+                    <a:tc>
+                      <a:txBody>
+                        <a:bodyPr/>
+                        <a:lstStyle/>
+                        <a:p>
+                          <a:pPr marL="0" marR="0" lvl="0" indent="0" algn="l" defTabSz="914400" rtl="0" eaLnBrk="1" fontAlgn="auto" latinLnBrk="0" hangingPunct="1">
+                            <a:lnSpc>
+                              <a:spcPct val="100000"/>
+                            </a:lnSpc>
+                            <a:spcBef>
+                              <a:spcPts val="0"/>
+                            </a:spcBef>
+                            <a:spcAft>
+                              <a:spcPts val="0"/>
+                            </a:spcAft>
+                            <a:buClrTx/>
+                            <a:buSzTx/>
+                            <a:buFontTx/>
+                            <a:buNone/>
+                            <a:tabLst/>
+                            <a:defRPr/>
+                          </a:pPr>
+                          <a14:m>
+                            <m:oMathPara xmlns:m="http://schemas.openxmlformats.org/officeDocument/2006/math">
+                              <m:oMathParaPr>
+                                <m:jc m:val="centerGroup"/>
+                              </m:oMathParaPr>
+                              <m:oMath xmlns:m="http://schemas.openxmlformats.org/officeDocument/2006/math">
+                                <m:r>
+                                  <a:rPr lang="en-US" sz="2400" b="0" i="0" smtClean="0">
+                                    <a:solidFill>
+                                      <a:schemeClr val="tx1"/>
+                                    </a:solidFill>
+                                    <a:latin typeface="Cambria Math" panose="02040503050406030204" pitchFamily="18" charset="0"/>
+                                  </a:rPr>
+                                  <m:t>(</m:t>
+                                </m:r>
+                                <m:r>
+                                  <a:rPr lang="en-US" sz="2400" b="0" i="1" smtClean="0">
+                                    <a:solidFill>
+                                      <a:schemeClr val="tx1"/>
+                                    </a:solidFill>
+                                    <a:latin typeface="Cambria Math" panose="02040503050406030204" pitchFamily="18" charset="0"/>
+                                  </a:rPr>
+                                  <m:t>𝑖</m:t>
+                                </m:r>
+                                <m:sSub>
+                                  <m:sSubPr>
+                                    <m:ctrlPr>
+                                      <a:rPr lang="en-US" sz="2400" b="0" i="1" smtClean="0">
+                                        <a:solidFill>
+                                          <a:schemeClr val="tx1"/>
+                                        </a:solidFill>
+                                        <a:latin typeface="Cambria Math" panose="02040503050406030204" pitchFamily="18" charset="0"/>
+                                      </a:rPr>
+                                    </m:ctrlPr>
+                                  </m:sSubPr>
+                                  <m:e>
+                                    <m:r>
+                                      <a:rPr lang="en-US" sz="2400" b="0" i="1" smtClean="0">
+                                        <a:solidFill>
+                                          <a:schemeClr val="tx1"/>
+                                        </a:solidFill>
+                                        <a:latin typeface="Cambria Math" panose="02040503050406030204" pitchFamily="18" charset="0"/>
+                                      </a:rPr>
+                                      <m:t>𝑛</m:t>
+                                    </m:r>
+                                  </m:e>
+                                  <m:sub>
+                                    <m:r>
+                                      <a:rPr lang="en-US" sz="2400" b="0" i="1" smtClean="0">
+                                        <a:solidFill>
+                                          <a:schemeClr val="tx1"/>
+                                        </a:solidFill>
+                                        <a:latin typeface="Cambria Math" panose="02040503050406030204" pitchFamily="18" charset="0"/>
+                                      </a:rPr>
+                                      <m:t>1</m:t>
+                                    </m:r>
+                                  </m:sub>
+                                </m:sSub>
+                                <m:r>
+                                  <a:rPr lang="en-US" sz="2400" b="0" i="1" smtClean="0">
+                                    <a:solidFill>
+                                      <a:schemeClr val="tx1"/>
+                                    </a:solidFill>
+                                    <a:latin typeface="Cambria Math" panose="02040503050406030204" pitchFamily="18" charset="0"/>
+                                  </a:rPr>
+                                  <m:t>,</m:t>
+                                </m:r>
+                                <m:r>
+                                  <a:rPr lang="en-US" sz="2400" b="0" i="1" smtClean="0">
+                                    <a:solidFill>
+                                      <a:schemeClr val="tx1"/>
+                                    </a:solidFill>
+                                    <a:latin typeface="Cambria Math" panose="02040503050406030204" pitchFamily="18" charset="0"/>
+                                  </a:rPr>
+                                  <m:t>𝑖</m:t>
+                                </m:r>
+                                <m:sSub>
+                                  <m:sSubPr>
+                                    <m:ctrlPr>
+                                      <a:rPr lang="en-US" sz="2400" b="0" i="1" smtClean="0">
+                                        <a:solidFill>
+                                          <a:schemeClr val="tx1"/>
+                                        </a:solidFill>
+                                        <a:latin typeface="Cambria Math" panose="02040503050406030204" pitchFamily="18" charset="0"/>
+                                      </a:rPr>
+                                    </m:ctrlPr>
+                                  </m:sSubPr>
+                                  <m:e>
+                                    <m:r>
+                                      <a:rPr lang="en-US" sz="2400" b="0" i="1" smtClean="0">
+                                        <a:solidFill>
+                                          <a:schemeClr val="tx1"/>
+                                        </a:solidFill>
+                                        <a:latin typeface="Cambria Math" panose="02040503050406030204" pitchFamily="18" charset="0"/>
+                                      </a:rPr>
+                                      <m:t>𝑛</m:t>
+                                    </m:r>
+                                  </m:e>
+                                  <m:sub>
+                                    <m:r>
+                                      <a:rPr lang="en-US" sz="2400" b="0" i="1" smtClean="0">
+                                        <a:solidFill>
+                                          <a:schemeClr val="tx1"/>
+                                        </a:solidFill>
+                                        <a:latin typeface="Cambria Math" panose="02040503050406030204" pitchFamily="18" charset="0"/>
+                                      </a:rPr>
+                                      <m:t>2</m:t>
+                                    </m:r>
+                                  </m:sub>
+                                </m:sSub>
+                                <m:r>
+                                  <a:rPr lang="en-US" sz="2400" b="0" i="1" smtClean="0">
+                                    <a:solidFill>
+                                      <a:schemeClr val="tx1"/>
+                                    </a:solidFill>
+                                    <a:latin typeface="Cambria Math" panose="02040503050406030204" pitchFamily="18" charset="0"/>
+                                  </a:rPr>
+                                  <m:t>)</m:t>
+                                </m:r>
+                              </m:oMath>
+                            </m:oMathPara>
+                          </a14:m>
+                          <a:endParaRPr lang="en-US" sz="2400" dirty="0">
+                            <a:solidFill>
+                              <a:schemeClr val="tx1"/>
+                            </a:solidFill>
+                          </a:endParaRPr>
+                        </a:p>
+                      </a:txBody>
+                      <a:tcPr marL="124041" marR="124041" marT="62021" marB="62021">
+                        <a:lnL w="12700" cap="flat" cmpd="sng" algn="ctr">
+                          <a:noFill/>
+                          <a:prstDash val="solid"/>
+                          <a:round/>
+                          <a:headEnd type="none" w="med" len="med"/>
+                          <a:tailEnd type="none" w="med" len="med"/>
+                        </a:lnL>
+                        <a:lnR w="12700" cap="flat" cmpd="sng" algn="ctr">
+                          <a:noFill/>
+                          <a:prstDash val="solid"/>
+                          <a:round/>
+                          <a:headEnd type="none" w="med" len="med"/>
+                          <a:tailEnd type="none" w="med" len="med"/>
+                        </a:lnR>
+                        <a:lnT w="12700" cap="flat" cmpd="sng" algn="ctr">
+                          <a:noFill/>
+                          <a:prstDash val="solid"/>
+                          <a:round/>
+                          <a:headEnd type="none" w="med" len="med"/>
+                          <a:tailEnd type="none" w="med" len="med"/>
+                        </a:lnT>
+                        <a:lnB w="12700" cap="flat" cmpd="sng" algn="ctr">
+                          <a:noFill/>
+                          <a:prstDash val="solid"/>
+                          <a:round/>
+                          <a:headEnd type="none" w="med" len="med"/>
+                          <a:tailEnd type="none" w="med" len="med"/>
+                        </a:lnB>
+                        <a:lnTlToBr w="12700" cmpd="sng">
+                          <a:noFill/>
+                          <a:prstDash val="solid"/>
+                        </a:lnTlToBr>
+                        <a:lnBlToTr w="12700" cmpd="sng">
+                          <a:noFill/>
+                          <a:prstDash val="solid"/>
+                        </a:lnBlToTr>
+                        <a:noFill/>
+                      </a:tcPr>
+                    </a:tc>
+                    <a:extLst>
+                      <a:ext uri="{0D108BD9-81ED-4DB2-BD59-A6C34878D82A}">
+                        <a16:rowId xmlns:a16="http://schemas.microsoft.com/office/drawing/2014/main" val="1623022831"/>
+                      </a:ext>
+                    </a:extLst>
+                  </a:tr>
+                  <a:tr h="503056">
+                    <a:tc>
+                      <a:txBody>
+                        <a:bodyPr/>
+                        <a:lstStyle/>
+                        <a:p>
+                          <a:pPr algn="r"/>
+                          <a:r>
+                            <a:rPr lang="en-US" sz="2400" dirty="0">
+                              <a:solidFill>
+                                <a:schemeClr val="tx1"/>
+                              </a:solidFill>
+                            </a:rPr>
+                            <a:t>Padding:</a:t>
+                          </a:r>
+                        </a:p>
+                      </a:txBody>
+                      <a:tcPr marL="124041" marR="124041" marT="62021" marB="62021">
+                        <a:lnL w="12700" cap="flat" cmpd="sng" algn="ctr">
+                          <a:noFill/>
+                          <a:prstDash val="solid"/>
+                          <a:round/>
+                          <a:headEnd type="none" w="med" len="med"/>
+                          <a:tailEnd type="none" w="med" len="med"/>
+                        </a:lnL>
+                        <a:lnR w="12700" cap="flat" cmpd="sng" algn="ctr">
+                          <a:noFill/>
+                          <a:prstDash val="solid"/>
+                          <a:round/>
+                          <a:headEnd type="none" w="med" len="med"/>
+                          <a:tailEnd type="none" w="med" len="med"/>
+                        </a:lnR>
+                        <a:lnT w="12700" cap="flat" cmpd="sng" algn="ctr">
+                          <a:noFill/>
+                          <a:prstDash val="solid"/>
+                          <a:round/>
+                          <a:headEnd type="none" w="med" len="med"/>
+                          <a:tailEnd type="none" w="med" len="med"/>
+                        </a:lnT>
+                        <a:lnB w="12700" cap="flat" cmpd="sng" algn="ctr">
+                          <a:noFill/>
+                          <a:prstDash val="solid"/>
+                          <a:round/>
+                          <a:headEnd type="none" w="med" len="med"/>
+                          <a:tailEnd type="none" w="med" len="med"/>
+                        </a:lnB>
+                        <a:lnTlToBr w="12700" cmpd="sng">
+                          <a:noFill/>
+                          <a:prstDash val="solid"/>
+                        </a:lnTlToBr>
+                        <a:lnBlToTr w="12700" cmpd="sng">
+                          <a:noFill/>
+                          <a:prstDash val="solid"/>
+                        </a:lnBlToTr>
+                        <a:noFill/>
+                      </a:tcPr>
+                    </a:tc>
+                    <a:tc>
+                      <a:txBody>
+                        <a:bodyPr/>
+                        <a:lstStyle/>
+                        <a:p>
+                          <a:pPr marL="0" marR="0" lvl="0" indent="0" algn="l" defTabSz="914400" rtl="0" eaLnBrk="1" fontAlgn="auto" latinLnBrk="0" hangingPunct="1">
+                            <a:lnSpc>
+                              <a:spcPct val="100000"/>
+                            </a:lnSpc>
+                            <a:spcBef>
+                              <a:spcPts val="0"/>
+                            </a:spcBef>
+                            <a:spcAft>
+                              <a:spcPts val="0"/>
+                            </a:spcAft>
+                            <a:buClrTx/>
+                            <a:buSzTx/>
+                            <a:buFontTx/>
+                            <a:buNone/>
+                            <a:tabLst/>
+                            <a:defRPr/>
+                          </a:pPr>
+                          <a14:m>
+                            <m:oMathPara xmlns:m="http://schemas.openxmlformats.org/officeDocument/2006/math">
+                              <m:oMathParaPr>
+                                <m:jc m:val="centerGroup"/>
+                              </m:oMathParaPr>
+                              <m:oMath xmlns:m="http://schemas.openxmlformats.org/officeDocument/2006/math">
+                                <m:r>
+                                  <a:rPr lang="en-US" sz="2400" b="0" i="0" smtClean="0">
+                                    <a:solidFill>
+                                      <a:schemeClr val="tx1"/>
+                                    </a:solidFill>
+                                    <a:latin typeface="Cambria Math" panose="02040503050406030204" pitchFamily="18" charset="0"/>
+                                  </a:rPr>
+                                  <m:t>(</m:t>
+                                </m:r>
+                                <m:sSub>
+                                  <m:sSubPr>
+                                    <m:ctrlPr>
+                                      <a:rPr lang="en-US" sz="2400" b="0" i="1" smtClean="0">
+                                        <a:solidFill>
+                                          <a:schemeClr val="tx1"/>
+                                        </a:solidFill>
+                                        <a:latin typeface="Cambria Math" panose="02040503050406030204" pitchFamily="18" charset="0"/>
+                                      </a:rPr>
+                                    </m:ctrlPr>
+                                  </m:sSubPr>
+                                  <m:e>
+                                    <m:r>
+                                      <a:rPr lang="en-US" sz="2400" b="0" i="1" smtClean="0">
+                                        <a:solidFill>
+                                          <a:schemeClr val="tx1"/>
+                                        </a:solidFill>
+                                        <a:latin typeface="Cambria Math" panose="02040503050406030204" pitchFamily="18" charset="0"/>
+                                      </a:rPr>
+                                      <m:t>𝑝</m:t>
+                                    </m:r>
+                                  </m:e>
+                                  <m:sub>
+                                    <m:r>
+                                      <a:rPr lang="en-US" sz="2400" b="0" i="1" smtClean="0">
+                                        <a:solidFill>
+                                          <a:schemeClr val="tx1"/>
+                                        </a:solidFill>
+                                        <a:latin typeface="Cambria Math" panose="02040503050406030204" pitchFamily="18" charset="0"/>
+                                      </a:rPr>
+                                      <m:t>1</m:t>
+                                    </m:r>
+                                  </m:sub>
+                                </m:sSub>
+                                <m:r>
+                                  <a:rPr lang="en-US" sz="2400" b="0" i="1" smtClean="0">
+                                    <a:solidFill>
+                                      <a:schemeClr val="tx1"/>
+                                    </a:solidFill>
+                                    <a:latin typeface="Cambria Math" panose="02040503050406030204" pitchFamily="18" charset="0"/>
+                                  </a:rPr>
+                                  <m:t>,</m:t>
+                                </m:r>
+                                <m:sSub>
+                                  <m:sSubPr>
+                                    <m:ctrlPr>
+                                      <a:rPr lang="en-US" sz="2400" b="0" i="1" smtClean="0">
+                                        <a:solidFill>
+                                          <a:schemeClr val="tx1"/>
+                                        </a:solidFill>
+                                        <a:latin typeface="Cambria Math" panose="02040503050406030204" pitchFamily="18" charset="0"/>
+                                      </a:rPr>
+                                    </m:ctrlPr>
+                                  </m:sSubPr>
+                                  <m:e>
+                                    <m:r>
+                                      <a:rPr lang="en-US" sz="2400" b="0" i="1" smtClean="0">
+                                        <a:solidFill>
+                                          <a:schemeClr val="tx1"/>
+                                        </a:solidFill>
+                                        <a:latin typeface="Cambria Math" panose="02040503050406030204" pitchFamily="18" charset="0"/>
+                                      </a:rPr>
+                                      <m:t>𝑝</m:t>
+                                    </m:r>
+                                  </m:e>
+                                  <m:sub>
+                                    <m:r>
+                                      <a:rPr lang="en-US" sz="2400" b="0" i="1" smtClean="0">
+                                        <a:solidFill>
+                                          <a:schemeClr val="tx1"/>
+                                        </a:solidFill>
+                                        <a:latin typeface="Cambria Math" panose="02040503050406030204" pitchFamily="18" charset="0"/>
+                                      </a:rPr>
+                                      <m:t>2</m:t>
+                                    </m:r>
+                                  </m:sub>
+                                </m:sSub>
+                                <m:r>
+                                  <a:rPr lang="en-US" sz="2400" b="0" i="1" smtClean="0">
+                                    <a:solidFill>
+                                      <a:schemeClr val="tx1"/>
+                                    </a:solidFill>
+                                    <a:latin typeface="Cambria Math" panose="02040503050406030204" pitchFamily="18" charset="0"/>
+                                  </a:rPr>
+                                  <m:t>)</m:t>
+                                </m:r>
+                              </m:oMath>
+                            </m:oMathPara>
+                          </a14:m>
+                          <a:endParaRPr lang="en-US" sz="2400" dirty="0">
+                            <a:solidFill>
+                              <a:schemeClr val="tx1"/>
+                            </a:solidFill>
+                          </a:endParaRPr>
+                        </a:p>
+                      </a:txBody>
+                      <a:tcPr marL="124041" marR="124041" marT="62021" marB="62021">
+                        <a:lnL w="12700" cap="flat" cmpd="sng" algn="ctr">
+                          <a:noFill/>
+                          <a:prstDash val="solid"/>
+                          <a:round/>
+                          <a:headEnd type="none" w="med" len="med"/>
+                          <a:tailEnd type="none" w="med" len="med"/>
+                        </a:lnL>
+                        <a:lnR w="12700" cap="flat" cmpd="sng" algn="ctr">
+                          <a:noFill/>
+                          <a:prstDash val="solid"/>
+                          <a:round/>
+                          <a:headEnd type="none" w="med" len="med"/>
+                          <a:tailEnd type="none" w="med" len="med"/>
+                        </a:lnR>
+                        <a:lnT w="12700" cap="flat" cmpd="sng" algn="ctr">
+                          <a:noFill/>
+                          <a:prstDash val="solid"/>
+                          <a:round/>
+                          <a:headEnd type="none" w="med" len="med"/>
+                          <a:tailEnd type="none" w="med" len="med"/>
+                        </a:lnT>
+                        <a:lnB w="12700" cap="flat" cmpd="sng" algn="ctr">
+                          <a:noFill/>
+                          <a:prstDash val="solid"/>
+                          <a:round/>
+                          <a:headEnd type="none" w="med" len="med"/>
+                          <a:tailEnd type="none" w="med" len="med"/>
+                        </a:lnB>
+                        <a:lnTlToBr w="12700" cmpd="sng">
+                          <a:noFill/>
+                          <a:prstDash val="solid"/>
+                        </a:lnTlToBr>
+                        <a:lnBlToTr w="12700" cmpd="sng">
+                          <a:noFill/>
+                          <a:prstDash val="solid"/>
+                        </a:lnBlToTr>
+                        <a:noFill/>
+                      </a:tcPr>
+                    </a:tc>
+                    <a:extLst>
+                      <a:ext uri="{0D108BD9-81ED-4DB2-BD59-A6C34878D82A}">
+                        <a16:rowId xmlns:a16="http://schemas.microsoft.com/office/drawing/2014/main" val="4005437046"/>
+                      </a:ext>
+                    </a:extLst>
+                  </a:tr>
+                  <a:tr h="503056">
+                    <a:tc>
+                      <a:txBody>
+                        <a:bodyPr/>
+                        <a:lstStyle/>
+                        <a:p>
+                          <a:pPr algn="r"/>
+                          <a:r>
+                            <a:rPr lang="en-US" sz="2400" dirty="0">
+                              <a:solidFill>
+                                <a:schemeClr val="tx1"/>
+                              </a:solidFill>
+                            </a:rPr>
+                            <a:t>Striding:</a:t>
+                          </a:r>
+                        </a:p>
+                      </a:txBody>
+                      <a:tcPr marL="124041" marR="124041" marT="62021" marB="62021">
+                        <a:lnL w="12700" cap="flat" cmpd="sng" algn="ctr">
+                          <a:noFill/>
+                          <a:prstDash val="solid"/>
+                          <a:round/>
+                          <a:headEnd type="none" w="med" len="med"/>
+                          <a:tailEnd type="none" w="med" len="med"/>
+                        </a:lnL>
+                        <a:lnR w="12700" cap="flat" cmpd="sng" algn="ctr">
+                          <a:noFill/>
+                          <a:prstDash val="solid"/>
+                          <a:round/>
+                          <a:headEnd type="none" w="med" len="med"/>
+                          <a:tailEnd type="none" w="med" len="med"/>
+                        </a:lnR>
+                        <a:lnT w="12700" cap="flat" cmpd="sng" algn="ctr">
+                          <a:noFill/>
+                          <a:prstDash val="solid"/>
+                          <a:round/>
+                          <a:headEnd type="none" w="med" len="med"/>
+                          <a:tailEnd type="none" w="med" len="med"/>
+                        </a:lnT>
+                        <a:lnB w="12700" cap="flat" cmpd="sng" algn="ctr">
+                          <a:noFill/>
+                          <a:prstDash val="solid"/>
+                          <a:round/>
+                          <a:headEnd type="none" w="med" len="med"/>
+                          <a:tailEnd type="none" w="med" len="med"/>
+                        </a:lnB>
+                        <a:lnTlToBr w="12700" cmpd="sng">
+                          <a:noFill/>
+                          <a:prstDash val="solid"/>
+                        </a:lnTlToBr>
+                        <a:lnBlToTr w="12700" cmpd="sng">
+                          <a:noFill/>
+                          <a:prstDash val="solid"/>
+                        </a:lnBlToTr>
+                        <a:noFill/>
+                      </a:tcPr>
+                    </a:tc>
+                    <a:tc>
+                      <a:txBody>
+                        <a:bodyPr/>
+                        <a:lstStyle/>
+                        <a:p>
+                          <a:pPr marL="0" marR="0" lvl="0" indent="0" algn="l" defTabSz="914400" rtl="0" eaLnBrk="1" fontAlgn="auto" latinLnBrk="0" hangingPunct="1">
+                            <a:lnSpc>
+                              <a:spcPct val="100000"/>
+                            </a:lnSpc>
+                            <a:spcBef>
+                              <a:spcPts val="0"/>
+                            </a:spcBef>
+                            <a:spcAft>
+                              <a:spcPts val="0"/>
+                            </a:spcAft>
+                            <a:buClrTx/>
+                            <a:buSzTx/>
+                            <a:buFontTx/>
+                            <a:buNone/>
+                            <a:tabLst/>
+                            <a:defRPr/>
+                          </a:pPr>
+                          <a14:m>
+                            <m:oMathPara xmlns:m="http://schemas.openxmlformats.org/officeDocument/2006/math">
+                              <m:oMathParaPr>
+                                <m:jc m:val="centerGroup"/>
+                              </m:oMathParaPr>
+                              <m:oMath xmlns:m="http://schemas.openxmlformats.org/officeDocument/2006/math">
+                                <m:r>
+                                  <a:rPr lang="en-US" sz="2400" smtClean="0">
+                                    <a:solidFill>
+                                      <a:schemeClr val="tx1"/>
+                                    </a:solidFill>
+                                    <a:latin typeface="Cambria Math" panose="02040503050406030204" pitchFamily="18" charset="0"/>
+                                  </a:rPr>
+                                  <m:t>(</m:t>
+                                </m:r>
+                                <m:sSub>
+                                  <m:sSubPr>
+                                    <m:ctrlPr>
+                                      <a:rPr lang="en-US" sz="2400" i="1">
+                                        <a:solidFill>
+                                          <a:schemeClr val="tx1"/>
+                                        </a:solidFill>
+                                        <a:latin typeface="Cambria Math" panose="02040503050406030204" pitchFamily="18" charset="0"/>
+                                      </a:rPr>
+                                    </m:ctrlPr>
+                                  </m:sSubPr>
+                                  <m:e>
+                                    <m:r>
+                                      <m:rPr>
+                                        <m:sty m:val="p"/>
+                                      </m:rPr>
+                                      <a:rPr lang="en-US" sz="2400">
+                                        <a:solidFill>
+                                          <a:schemeClr val="tx1"/>
+                                        </a:solidFill>
+                                        <a:latin typeface="Cambria Math" panose="02040503050406030204" pitchFamily="18" charset="0"/>
+                                      </a:rPr>
+                                      <m:t>s</m:t>
+                                    </m:r>
+                                  </m:e>
+                                  <m:sub>
+                                    <m:r>
+                                      <a:rPr lang="en-US" sz="2400">
+                                        <a:solidFill>
+                                          <a:schemeClr val="tx1"/>
+                                        </a:solidFill>
+                                        <a:latin typeface="Cambria Math" panose="02040503050406030204" pitchFamily="18" charset="0"/>
+                                      </a:rPr>
+                                      <m:t>1</m:t>
+                                    </m:r>
+                                  </m:sub>
+                                </m:sSub>
+                                <m:r>
+                                  <a:rPr lang="en-US" sz="2400">
+                                    <a:solidFill>
+                                      <a:schemeClr val="tx1"/>
+                                    </a:solidFill>
+                                    <a:latin typeface="Cambria Math" panose="02040503050406030204" pitchFamily="18" charset="0"/>
+                                  </a:rPr>
+                                  <m:t>,</m:t>
+                                </m:r>
+                                <m:sSub>
+                                  <m:sSubPr>
+                                    <m:ctrlPr>
+                                      <a:rPr lang="en-US" sz="2400" i="1">
+                                        <a:solidFill>
+                                          <a:schemeClr val="tx1"/>
+                                        </a:solidFill>
+                                        <a:latin typeface="Cambria Math" panose="02040503050406030204" pitchFamily="18" charset="0"/>
+                                      </a:rPr>
+                                    </m:ctrlPr>
+                                  </m:sSubPr>
+                                  <m:e>
+                                    <m:r>
+                                      <m:rPr>
+                                        <m:sty m:val="p"/>
+                                      </m:rPr>
+                                      <a:rPr lang="en-US" sz="2400">
+                                        <a:solidFill>
+                                          <a:schemeClr val="tx1"/>
+                                        </a:solidFill>
+                                        <a:latin typeface="Cambria Math" panose="02040503050406030204" pitchFamily="18" charset="0"/>
+                                      </a:rPr>
+                                      <m:t>s</m:t>
+                                    </m:r>
+                                  </m:e>
+                                  <m:sub>
+                                    <m:r>
+                                      <a:rPr lang="en-US" sz="2400">
+                                        <a:solidFill>
+                                          <a:schemeClr val="tx1"/>
+                                        </a:solidFill>
+                                        <a:latin typeface="Cambria Math" panose="02040503050406030204" pitchFamily="18" charset="0"/>
+                                      </a:rPr>
+                                      <m:t>2</m:t>
+                                    </m:r>
+                                  </m:sub>
+                                </m:sSub>
+                                <m:r>
+                                  <a:rPr lang="en-US" sz="2400">
+                                    <a:solidFill>
+                                      <a:schemeClr val="tx1"/>
+                                    </a:solidFill>
+                                    <a:latin typeface="Cambria Math" panose="02040503050406030204" pitchFamily="18" charset="0"/>
+                                  </a:rPr>
+                                  <m:t>)</m:t>
+                                </m:r>
+                              </m:oMath>
+                            </m:oMathPara>
+                          </a14:m>
+                          <a:endParaRPr lang="en-US" sz="2400" dirty="0">
+                            <a:solidFill>
+                              <a:schemeClr val="tx1"/>
+                            </a:solidFill>
+                          </a:endParaRPr>
+                        </a:p>
+                      </a:txBody>
+                      <a:tcPr marL="124041" marR="124041" marT="62021" marB="62021">
+                        <a:lnL w="12700" cap="flat" cmpd="sng" algn="ctr">
+                          <a:noFill/>
+                          <a:prstDash val="solid"/>
+                          <a:round/>
+                          <a:headEnd type="none" w="med" len="med"/>
+                          <a:tailEnd type="none" w="med" len="med"/>
+                        </a:lnL>
+                        <a:lnR w="12700" cap="flat" cmpd="sng" algn="ctr">
+                          <a:noFill/>
+                          <a:prstDash val="solid"/>
+                          <a:round/>
+                          <a:headEnd type="none" w="med" len="med"/>
+                          <a:tailEnd type="none" w="med" len="med"/>
+                        </a:lnR>
+                        <a:lnT w="12700" cap="flat" cmpd="sng" algn="ctr">
+                          <a:noFill/>
+                          <a:prstDash val="solid"/>
+                          <a:round/>
+                          <a:headEnd type="none" w="med" len="med"/>
+                          <a:tailEnd type="none" w="med" len="med"/>
+                        </a:lnT>
+                        <a:lnB w="12700" cap="flat" cmpd="sng" algn="ctr">
+                          <a:noFill/>
+                          <a:prstDash val="solid"/>
+                          <a:round/>
+                          <a:headEnd type="none" w="med" len="med"/>
+                          <a:tailEnd type="none" w="med" len="med"/>
+                        </a:lnB>
+                        <a:lnTlToBr w="12700" cmpd="sng">
+                          <a:noFill/>
+                          <a:prstDash val="solid"/>
+                        </a:lnTlToBr>
+                        <a:lnBlToTr w="12700" cmpd="sng">
+                          <a:noFill/>
+                          <a:prstDash val="solid"/>
+                        </a:lnBlToTr>
+                        <a:noFill/>
+                      </a:tcPr>
+                    </a:tc>
+                    <a:extLst>
+                      <a:ext uri="{0D108BD9-81ED-4DB2-BD59-A6C34878D82A}">
+                        <a16:rowId xmlns:a16="http://schemas.microsoft.com/office/drawing/2014/main" val="898271232"/>
+                      </a:ext>
+                    </a:extLst>
+                  </a:tr>
+                  <a:tr h="503056">
+                    <a:tc>
+                      <a:txBody>
+                        <a:bodyPr/>
+                        <a:lstStyle/>
+                        <a:p>
+                          <a:pPr algn="r"/>
+                          <a:r>
+                            <a:rPr lang="en-US" sz="2400" strike="sngStrike" dirty="0">
+                              <a:solidFill>
+                                <a:schemeClr val="tx1"/>
+                              </a:solidFill>
+                            </a:rPr>
+                            <a:t>Dilation:</a:t>
+                          </a:r>
+                        </a:p>
+                      </a:txBody>
+                      <a:tcPr marL="124041" marR="124041" marT="62021" marB="62021">
+                        <a:lnL w="12700" cap="flat" cmpd="sng" algn="ctr">
+                          <a:noFill/>
+                          <a:prstDash val="solid"/>
+                          <a:round/>
+                          <a:headEnd type="none" w="med" len="med"/>
+                          <a:tailEnd type="none" w="med" len="med"/>
+                        </a:lnL>
+                        <a:lnR w="12700" cap="flat" cmpd="sng" algn="ctr">
+                          <a:noFill/>
+                          <a:prstDash val="solid"/>
+                          <a:round/>
+                          <a:headEnd type="none" w="med" len="med"/>
+                          <a:tailEnd type="none" w="med" len="med"/>
+                        </a:lnR>
+                        <a:lnT w="12700" cap="flat" cmpd="sng" algn="ctr">
+                          <a:noFill/>
+                          <a:prstDash val="solid"/>
+                          <a:round/>
+                          <a:headEnd type="none" w="med" len="med"/>
+                          <a:tailEnd type="none" w="med" len="med"/>
+                        </a:lnT>
+                        <a:lnB w="12700" cap="flat" cmpd="sng" algn="ctr">
+                          <a:noFill/>
+                          <a:prstDash val="solid"/>
+                          <a:round/>
+                          <a:headEnd type="none" w="med" len="med"/>
+                          <a:tailEnd type="none" w="med" len="med"/>
+                        </a:lnB>
+                        <a:lnTlToBr w="12700" cmpd="sng">
+                          <a:noFill/>
+                          <a:prstDash val="solid"/>
+                        </a:lnTlToBr>
+                        <a:lnBlToTr w="12700" cmpd="sng">
+                          <a:noFill/>
+                          <a:prstDash val="solid"/>
+                        </a:lnBlToTr>
+                        <a:noFill/>
+                      </a:tcPr>
+                    </a:tc>
+                    <a:tc>
+                      <a:txBody>
+                        <a:bodyPr/>
+                        <a:lstStyle/>
+                        <a:p>
+                          <a:pPr marL="0" marR="0" lvl="0" indent="0" algn="l" defTabSz="914400" rtl="0" eaLnBrk="1" fontAlgn="auto" latinLnBrk="0" hangingPunct="1">
+                            <a:lnSpc>
+                              <a:spcPct val="100000"/>
+                            </a:lnSpc>
+                            <a:spcBef>
+                              <a:spcPts val="0"/>
+                            </a:spcBef>
+                            <a:spcAft>
+                              <a:spcPts val="0"/>
+                            </a:spcAft>
+                            <a:buClrTx/>
+                            <a:buSzTx/>
+                            <a:buFontTx/>
+                            <a:buNone/>
+                            <a:tabLst/>
+                            <a:defRPr/>
+                          </a:pPr>
+                          <a14:m>
+                            <m:oMathPara xmlns:m="http://schemas.openxmlformats.org/officeDocument/2006/math">
+                              <m:oMathParaPr>
+                                <m:jc m:val="centerGroup"/>
+                              </m:oMathParaPr>
+                              <m:oMath xmlns:m="http://schemas.openxmlformats.org/officeDocument/2006/math">
+                                <m:r>
+                                  <a:rPr lang="en-US" sz="2400" b="0" i="0" strike="sngStrike" smtClean="0">
+                                    <a:solidFill>
+                                      <a:schemeClr val="tx1"/>
+                                    </a:solidFill>
+                                    <a:latin typeface="Cambria Math" panose="02040503050406030204" pitchFamily="18" charset="0"/>
+                                  </a:rPr>
+                                  <m:t>(</m:t>
+                                </m:r>
+                                <m:sSub>
+                                  <m:sSubPr>
+                                    <m:ctrlPr>
+                                      <a:rPr lang="en-US" sz="2400" b="0" i="1" strike="sngStrike" smtClean="0">
+                                        <a:solidFill>
+                                          <a:schemeClr val="tx1"/>
+                                        </a:solidFill>
+                                        <a:latin typeface="Cambria Math" panose="02040503050406030204" pitchFamily="18" charset="0"/>
+                                      </a:rPr>
+                                    </m:ctrlPr>
+                                  </m:sSubPr>
+                                  <m:e>
+                                    <m:r>
+                                      <a:rPr lang="en-US" sz="2400" b="0" i="1" strike="sngStrike" smtClean="0">
+                                        <a:solidFill>
+                                          <a:schemeClr val="tx1"/>
+                                        </a:solidFill>
+                                        <a:latin typeface="Cambria Math" panose="02040503050406030204" pitchFamily="18" charset="0"/>
+                                      </a:rPr>
+                                      <m:t>𝑑</m:t>
+                                    </m:r>
+                                  </m:e>
+                                  <m:sub>
+                                    <m:r>
+                                      <a:rPr lang="en-US" sz="2400" b="0" i="1" strike="sngStrike" smtClean="0">
+                                        <a:solidFill>
+                                          <a:schemeClr val="tx1"/>
+                                        </a:solidFill>
+                                        <a:latin typeface="Cambria Math" panose="02040503050406030204" pitchFamily="18" charset="0"/>
+                                      </a:rPr>
+                                      <m:t>1</m:t>
+                                    </m:r>
+                                  </m:sub>
+                                </m:sSub>
+                                <m:r>
+                                  <a:rPr lang="en-US" sz="2400" b="0" i="0" strike="sngStrike" smtClean="0">
+                                    <a:solidFill>
+                                      <a:schemeClr val="tx1"/>
+                                    </a:solidFill>
+                                    <a:latin typeface="Cambria Math" panose="02040503050406030204" pitchFamily="18" charset="0"/>
+                                  </a:rPr>
+                                  <m:t>,</m:t>
+                                </m:r>
+                                <m:sSub>
+                                  <m:sSubPr>
+                                    <m:ctrlPr>
+                                      <a:rPr lang="en-US" sz="2400" b="0" i="1" strike="sngStrike" smtClean="0">
+                                        <a:solidFill>
+                                          <a:schemeClr val="tx1"/>
+                                        </a:solidFill>
+                                        <a:latin typeface="Cambria Math" panose="02040503050406030204" pitchFamily="18" charset="0"/>
+                                      </a:rPr>
+                                    </m:ctrlPr>
+                                  </m:sSubPr>
+                                  <m:e>
+                                    <m:r>
+                                      <a:rPr lang="en-US" sz="2400" b="0" i="1" strike="sngStrike" smtClean="0">
+                                        <a:solidFill>
+                                          <a:schemeClr val="tx1"/>
+                                        </a:solidFill>
+                                        <a:latin typeface="Cambria Math" panose="02040503050406030204" pitchFamily="18" charset="0"/>
+                                      </a:rPr>
+                                      <m:t>𝑑</m:t>
+                                    </m:r>
+                                  </m:e>
+                                  <m:sub>
+                                    <m:r>
+                                      <a:rPr lang="en-US" sz="2400" b="0" i="0" strike="sngStrike" smtClean="0">
+                                        <a:solidFill>
+                                          <a:schemeClr val="tx1"/>
+                                        </a:solidFill>
+                                        <a:latin typeface="Cambria Math" panose="02040503050406030204" pitchFamily="18" charset="0"/>
+                                      </a:rPr>
+                                      <m:t>2</m:t>
+                                    </m:r>
+                                  </m:sub>
+                                </m:sSub>
+                                <m:r>
+                                  <a:rPr lang="en-US" sz="2400" b="0" i="0" strike="sngStrike" smtClean="0">
+                                    <a:solidFill>
+                                      <a:schemeClr val="tx1"/>
+                                    </a:solidFill>
+                                    <a:latin typeface="Cambria Math" panose="02040503050406030204" pitchFamily="18" charset="0"/>
+                                  </a:rPr>
+                                  <m:t>)</m:t>
+                                </m:r>
+                              </m:oMath>
+                            </m:oMathPara>
+                          </a14:m>
+                          <a:endParaRPr lang="en-US" sz="2400" strike="sngStrike" dirty="0">
+                            <a:solidFill>
+                              <a:schemeClr val="tx1"/>
+                            </a:solidFill>
+                          </a:endParaRPr>
+                        </a:p>
+                      </a:txBody>
+                      <a:tcPr marL="124041" marR="124041" marT="62021" marB="62021">
+                        <a:lnL w="12700" cap="flat" cmpd="sng" algn="ctr">
+                          <a:noFill/>
+                          <a:prstDash val="solid"/>
+                          <a:round/>
+                          <a:headEnd type="none" w="med" len="med"/>
+                          <a:tailEnd type="none" w="med" len="med"/>
+                        </a:lnL>
+                        <a:lnR w="12700" cap="flat" cmpd="sng" algn="ctr">
+                          <a:noFill/>
+                          <a:prstDash val="solid"/>
+                          <a:round/>
+                          <a:headEnd type="none" w="med" len="med"/>
+                          <a:tailEnd type="none" w="med" len="med"/>
+                        </a:lnR>
+                        <a:lnT w="12700" cap="flat" cmpd="sng" algn="ctr">
+                          <a:noFill/>
+                          <a:prstDash val="solid"/>
+                          <a:round/>
+                          <a:headEnd type="none" w="med" len="med"/>
+                          <a:tailEnd type="none" w="med" len="med"/>
+                        </a:lnT>
+                        <a:lnB w="12700" cap="flat" cmpd="sng" algn="ctr">
+                          <a:noFill/>
+                          <a:prstDash val="solid"/>
+                          <a:round/>
+                          <a:headEnd type="none" w="med" len="med"/>
+                          <a:tailEnd type="none" w="med" len="med"/>
+                        </a:lnB>
+                        <a:lnTlToBr w="12700" cmpd="sng">
+                          <a:noFill/>
+                          <a:prstDash val="solid"/>
+                        </a:lnTlToBr>
+                        <a:lnBlToTr w="12700" cmpd="sng">
+                          <a:noFill/>
+                          <a:prstDash val="solid"/>
+                        </a:lnBlToTr>
+                        <a:noFill/>
+                      </a:tcPr>
+                    </a:tc>
+                    <a:extLst>
+                      <a:ext uri="{0D108BD9-81ED-4DB2-BD59-A6C34878D82A}">
+                        <a16:rowId xmlns:a16="http://schemas.microsoft.com/office/drawing/2014/main" val="221637713"/>
+                      </a:ext>
+                    </a:extLst>
+                  </a:tr>
+                  <a:tr h="503056">
+                    <a:tc>
+                      <a:txBody>
+                        <a:bodyPr/>
+                        <a:lstStyle/>
+                        <a:p>
+                          <a:pPr algn="r"/>
+                          <a:r>
+                            <a:rPr lang="en-US" sz="2400" dirty="0">
+                              <a:solidFill>
+                                <a:schemeClr val="tx1"/>
+                              </a:solidFill>
+                            </a:rPr>
+                            <a:t>Output image:</a:t>
+                          </a:r>
+                        </a:p>
+                      </a:txBody>
+                      <a:tcPr marL="124041" marR="124041" marT="62021" marB="62021">
+                        <a:lnL w="12700" cap="flat" cmpd="sng" algn="ctr">
+                          <a:noFill/>
+                          <a:prstDash val="solid"/>
+                          <a:round/>
+                          <a:headEnd type="none" w="med" len="med"/>
+                          <a:tailEnd type="none" w="med" len="med"/>
+                        </a:lnL>
+                        <a:lnR w="12700" cap="flat" cmpd="sng" algn="ctr">
+                          <a:noFill/>
+                          <a:prstDash val="solid"/>
+                          <a:round/>
+                          <a:headEnd type="none" w="med" len="med"/>
+                          <a:tailEnd type="none" w="med" len="med"/>
+                        </a:lnR>
+                        <a:lnT w="12700" cap="flat" cmpd="sng" algn="ctr">
+                          <a:noFill/>
+                          <a:prstDash val="solid"/>
+                          <a:round/>
+                          <a:headEnd type="none" w="med" len="med"/>
+                          <a:tailEnd type="none" w="med" len="med"/>
+                        </a:lnT>
+                        <a:lnB w="12700" cap="flat" cmpd="sng" algn="ctr">
+                          <a:noFill/>
+                          <a:prstDash val="solid"/>
+                          <a:round/>
+                          <a:headEnd type="none" w="med" len="med"/>
+                          <a:tailEnd type="none" w="med" len="med"/>
+                        </a:lnB>
+                        <a:lnTlToBr w="12700" cmpd="sng">
+                          <a:noFill/>
+                          <a:prstDash val="solid"/>
+                        </a:lnTlToBr>
+                        <a:lnBlToTr w="12700" cmpd="sng">
+                          <a:noFill/>
+                          <a:prstDash val="solid"/>
+                        </a:lnBlToTr>
+                        <a:noFill/>
+                      </a:tcPr>
+                    </a:tc>
+                    <a:tc>
+                      <a:txBody>
+                        <a:bodyPr/>
+                        <a:lstStyle/>
+                        <a:p>
+                          <a:pPr/>
+                          <a14:m>
+                            <m:oMathPara xmlns:m="http://schemas.openxmlformats.org/officeDocument/2006/math">
+                              <m:oMathParaPr>
+                                <m:jc m:val="centerGroup"/>
+                              </m:oMathParaPr>
+                              <m:oMath xmlns:m="http://schemas.openxmlformats.org/officeDocument/2006/math">
+                                <m:r>
+                                  <a:rPr lang="en-US" sz="2400" b="0" i="0" smtClean="0">
+                                    <a:solidFill>
+                                      <a:schemeClr val="tx1"/>
+                                    </a:solidFill>
+                                    <a:latin typeface="Cambria Math" panose="02040503050406030204" pitchFamily="18" charset="0"/>
+                                  </a:rPr>
+                                  <m:t>(</m:t>
+                                </m:r>
+                                <m:r>
+                                  <a:rPr lang="en-US" sz="2400" b="0" i="1" smtClean="0">
+                                    <a:solidFill>
+                                      <a:schemeClr val="tx1"/>
+                                    </a:solidFill>
+                                    <a:latin typeface="Cambria Math" panose="02040503050406030204" pitchFamily="18" charset="0"/>
+                                  </a:rPr>
+                                  <m:t>𝑜𝑢</m:t>
+                                </m:r>
+                                <m:sSub>
+                                  <m:sSubPr>
+                                    <m:ctrlPr>
+                                      <a:rPr lang="en-US" sz="2400" b="0" i="1" smtClean="0">
+                                        <a:solidFill>
+                                          <a:schemeClr val="tx1"/>
+                                        </a:solidFill>
+                                        <a:latin typeface="Cambria Math" panose="02040503050406030204" pitchFamily="18" charset="0"/>
+                                      </a:rPr>
+                                    </m:ctrlPr>
+                                  </m:sSubPr>
+                                  <m:e>
+                                    <m:r>
+                                      <a:rPr lang="en-US" sz="2400" b="0" i="1" smtClean="0">
+                                        <a:solidFill>
+                                          <a:schemeClr val="tx1"/>
+                                        </a:solidFill>
+                                        <a:latin typeface="Cambria Math" panose="02040503050406030204" pitchFamily="18" charset="0"/>
+                                      </a:rPr>
+                                      <m:t>𝑡</m:t>
+                                    </m:r>
+                                  </m:e>
+                                  <m:sub>
+                                    <m:r>
+                                      <a:rPr lang="en-US" sz="2400" b="0" i="1" smtClean="0">
+                                        <a:solidFill>
+                                          <a:schemeClr val="tx1"/>
+                                        </a:solidFill>
+                                        <a:latin typeface="Cambria Math" panose="02040503050406030204" pitchFamily="18" charset="0"/>
+                                      </a:rPr>
+                                      <m:t>1</m:t>
+                                    </m:r>
+                                  </m:sub>
+                                </m:sSub>
+                                <m:r>
+                                  <a:rPr lang="en-US" sz="2400" b="0" i="1" smtClean="0">
+                                    <a:solidFill>
+                                      <a:schemeClr val="tx1"/>
+                                    </a:solidFill>
+                                    <a:latin typeface="Cambria Math" panose="02040503050406030204" pitchFamily="18" charset="0"/>
+                                  </a:rPr>
+                                  <m:t>,</m:t>
+                                </m:r>
+                                <m:r>
+                                  <a:rPr lang="en-US" sz="2400" b="0" i="1" smtClean="0">
+                                    <a:solidFill>
+                                      <a:schemeClr val="tx1"/>
+                                    </a:solidFill>
+                                    <a:latin typeface="Cambria Math" panose="02040503050406030204" pitchFamily="18" charset="0"/>
+                                  </a:rPr>
+                                  <m:t>𝑜𝑢</m:t>
+                                </m:r>
+                                <m:sSub>
+                                  <m:sSubPr>
+                                    <m:ctrlPr>
+                                      <a:rPr lang="en-US" sz="2400" b="0" i="1" smtClean="0">
+                                        <a:solidFill>
+                                          <a:schemeClr val="tx1"/>
+                                        </a:solidFill>
+                                        <a:latin typeface="Cambria Math" panose="02040503050406030204" pitchFamily="18" charset="0"/>
+                                      </a:rPr>
+                                    </m:ctrlPr>
+                                  </m:sSubPr>
+                                  <m:e>
+                                    <m:r>
+                                      <a:rPr lang="en-US" sz="2400" b="0" i="1" smtClean="0">
+                                        <a:solidFill>
+                                          <a:schemeClr val="tx1"/>
+                                        </a:solidFill>
+                                        <a:latin typeface="Cambria Math" panose="02040503050406030204" pitchFamily="18" charset="0"/>
+                                      </a:rPr>
+                                      <m:t>𝑡</m:t>
+                                    </m:r>
+                                  </m:e>
+                                  <m:sub>
+                                    <m:r>
+                                      <a:rPr lang="en-US" sz="2400" b="0" i="1" smtClean="0">
+                                        <a:solidFill>
+                                          <a:schemeClr val="tx1"/>
+                                        </a:solidFill>
+                                        <a:latin typeface="Cambria Math" panose="02040503050406030204" pitchFamily="18" charset="0"/>
+                                      </a:rPr>
+                                      <m:t>2</m:t>
+                                    </m:r>
+                                  </m:sub>
+                                </m:sSub>
+                                <m:r>
+                                  <a:rPr lang="en-US" sz="2400" b="0" i="1" smtClean="0">
+                                    <a:solidFill>
+                                      <a:schemeClr val="tx1"/>
+                                    </a:solidFill>
+                                    <a:latin typeface="Cambria Math" panose="02040503050406030204" pitchFamily="18" charset="0"/>
+                                  </a:rPr>
+                                  <m:t>)</m:t>
+                                </m:r>
+                              </m:oMath>
+                            </m:oMathPara>
+                          </a14:m>
+                          <a:endParaRPr lang="en-US" sz="2400" dirty="0">
+                            <a:solidFill>
+                              <a:schemeClr val="tx1"/>
+                            </a:solidFill>
+                          </a:endParaRPr>
+                        </a:p>
+                      </a:txBody>
+                      <a:tcPr marL="124041" marR="124041" marT="62021" marB="62021">
+                        <a:lnL w="12700" cap="flat" cmpd="sng" algn="ctr">
+                          <a:noFill/>
+                          <a:prstDash val="solid"/>
+                          <a:round/>
+                          <a:headEnd type="none" w="med" len="med"/>
+                          <a:tailEnd type="none" w="med" len="med"/>
+                        </a:lnL>
+                        <a:lnR w="12700" cap="flat" cmpd="sng" algn="ctr">
+                          <a:noFill/>
+                          <a:prstDash val="solid"/>
+                          <a:round/>
+                          <a:headEnd type="none" w="med" len="med"/>
+                          <a:tailEnd type="none" w="med" len="med"/>
+                        </a:lnR>
+                        <a:lnT w="12700" cap="flat" cmpd="sng" algn="ctr">
+                          <a:noFill/>
+                          <a:prstDash val="solid"/>
+                          <a:round/>
+                          <a:headEnd type="none" w="med" len="med"/>
+                          <a:tailEnd type="none" w="med" len="med"/>
+                        </a:lnT>
+                        <a:lnB w="12700" cap="flat" cmpd="sng" algn="ctr">
+                          <a:noFill/>
+                          <a:prstDash val="solid"/>
+                          <a:round/>
+                          <a:headEnd type="none" w="med" len="med"/>
+                          <a:tailEnd type="none" w="med" len="med"/>
+                        </a:lnB>
+                        <a:lnTlToBr w="12700" cmpd="sng">
+                          <a:noFill/>
+                          <a:prstDash val="solid"/>
+                        </a:lnTlToBr>
+                        <a:lnBlToTr w="12700" cmpd="sng">
+                          <a:noFill/>
+                          <a:prstDash val="solid"/>
+                        </a:lnBlToTr>
+                        <a:noFill/>
+                      </a:tcPr>
+                    </a:tc>
+                    <a:extLst>
+                      <a:ext uri="{0D108BD9-81ED-4DB2-BD59-A6C34878D82A}">
+                        <a16:rowId xmlns:a16="http://schemas.microsoft.com/office/drawing/2014/main" val="4135396076"/>
+                      </a:ext>
+                    </a:extLst>
+                  </a:tr>
+                  <a:tr h="503056">
+                    <a:tc>
+                      <a:txBody>
+                        <a:bodyPr/>
+                        <a:lstStyle/>
+                        <a:p>
+                          <a:pPr algn="r"/>
+                          <a:r>
+                            <a:rPr lang="en-US" sz="2400" strike="sngStrike" dirty="0">
+                              <a:solidFill>
+                                <a:schemeClr val="tx1"/>
+                              </a:solidFill>
+                            </a:rPr>
+                            <a:t>Output padding:</a:t>
+                          </a:r>
+                        </a:p>
+                      </a:txBody>
+                      <a:tcPr marL="124041" marR="124041" marT="62021" marB="62021">
+                        <a:lnL w="12700" cap="flat" cmpd="sng" algn="ctr">
+                          <a:noFill/>
+                          <a:prstDash val="solid"/>
+                          <a:round/>
+                          <a:headEnd type="none" w="med" len="med"/>
+                          <a:tailEnd type="none" w="med" len="med"/>
+                        </a:lnL>
+                        <a:lnR w="12700" cap="flat" cmpd="sng" algn="ctr">
+                          <a:noFill/>
+                          <a:prstDash val="solid"/>
+                          <a:round/>
+                          <a:headEnd type="none" w="med" len="med"/>
+                          <a:tailEnd type="none" w="med" len="med"/>
+                        </a:lnR>
+                        <a:lnT w="12700" cap="flat" cmpd="sng" algn="ctr">
+                          <a:noFill/>
+                          <a:prstDash val="solid"/>
+                          <a:round/>
+                          <a:headEnd type="none" w="med" len="med"/>
+                          <a:tailEnd type="none" w="med" len="med"/>
+                        </a:lnT>
+                        <a:lnB w="12700" cap="flat" cmpd="sng" algn="ctr">
+                          <a:noFill/>
+                          <a:prstDash val="solid"/>
+                          <a:round/>
+                          <a:headEnd type="none" w="med" len="med"/>
+                          <a:tailEnd type="none" w="med" len="med"/>
+                        </a:lnB>
+                        <a:lnTlToBr w="12700" cmpd="sng">
+                          <a:noFill/>
+                          <a:prstDash val="solid"/>
+                        </a:lnTlToBr>
+                        <a:lnBlToTr w="12700" cmpd="sng">
+                          <a:noFill/>
+                          <a:prstDash val="solid"/>
+                        </a:lnBlToTr>
+                        <a:noFill/>
+                      </a:tcPr>
+                    </a:tc>
+                    <a:tc>
+                      <a:txBody>
+                        <a:bodyPr/>
+                        <a:lstStyle/>
+                        <a:p>
+                          <a:pPr marL="0" marR="0" lvl="0" indent="0" algn="l" defTabSz="914400" rtl="0" eaLnBrk="1" fontAlgn="auto" latinLnBrk="0" hangingPunct="1">
+                            <a:lnSpc>
+                              <a:spcPct val="100000"/>
+                            </a:lnSpc>
+                            <a:spcBef>
+                              <a:spcPts val="0"/>
+                            </a:spcBef>
+                            <a:spcAft>
+                              <a:spcPts val="0"/>
+                            </a:spcAft>
+                            <a:buClrTx/>
+                            <a:buSzTx/>
+                            <a:buFontTx/>
+                            <a:buNone/>
+                            <a:tabLst/>
+                            <a:defRPr/>
+                          </a:pPr>
+                          <a14:m>
+                            <m:oMathPara xmlns:m="http://schemas.openxmlformats.org/officeDocument/2006/math">
+                              <m:oMathParaPr>
+                                <m:jc m:val="centerGroup"/>
+                              </m:oMathParaPr>
+                              <m:oMath xmlns:m="http://schemas.openxmlformats.org/officeDocument/2006/math">
+                                <m:r>
+                                  <a:rPr lang="en-US" sz="2400" b="0" i="0" strike="sngStrike" smtClean="0">
+                                    <a:solidFill>
+                                      <a:schemeClr val="tx1"/>
+                                    </a:solidFill>
+                                    <a:latin typeface="Cambria Math" panose="02040503050406030204" pitchFamily="18" charset="0"/>
+                                  </a:rPr>
+                                  <m:t>(</m:t>
+                                </m:r>
+                                <m:sSub>
+                                  <m:sSubPr>
+                                    <m:ctrlPr>
+                                      <a:rPr lang="en-US" sz="2400" b="0" i="1" strike="sngStrike" smtClean="0">
+                                        <a:solidFill>
+                                          <a:schemeClr val="tx1"/>
+                                        </a:solidFill>
+                                        <a:latin typeface="Cambria Math" panose="02040503050406030204" pitchFamily="18" charset="0"/>
+                                      </a:rPr>
+                                    </m:ctrlPr>
+                                  </m:sSubPr>
+                                  <m:e>
+                                    <m:acc>
+                                      <m:accPr>
+                                        <m:chr m:val="̃"/>
+                                        <m:ctrlPr>
+                                          <a:rPr lang="en-US" sz="2400" b="0" i="1" strike="sngStrike" smtClean="0">
+                                            <a:solidFill>
+                                              <a:schemeClr val="tx1"/>
+                                            </a:solidFill>
+                                            <a:latin typeface="Cambria Math" panose="02040503050406030204" pitchFamily="18" charset="0"/>
+                                          </a:rPr>
+                                        </m:ctrlPr>
+                                      </m:accPr>
+                                      <m:e>
+                                        <m:r>
+                                          <a:rPr lang="en-US" sz="2400" b="0" i="1" strike="sngStrike" smtClean="0">
+                                            <a:solidFill>
+                                              <a:schemeClr val="tx1"/>
+                                            </a:solidFill>
+                                            <a:latin typeface="Cambria Math" panose="02040503050406030204" pitchFamily="18" charset="0"/>
+                                          </a:rPr>
+                                          <m:t>𝑝</m:t>
+                                        </m:r>
+                                      </m:e>
+                                    </m:acc>
+                                  </m:e>
+                                  <m:sub>
+                                    <m:r>
+                                      <a:rPr lang="en-US" sz="2400" b="0" i="1" strike="sngStrike" smtClean="0">
+                                        <a:solidFill>
+                                          <a:schemeClr val="tx1"/>
+                                        </a:solidFill>
+                                        <a:latin typeface="Cambria Math" panose="02040503050406030204" pitchFamily="18" charset="0"/>
+                                      </a:rPr>
+                                      <m:t>1</m:t>
+                                    </m:r>
+                                  </m:sub>
+                                </m:sSub>
+                                <m:r>
+                                  <a:rPr lang="en-US" sz="2400" b="0" i="1" strike="sngStrike" smtClean="0">
+                                    <a:solidFill>
+                                      <a:schemeClr val="tx1"/>
+                                    </a:solidFill>
+                                    <a:latin typeface="Cambria Math" panose="02040503050406030204" pitchFamily="18" charset="0"/>
+                                  </a:rPr>
+                                  <m:t>,</m:t>
+                                </m:r>
+                                <m:sSub>
+                                  <m:sSubPr>
+                                    <m:ctrlPr>
+                                      <a:rPr lang="en-US" sz="2400" b="0" i="1" strike="sngStrike" smtClean="0">
+                                        <a:solidFill>
+                                          <a:schemeClr val="tx1"/>
+                                        </a:solidFill>
+                                        <a:latin typeface="Cambria Math" panose="02040503050406030204" pitchFamily="18" charset="0"/>
+                                      </a:rPr>
+                                    </m:ctrlPr>
+                                  </m:sSubPr>
+                                  <m:e>
+                                    <m:acc>
+                                      <m:accPr>
+                                        <m:chr m:val="̃"/>
+                                        <m:ctrlPr>
+                                          <a:rPr lang="en-US" sz="2400" b="0" i="1" strike="sngStrike" smtClean="0">
+                                            <a:solidFill>
+                                              <a:schemeClr val="tx1"/>
+                                            </a:solidFill>
+                                            <a:latin typeface="Cambria Math" panose="02040503050406030204" pitchFamily="18" charset="0"/>
+                                          </a:rPr>
+                                        </m:ctrlPr>
+                                      </m:accPr>
+                                      <m:e>
+                                        <m:r>
+                                          <a:rPr lang="en-US" sz="2400" b="0" i="1" strike="sngStrike" smtClean="0">
+                                            <a:solidFill>
+                                              <a:schemeClr val="tx1"/>
+                                            </a:solidFill>
+                                            <a:latin typeface="Cambria Math" panose="02040503050406030204" pitchFamily="18" charset="0"/>
+                                          </a:rPr>
+                                          <m:t>𝑝</m:t>
+                                        </m:r>
+                                      </m:e>
+                                    </m:acc>
+                                  </m:e>
+                                  <m:sub>
+                                    <m:r>
+                                      <a:rPr lang="en-US" sz="2400" b="0" i="1" strike="sngStrike" smtClean="0">
+                                        <a:solidFill>
+                                          <a:schemeClr val="tx1"/>
+                                        </a:solidFill>
+                                        <a:latin typeface="Cambria Math" panose="02040503050406030204" pitchFamily="18" charset="0"/>
+                                      </a:rPr>
+                                      <m:t>2</m:t>
+                                    </m:r>
+                                  </m:sub>
+                                </m:sSub>
+                                <m:r>
+                                  <a:rPr lang="en-US" sz="2400" b="0" i="1" strike="sngStrike" smtClean="0">
+                                    <a:solidFill>
+                                      <a:schemeClr val="tx1"/>
+                                    </a:solidFill>
+                                    <a:latin typeface="Cambria Math" panose="02040503050406030204" pitchFamily="18" charset="0"/>
+                                  </a:rPr>
+                                  <m:t>)</m:t>
+                                </m:r>
+                              </m:oMath>
+                            </m:oMathPara>
+                          </a14:m>
+                          <a:endParaRPr lang="en-US" sz="2400" strike="sngStrike" dirty="0">
+                            <a:solidFill>
+                              <a:schemeClr val="tx1"/>
+                            </a:solidFill>
+                          </a:endParaRPr>
+                        </a:p>
+                      </a:txBody>
+                      <a:tcPr marL="124041" marR="124041" marT="62021" marB="62021">
+                        <a:lnL w="12700" cap="flat" cmpd="sng" algn="ctr">
+                          <a:noFill/>
+                          <a:prstDash val="solid"/>
+                          <a:round/>
+                          <a:headEnd type="none" w="med" len="med"/>
+                          <a:tailEnd type="none" w="med" len="med"/>
+                        </a:lnL>
+                        <a:lnR w="12700" cap="flat" cmpd="sng" algn="ctr">
+                          <a:noFill/>
+                          <a:prstDash val="solid"/>
+                          <a:round/>
+                          <a:headEnd type="none" w="med" len="med"/>
+                          <a:tailEnd type="none" w="med" len="med"/>
+                        </a:lnR>
+                        <a:lnT w="12700" cap="flat" cmpd="sng" algn="ctr">
+                          <a:noFill/>
+                          <a:prstDash val="solid"/>
+                          <a:round/>
+                          <a:headEnd type="none" w="med" len="med"/>
+                          <a:tailEnd type="none" w="med" len="med"/>
+                        </a:lnT>
+                        <a:lnB w="12700" cap="flat" cmpd="sng" algn="ctr">
+                          <a:noFill/>
+                          <a:prstDash val="solid"/>
+                          <a:round/>
+                          <a:headEnd type="none" w="med" len="med"/>
+                          <a:tailEnd type="none" w="med" len="med"/>
+                        </a:lnB>
+                        <a:lnTlToBr w="12700" cmpd="sng">
+                          <a:noFill/>
+                          <a:prstDash val="solid"/>
+                        </a:lnTlToBr>
+                        <a:lnBlToTr w="12700" cmpd="sng">
+                          <a:noFill/>
+                          <a:prstDash val="solid"/>
+                        </a:lnBlToTr>
+                        <a:noFill/>
+                      </a:tcPr>
+                    </a:tc>
+                    <a:extLst>
+                      <a:ext uri="{0D108BD9-81ED-4DB2-BD59-A6C34878D82A}">
+                        <a16:rowId xmlns:a16="http://schemas.microsoft.com/office/drawing/2014/main" val="2106922570"/>
+                      </a:ext>
+                    </a:extLst>
+                  </a:tr>
+                </a:tbl>
+              </a:graphicData>
+            </a:graphic>
+          </p:graphicFrame>
+        </mc:Choice>
+        <mc:Fallback>
+          <p:graphicFrame>
+            <p:nvGraphicFramePr>
+              <p:cNvPr id="4" name="Table 4">
+                <a:extLst>
+                  <a:ext uri="{FF2B5EF4-FFF2-40B4-BE49-F238E27FC236}">
+                    <a16:creationId xmlns:a16="http://schemas.microsoft.com/office/drawing/2014/main" id="{D1FCFCAB-B3D0-9841-4EDB-7C439FFFCDD6}"/>
+                  </a:ext>
+                </a:extLst>
+              </p:cNvPr>
+              <p:cNvGraphicFramePr>
+                <a:graphicFrameLocks noGrp="1"/>
+              </p:cNvGraphicFramePr>
+              <p:nvPr>
+                <p:extLst>
+                  <p:ext uri="{D42A27DB-BD31-4B8C-83A1-F6EECF244321}">
+                    <p14:modId xmlns:p14="http://schemas.microsoft.com/office/powerpoint/2010/main" val="941068782"/>
+                  </p:ext>
+                </p:extLst>
+              </p:nvPr>
+            </p:nvGraphicFramePr>
+            <p:xfrm>
+              <a:off x="3521423" y="1690688"/>
+              <a:ext cx="5149154" cy="3521392"/>
+            </p:xfrm>
+            <a:graphic>
+              <a:graphicData uri="http://schemas.openxmlformats.org/drawingml/2006/table">
+                <a:tbl>
+                  <a:tblPr firstRow="1" bandRow="1">
+                    <a:tableStyleId>{5C22544A-7EE6-4342-B048-85BDC9FD1C3A}</a:tableStyleId>
+                  </a:tblPr>
+                  <a:tblGrid>
+                    <a:gridCol w="2574577">
+                      <a:extLst>
+                        <a:ext uri="{9D8B030D-6E8A-4147-A177-3AD203B41FA5}">
+                          <a16:colId xmlns:a16="http://schemas.microsoft.com/office/drawing/2014/main" val="1867715976"/>
+                        </a:ext>
+                      </a:extLst>
+                    </a:gridCol>
+                    <a:gridCol w="2574577">
+                      <a:extLst>
+                        <a:ext uri="{9D8B030D-6E8A-4147-A177-3AD203B41FA5}">
+                          <a16:colId xmlns:a16="http://schemas.microsoft.com/office/drawing/2014/main" val="2067955847"/>
+                        </a:ext>
+                      </a:extLst>
+                    </a:gridCol>
+                  </a:tblGrid>
+                  <a:tr h="503056">
+                    <a:tc>
+                      <a:txBody>
+                        <a:bodyPr/>
+                        <a:lstStyle/>
+                        <a:p>
+                          <a:pPr marL="0" indent="0" algn="r">
+                            <a:buNone/>
+                          </a:pPr>
+                          <a:r>
+                            <a:rPr lang="en-US" sz="2400" b="0" dirty="0">
+                              <a:solidFill>
+                                <a:schemeClr val="tx1"/>
+                              </a:solidFill>
+                            </a:rPr>
+                            <a:t>Kernel:</a:t>
+                          </a:r>
+                        </a:p>
+                      </a:txBody>
+                      <a:tcPr marL="124041" marR="124041" marT="62021" marB="62021">
+                        <a:lnL w="12700" cap="flat" cmpd="sng" algn="ctr">
+                          <a:noFill/>
+                          <a:prstDash val="solid"/>
+                          <a:round/>
+                          <a:headEnd type="none" w="med" len="med"/>
+                          <a:tailEnd type="none" w="med" len="med"/>
+                        </a:lnL>
+                        <a:lnR w="12700" cap="flat" cmpd="sng" algn="ctr">
+                          <a:noFill/>
+                          <a:prstDash val="solid"/>
+                          <a:round/>
+                          <a:headEnd type="none" w="med" len="med"/>
+                          <a:tailEnd type="none" w="med" len="med"/>
+                        </a:lnR>
+                        <a:lnT w="12700" cap="flat" cmpd="sng" algn="ctr">
+                          <a:noFill/>
+                          <a:prstDash val="solid"/>
+                          <a:round/>
+                          <a:headEnd type="none" w="med" len="med"/>
+                          <a:tailEnd type="none" w="med" len="med"/>
+                        </a:lnT>
+                        <a:lnB w="12700" cap="flat" cmpd="sng" algn="ctr">
+                          <a:noFill/>
+                          <a:prstDash val="solid"/>
+                          <a:round/>
+                          <a:headEnd type="none" w="med" len="med"/>
+                          <a:tailEnd type="none" w="med" len="med"/>
+                        </a:lnB>
+                        <a:lnTlToBr w="12700" cmpd="sng">
+                          <a:noFill/>
+                          <a:prstDash val="solid"/>
+                        </a:lnTlToBr>
+                        <a:lnBlToTr w="12700" cmpd="sng">
+                          <a:noFill/>
+                          <a:prstDash val="solid"/>
+                        </a:lnBlToTr>
+                        <a:noFill/>
+                      </a:tcPr>
+                    </a:tc>
+                    <a:tc>
+                      <a:txBody>
+                        <a:bodyPr/>
+                        <a:lstStyle/>
+                        <a:p>
+                          <a:endParaRPr lang="en-US"/>
+                        </a:p>
+                      </a:txBody>
+                      <a:tcPr marL="124041" marR="124041" marT="62021" marB="62021">
+                        <a:lnL w="12700" cap="flat" cmpd="sng" algn="ctr">
+                          <a:noFill/>
+                          <a:prstDash val="solid"/>
+                          <a:round/>
+                          <a:headEnd type="none" w="med" len="med"/>
+                          <a:tailEnd type="none" w="med" len="med"/>
+                        </a:lnL>
+                        <a:lnR w="12700" cap="flat" cmpd="sng" algn="ctr">
+                          <a:noFill/>
+                          <a:prstDash val="solid"/>
+                          <a:round/>
+                          <a:headEnd type="none" w="med" len="med"/>
+                          <a:tailEnd type="none" w="med" len="med"/>
+                        </a:lnR>
+                        <a:lnT w="12700" cap="flat" cmpd="sng" algn="ctr">
+                          <a:noFill/>
+                          <a:prstDash val="solid"/>
+                          <a:round/>
+                          <a:headEnd type="none" w="med" len="med"/>
+                          <a:tailEnd type="none" w="med" len="med"/>
+                        </a:lnT>
+                        <a:lnB w="12700" cap="flat" cmpd="sng" algn="ctr">
+                          <a:noFill/>
+                          <a:prstDash val="solid"/>
+                          <a:round/>
+                          <a:headEnd type="none" w="med" len="med"/>
+                          <a:tailEnd type="none" w="med" len="med"/>
+                        </a:lnB>
+                        <a:lnTlToBr w="12700" cmpd="sng">
+                          <a:noFill/>
+                          <a:prstDash val="solid"/>
+                        </a:lnTlToBr>
+                        <a:lnBlToTr w="12700" cmpd="sng">
+                          <a:noFill/>
+                          <a:prstDash val="solid"/>
+                        </a:lnBlToTr>
+                        <a:blipFill>
+                          <a:blip r:embed="rId4"/>
+                          <a:stretch>
+                            <a:fillRect l="-100000" t="-6024" b="-618072"/>
+                          </a:stretch>
+                        </a:blipFill>
+                      </a:tcPr>
+                    </a:tc>
+                    <a:extLst>
+                      <a:ext uri="{0D108BD9-81ED-4DB2-BD59-A6C34878D82A}">
+                        <a16:rowId xmlns:a16="http://schemas.microsoft.com/office/drawing/2014/main" val="447519452"/>
+                      </a:ext>
+                    </a:extLst>
+                  </a:tr>
+                  <a:tr h="503056">
+                    <a:tc>
+                      <a:txBody>
+                        <a:bodyPr/>
+                        <a:lstStyle/>
+                        <a:p>
+                          <a:pPr algn="r"/>
+                          <a:r>
+                            <a:rPr lang="en-US" sz="2400" dirty="0">
+                              <a:solidFill>
+                                <a:schemeClr val="tx1"/>
+                              </a:solidFill>
+                            </a:rPr>
+                            <a:t>Input image: </a:t>
+                          </a:r>
+                        </a:p>
+                      </a:txBody>
+                      <a:tcPr marL="124041" marR="124041" marT="62021" marB="62021">
+                        <a:lnL w="12700" cap="flat" cmpd="sng" algn="ctr">
+                          <a:noFill/>
+                          <a:prstDash val="solid"/>
+                          <a:round/>
+                          <a:headEnd type="none" w="med" len="med"/>
+                          <a:tailEnd type="none" w="med" len="med"/>
+                        </a:lnL>
+                        <a:lnR w="12700" cap="flat" cmpd="sng" algn="ctr">
+                          <a:noFill/>
+                          <a:prstDash val="solid"/>
+                          <a:round/>
+                          <a:headEnd type="none" w="med" len="med"/>
+                          <a:tailEnd type="none" w="med" len="med"/>
+                        </a:lnR>
+                        <a:lnT w="12700" cap="flat" cmpd="sng" algn="ctr">
+                          <a:noFill/>
+                          <a:prstDash val="solid"/>
+                          <a:round/>
+                          <a:headEnd type="none" w="med" len="med"/>
+                          <a:tailEnd type="none" w="med" len="med"/>
+                        </a:lnT>
+                        <a:lnB w="12700" cap="flat" cmpd="sng" algn="ctr">
+                          <a:noFill/>
+                          <a:prstDash val="solid"/>
+                          <a:round/>
+                          <a:headEnd type="none" w="med" len="med"/>
+                          <a:tailEnd type="none" w="med" len="med"/>
+                        </a:lnB>
+                        <a:lnTlToBr w="12700" cmpd="sng">
+                          <a:noFill/>
+                          <a:prstDash val="solid"/>
+                        </a:lnTlToBr>
+                        <a:lnBlToTr w="12700" cmpd="sng">
+                          <a:noFill/>
+                          <a:prstDash val="solid"/>
+                        </a:lnBlToTr>
+                        <a:noFill/>
+                      </a:tcPr>
+                    </a:tc>
+                    <a:tc>
+                      <a:txBody>
+                        <a:bodyPr/>
+                        <a:lstStyle/>
+                        <a:p>
+                          <a:endParaRPr lang="en-US"/>
+                        </a:p>
+                      </a:txBody>
+                      <a:tcPr marL="124041" marR="124041" marT="62021" marB="62021">
+                        <a:lnL w="12700" cap="flat" cmpd="sng" algn="ctr">
+                          <a:noFill/>
+                          <a:prstDash val="solid"/>
+                          <a:round/>
+                          <a:headEnd type="none" w="med" len="med"/>
+                          <a:tailEnd type="none" w="med" len="med"/>
+                        </a:lnL>
+                        <a:lnR w="12700" cap="flat" cmpd="sng" algn="ctr">
+                          <a:noFill/>
+                          <a:prstDash val="solid"/>
+                          <a:round/>
+                          <a:headEnd type="none" w="med" len="med"/>
+                          <a:tailEnd type="none" w="med" len="med"/>
+                        </a:lnR>
+                        <a:lnT w="12700" cap="flat" cmpd="sng" algn="ctr">
+                          <a:noFill/>
+                          <a:prstDash val="solid"/>
+                          <a:round/>
+                          <a:headEnd type="none" w="med" len="med"/>
+                          <a:tailEnd type="none" w="med" len="med"/>
+                        </a:lnT>
+                        <a:lnB w="12700" cap="flat" cmpd="sng" algn="ctr">
+                          <a:noFill/>
+                          <a:prstDash val="solid"/>
+                          <a:round/>
+                          <a:headEnd type="none" w="med" len="med"/>
+                          <a:tailEnd type="none" w="med" len="med"/>
+                        </a:lnB>
+                        <a:lnTlToBr w="12700" cmpd="sng">
+                          <a:noFill/>
+                          <a:prstDash val="solid"/>
+                        </a:lnTlToBr>
+                        <a:lnBlToTr w="12700" cmpd="sng">
+                          <a:noFill/>
+                          <a:prstDash val="solid"/>
+                        </a:lnBlToTr>
+                        <a:blipFill>
+                          <a:blip r:embed="rId4"/>
+                          <a:stretch>
+                            <a:fillRect l="-100000" t="-107317" b="-525610"/>
+                          </a:stretch>
+                        </a:blipFill>
+                      </a:tcPr>
+                    </a:tc>
+                    <a:extLst>
+                      <a:ext uri="{0D108BD9-81ED-4DB2-BD59-A6C34878D82A}">
+                        <a16:rowId xmlns:a16="http://schemas.microsoft.com/office/drawing/2014/main" val="1623022831"/>
+                      </a:ext>
+                    </a:extLst>
+                  </a:tr>
+                  <a:tr h="503056">
+                    <a:tc>
+                      <a:txBody>
+                        <a:bodyPr/>
+                        <a:lstStyle/>
+                        <a:p>
+                          <a:pPr algn="r"/>
+                          <a:r>
+                            <a:rPr lang="en-US" sz="2400" dirty="0">
+                              <a:solidFill>
+                                <a:schemeClr val="tx1"/>
+                              </a:solidFill>
+                            </a:rPr>
+                            <a:t>Padding:</a:t>
+                          </a:r>
+                        </a:p>
+                      </a:txBody>
+                      <a:tcPr marL="124041" marR="124041" marT="62021" marB="62021">
+                        <a:lnL w="12700" cap="flat" cmpd="sng" algn="ctr">
+                          <a:noFill/>
+                          <a:prstDash val="solid"/>
+                          <a:round/>
+                          <a:headEnd type="none" w="med" len="med"/>
+                          <a:tailEnd type="none" w="med" len="med"/>
+                        </a:lnL>
+                        <a:lnR w="12700" cap="flat" cmpd="sng" algn="ctr">
+                          <a:noFill/>
+                          <a:prstDash val="solid"/>
+                          <a:round/>
+                          <a:headEnd type="none" w="med" len="med"/>
+                          <a:tailEnd type="none" w="med" len="med"/>
+                        </a:lnR>
+                        <a:lnT w="12700" cap="flat" cmpd="sng" algn="ctr">
+                          <a:noFill/>
+                          <a:prstDash val="solid"/>
+                          <a:round/>
+                          <a:headEnd type="none" w="med" len="med"/>
+                          <a:tailEnd type="none" w="med" len="med"/>
+                        </a:lnT>
+                        <a:lnB w="12700" cap="flat" cmpd="sng" algn="ctr">
+                          <a:noFill/>
+                          <a:prstDash val="solid"/>
+                          <a:round/>
+                          <a:headEnd type="none" w="med" len="med"/>
+                          <a:tailEnd type="none" w="med" len="med"/>
+                        </a:lnB>
+                        <a:lnTlToBr w="12700" cmpd="sng">
+                          <a:noFill/>
+                          <a:prstDash val="solid"/>
+                        </a:lnTlToBr>
+                        <a:lnBlToTr w="12700" cmpd="sng">
+                          <a:noFill/>
+                          <a:prstDash val="solid"/>
+                        </a:lnBlToTr>
+                        <a:noFill/>
+                      </a:tcPr>
+                    </a:tc>
+                    <a:tc>
+                      <a:txBody>
+                        <a:bodyPr/>
+                        <a:lstStyle/>
+                        <a:p>
+                          <a:endParaRPr lang="en-US"/>
+                        </a:p>
+                      </a:txBody>
+                      <a:tcPr marL="124041" marR="124041" marT="62021" marB="62021">
+                        <a:lnL w="12700" cap="flat" cmpd="sng" algn="ctr">
+                          <a:noFill/>
+                          <a:prstDash val="solid"/>
+                          <a:round/>
+                          <a:headEnd type="none" w="med" len="med"/>
+                          <a:tailEnd type="none" w="med" len="med"/>
+                        </a:lnL>
+                        <a:lnR w="12700" cap="flat" cmpd="sng" algn="ctr">
+                          <a:noFill/>
+                          <a:prstDash val="solid"/>
+                          <a:round/>
+                          <a:headEnd type="none" w="med" len="med"/>
+                          <a:tailEnd type="none" w="med" len="med"/>
+                        </a:lnR>
+                        <a:lnT w="12700" cap="flat" cmpd="sng" algn="ctr">
+                          <a:noFill/>
+                          <a:prstDash val="solid"/>
+                          <a:round/>
+                          <a:headEnd type="none" w="med" len="med"/>
+                          <a:tailEnd type="none" w="med" len="med"/>
+                        </a:lnT>
+                        <a:lnB w="12700" cap="flat" cmpd="sng" algn="ctr">
+                          <a:noFill/>
+                          <a:prstDash val="solid"/>
+                          <a:round/>
+                          <a:headEnd type="none" w="med" len="med"/>
+                          <a:tailEnd type="none" w="med" len="med"/>
+                        </a:lnB>
+                        <a:lnTlToBr w="12700" cmpd="sng">
+                          <a:noFill/>
+                          <a:prstDash val="solid"/>
+                        </a:lnTlToBr>
+                        <a:lnBlToTr w="12700" cmpd="sng">
+                          <a:noFill/>
+                          <a:prstDash val="solid"/>
+                        </a:lnBlToTr>
+                        <a:blipFill>
+                          <a:blip r:embed="rId4"/>
+                          <a:stretch>
+                            <a:fillRect l="-100000" t="-204819" b="-419277"/>
+                          </a:stretch>
+                        </a:blipFill>
+                      </a:tcPr>
+                    </a:tc>
+                    <a:extLst>
+                      <a:ext uri="{0D108BD9-81ED-4DB2-BD59-A6C34878D82A}">
+                        <a16:rowId xmlns:a16="http://schemas.microsoft.com/office/drawing/2014/main" val="4005437046"/>
+                      </a:ext>
+                    </a:extLst>
+                  </a:tr>
+                  <a:tr h="503056">
+                    <a:tc>
+                      <a:txBody>
+                        <a:bodyPr/>
+                        <a:lstStyle/>
+                        <a:p>
+                          <a:pPr algn="r"/>
+                          <a:r>
+                            <a:rPr lang="en-US" sz="2400" dirty="0">
+                              <a:solidFill>
+                                <a:schemeClr val="tx1"/>
+                              </a:solidFill>
+                            </a:rPr>
+                            <a:t>Striding:</a:t>
+                          </a:r>
+                        </a:p>
+                      </a:txBody>
+                      <a:tcPr marL="124041" marR="124041" marT="62021" marB="62021">
+                        <a:lnL w="12700" cap="flat" cmpd="sng" algn="ctr">
+                          <a:noFill/>
+                          <a:prstDash val="solid"/>
+                          <a:round/>
+                          <a:headEnd type="none" w="med" len="med"/>
+                          <a:tailEnd type="none" w="med" len="med"/>
+                        </a:lnL>
+                        <a:lnR w="12700" cap="flat" cmpd="sng" algn="ctr">
+                          <a:noFill/>
+                          <a:prstDash val="solid"/>
+                          <a:round/>
+                          <a:headEnd type="none" w="med" len="med"/>
+                          <a:tailEnd type="none" w="med" len="med"/>
+                        </a:lnR>
+                        <a:lnT w="12700" cap="flat" cmpd="sng" algn="ctr">
+                          <a:noFill/>
+                          <a:prstDash val="solid"/>
+                          <a:round/>
+                          <a:headEnd type="none" w="med" len="med"/>
+                          <a:tailEnd type="none" w="med" len="med"/>
+                        </a:lnT>
+                        <a:lnB w="12700" cap="flat" cmpd="sng" algn="ctr">
+                          <a:noFill/>
+                          <a:prstDash val="solid"/>
+                          <a:round/>
+                          <a:headEnd type="none" w="med" len="med"/>
+                          <a:tailEnd type="none" w="med" len="med"/>
+                        </a:lnB>
+                        <a:lnTlToBr w="12700" cmpd="sng">
+                          <a:noFill/>
+                          <a:prstDash val="solid"/>
+                        </a:lnTlToBr>
+                        <a:lnBlToTr w="12700" cmpd="sng">
+                          <a:noFill/>
+                          <a:prstDash val="solid"/>
+                        </a:lnBlToTr>
+                        <a:noFill/>
+                      </a:tcPr>
+                    </a:tc>
+                    <a:tc>
+                      <a:txBody>
+                        <a:bodyPr/>
+                        <a:lstStyle/>
+                        <a:p>
+                          <a:endParaRPr lang="en-US"/>
+                        </a:p>
+                      </a:txBody>
+                      <a:tcPr marL="124041" marR="124041" marT="62021" marB="62021">
+                        <a:lnL w="12700" cap="flat" cmpd="sng" algn="ctr">
+                          <a:noFill/>
+                          <a:prstDash val="solid"/>
+                          <a:round/>
+                          <a:headEnd type="none" w="med" len="med"/>
+                          <a:tailEnd type="none" w="med" len="med"/>
+                        </a:lnL>
+                        <a:lnR w="12700" cap="flat" cmpd="sng" algn="ctr">
+                          <a:noFill/>
+                          <a:prstDash val="solid"/>
+                          <a:round/>
+                          <a:headEnd type="none" w="med" len="med"/>
+                          <a:tailEnd type="none" w="med" len="med"/>
+                        </a:lnR>
+                        <a:lnT w="12700" cap="flat" cmpd="sng" algn="ctr">
+                          <a:noFill/>
+                          <a:prstDash val="solid"/>
+                          <a:round/>
+                          <a:headEnd type="none" w="med" len="med"/>
+                          <a:tailEnd type="none" w="med" len="med"/>
+                        </a:lnT>
+                        <a:lnB w="12700" cap="flat" cmpd="sng" algn="ctr">
+                          <a:noFill/>
+                          <a:prstDash val="solid"/>
+                          <a:round/>
+                          <a:headEnd type="none" w="med" len="med"/>
+                          <a:tailEnd type="none" w="med" len="med"/>
+                        </a:lnB>
+                        <a:lnTlToBr w="12700" cmpd="sng">
+                          <a:noFill/>
+                          <a:prstDash val="solid"/>
+                        </a:lnTlToBr>
+                        <a:lnBlToTr w="12700" cmpd="sng">
+                          <a:noFill/>
+                          <a:prstDash val="solid"/>
+                        </a:lnBlToTr>
+                        <a:blipFill>
+                          <a:blip r:embed="rId4"/>
+                          <a:stretch>
+                            <a:fillRect l="-100000" t="-308537" b="-324390"/>
+                          </a:stretch>
+                        </a:blipFill>
+                      </a:tcPr>
+                    </a:tc>
+                    <a:extLst>
+                      <a:ext uri="{0D108BD9-81ED-4DB2-BD59-A6C34878D82A}">
+                        <a16:rowId xmlns:a16="http://schemas.microsoft.com/office/drawing/2014/main" val="898271232"/>
+                      </a:ext>
+                    </a:extLst>
+                  </a:tr>
+                  <a:tr h="503056">
+                    <a:tc>
+                      <a:txBody>
+                        <a:bodyPr/>
+                        <a:lstStyle/>
+                        <a:p>
+                          <a:pPr algn="r"/>
+                          <a:r>
+                            <a:rPr lang="en-US" sz="2400" strike="sngStrike" dirty="0">
+                              <a:solidFill>
+                                <a:schemeClr val="tx1"/>
+                              </a:solidFill>
+                            </a:rPr>
+                            <a:t>Dilation:</a:t>
+                          </a:r>
+                        </a:p>
+                      </a:txBody>
+                      <a:tcPr marL="124041" marR="124041" marT="62021" marB="62021">
+                        <a:lnL w="12700" cap="flat" cmpd="sng" algn="ctr">
+                          <a:noFill/>
+                          <a:prstDash val="solid"/>
+                          <a:round/>
+                          <a:headEnd type="none" w="med" len="med"/>
+                          <a:tailEnd type="none" w="med" len="med"/>
+                        </a:lnL>
+                        <a:lnR w="12700" cap="flat" cmpd="sng" algn="ctr">
+                          <a:noFill/>
+                          <a:prstDash val="solid"/>
+                          <a:round/>
+                          <a:headEnd type="none" w="med" len="med"/>
+                          <a:tailEnd type="none" w="med" len="med"/>
+                        </a:lnR>
+                        <a:lnT w="12700" cap="flat" cmpd="sng" algn="ctr">
+                          <a:noFill/>
+                          <a:prstDash val="solid"/>
+                          <a:round/>
+                          <a:headEnd type="none" w="med" len="med"/>
+                          <a:tailEnd type="none" w="med" len="med"/>
+                        </a:lnT>
+                        <a:lnB w="12700" cap="flat" cmpd="sng" algn="ctr">
+                          <a:noFill/>
+                          <a:prstDash val="solid"/>
+                          <a:round/>
+                          <a:headEnd type="none" w="med" len="med"/>
+                          <a:tailEnd type="none" w="med" len="med"/>
+                        </a:lnB>
+                        <a:lnTlToBr w="12700" cmpd="sng">
+                          <a:noFill/>
+                          <a:prstDash val="solid"/>
+                        </a:lnTlToBr>
+                        <a:lnBlToTr w="12700" cmpd="sng">
+                          <a:noFill/>
+                          <a:prstDash val="solid"/>
+                        </a:lnBlToTr>
+                        <a:noFill/>
+                      </a:tcPr>
+                    </a:tc>
+                    <a:tc>
+                      <a:txBody>
+                        <a:bodyPr/>
+                        <a:lstStyle/>
+                        <a:p>
+                          <a:endParaRPr lang="en-US"/>
+                        </a:p>
+                      </a:txBody>
+                      <a:tcPr marL="124041" marR="124041" marT="62021" marB="62021">
+                        <a:lnL w="12700" cap="flat" cmpd="sng" algn="ctr">
+                          <a:noFill/>
+                          <a:prstDash val="solid"/>
+                          <a:round/>
+                          <a:headEnd type="none" w="med" len="med"/>
+                          <a:tailEnd type="none" w="med" len="med"/>
+                        </a:lnL>
+                        <a:lnR w="12700" cap="flat" cmpd="sng" algn="ctr">
+                          <a:noFill/>
+                          <a:prstDash val="solid"/>
+                          <a:round/>
+                          <a:headEnd type="none" w="med" len="med"/>
+                          <a:tailEnd type="none" w="med" len="med"/>
+                        </a:lnR>
+                        <a:lnT w="12700" cap="flat" cmpd="sng" algn="ctr">
+                          <a:noFill/>
+                          <a:prstDash val="solid"/>
+                          <a:round/>
+                          <a:headEnd type="none" w="med" len="med"/>
+                          <a:tailEnd type="none" w="med" len="med"/>
+                        </a:lnT>
+                        <a:lnB w="12700" cap="flat" cmpd="sng" algn="ctr">
+                          <a:noFill/>
+                          <a:prstDash val="solid"/>
+                          <a:round/>
+                          <a:headEnd type="none" w="med" len="med"/>
+                          <a:tailEnd type="none" w="med" len="med"/>
+                        </a:lnB>
+                        <a:lnTlToBr w="12700" cmpd="sng">
+                          <a:noFill/>
+                          <a:prstDash val="solid"/>
+                        </a:lnTlToBr>
+                        <a:lnBlToTr w="12700" cmpd="sng">
+                          <a:noFill/>
+                          <a:prstDash val="solid"/>
+                        </a:lnBlToTr>
+                        <a:blipFill>
+                          <a:blip r:embed="rId4"/>
+                          <a:stretch>
+                            <a:fillRect l="-100000" t="-403614" b="-220482"/>
+                          </a:stretch>
+                        </a:blipFill>
+                      </a:tcPr>
+                    </a:tc>
+                    <a:extLst>
+                      <a:ext uri="{0D108BD9-81ED-4DB2-BD59-A6C34878D82A}">
+                        <a16:rowId xmlns:a16="http://schemas.microsoft.com/office/drawing/2014/main" val="221637713"/>
+                      </a:ext>
+                    </a:extLst>
+                  </a:tr>
+                  <a:tr h="503056">
+                    <a:tc>
+                      <a:txBody>
+                        <a:bodyPr/>
+                        <a:lstStyle/>
+                        <a:p>
+                          <a:pPr algn="r"/>
+                          <a:r>
+                            <a:rPr lang="en-US" sz="2400" dirty="0">
+                              <a:solidFill>
+                                <a:schemeClr val="tx1"/>
+                              </a:solidFill>
+                            </a:rPr>
+                            <a:t>Output image:</a:t>
+                          </a:r>
+                        </a:p>
+                      </a:txBody>
+                      <a:tcPr marL="124041" marR="124041" marT="62021" marB="62021">
+                        <a:lnL w="12700" cap="flat" cmpd="sng" algn="ctr">
+                          <a:noFill/>
+                          <a:prstDash val="solid"/>
+                          <a:round/>
+                          <a:headEnd type="none" w="med" len="med"/>
+                          <a:tailEnd type="none" w="med" len="med"/>
+                        </a:lnL>
+                        <a:lnR w="12700" cap="flat" cmpd="sng" algn="ctr">
+                          <a:noFill/>
+                          <a:prstDash val="solid"/>
+                          <a:round/>
+                          <a:headEnd type="none" w="med" len="med"/>
+                          <a:tailEnd type="none" w="med" len="med"/>
+                        </a:lnR>
+                        <a:lnT w="12700" cap="flat" cmpd="sng" algn="ctr">
+                          <a:noFill/>
+                          <a:prstDash val="solid"/>
+                          <a:round/>
+                          <a:headEnd type="none" w="med" len="med"/>
+                          <a:tailEnd type="none" w="med" len="med"/>
+                        </a:lnT>
+                        <a:lnB w="12700" cap="flat" cmpd="sng" algn="ctr">
+                          <a:noFill/>
+                          <a:prstDash val="solid"/>
+                          <a:round/>
+                          <a:headEnd type="none" w="med" len="med"/>
+                          <a:tailEnd type="none" w="med" len="med"/>
+                        </a:lnB>
+                        <a:lnTlToBr w="12700" cmpd="sng">
+                          <a:noFill/>
+                          <a:prstDash val="solid"/>
+                        </a:lnTlToBr>
+                        <a:lnBlToTr w="12700" cmpd="sng">
+                          <a:noFill/>
+                          <a:prstDash val="solid"/>
+                        </a:lnBlToTr>
+                        <a:noFill/>
+                      </a:tcPr>
+                    </a:tc>
+                    <a:tc>
+                      <a:txBody>
+                        <a:bodyPr/>
+                        <a:lstStyle/>
+                        <a:p>
+                          <a:endParaRPr lang="en-US"/>
+                        </a:p>
+                      </a:txBody>
+                      <a:tcPr marL="124041" marR="124041" marT="62021" marB="62021">
+                        <a:lnL w="12700" cap="flat" cmpd="sng" algn="ctr">
+                          <a:noFill/>
+                          <a:prstDash val="solid"/>
+                          <a:round/>
+                          <a:headEnd type="none" w="med" len="med"/>
+                          <a:tailEnd type="none" w="med" len="med"/>
+                        </a:lnL>
+                        <a:lnR w="12700" cap="flat" cmpd="sng" algn="ctr">
+                          <a:noFill/>
+                          <a:prstDash val="solid"/>
+                          <a:round/>
+                          <a:headEnd type="none" w="med" len="med"/>
+                          <a:tailEnd type="none" w="med" len="med"/>
+                        </a:lnR>
+                        <a:lnT w="12700" cap="flat" cmpd="sng" algn="ctr">
+                          <a:noFill/>
+                          <a:prstDash val="solid"/>
+                          <a:round/>
+                          <a:headEnd type="none" w="med" len="med"/>
+                          <a:tailEnd type="none" w="med" len="med"/>
+                        </a:lnT>
+                        <a:lnB w="12700" cap="flat" cmpd="sng" algn="ctr">
+                          <a:noFill/>
+                          <a:prstDash val="solid"/>
+                          <a:round/>
+                          <a:headEnd type="none" w="med" len="med"/>
+                          <a:tailEnd type="none" w="med" len="med"/>
+                        </a:lnB>
+                        <a:lnTlToBr w="12700" cmpd="sng">
+                          <a:noFill/>
+                          <a:prstDash val="solid"/>
+                        </a:lnTlToBr>
+                        <a:lnBlToTr w="12700" cmpd="sng">
+                          <a:noFill/>
+                          <a:prstDash val="solid"/>
+                        </a:lnBlToTr>
+                        <a:blipFill>
+                          <a:blip r:embed="rId4"/>
+                          <a:stretch>
+                            <a:fillRect l="-100000" t="-509756" b="-123171"/>
+                          </a:stretch>
+                        </a:blipFill>
+                      </a:tcPr>
+                    </a:tc>
+                    <a:extLst>
+                      <a:ext uri="{0D108BD9-81ED-4DB2-BD59-A6C34878D82A}">
+                        <a16:rowId xmlns:a16="http://schemas.microsoft.com/office/drawing/2014/main" val="4135396076"/>
+                      </a:ext>
+                    </a:extLst>
+                  </a:tr>
+                  <a:tr h="503056">
+                    <a:tc>
+                      <a:txBody>
+                        <a:bodyPr/>
+                        <a:lstStyle/>
+                        <a:p>
+                          <a:pPr algn="r"/>
+                          <a:r>
+                            <a:rPr lang="en-US" sz="2400" strike="sngStrike" dirty="0">
+                              <a:solidFill>
+                                <a:schemeClr val="tx1"/>
+                              </a:solidFill>
+                            </a:rPr>
+                            <a:t>Output padding:</a:t>
+                          </a:r>
+                        </a:p>
+                      </a:txBody>
+                      <a:tcPr marL="124041" marR="124041" marT="62021" marB="62021">
+                        <a:lnL w="12700" cap="flat" cmpd="sng" algn="ctr">
+                          <a:noFill/>
+                          <a:prstDash val="solid"/>
+                          <a:round/>
+                          <a:headEnd type="none" w="med" len="med"/>
+                          <a:tailEnd type="none" w="med" len="med"/>
+                        </a:lnL>
+                        <a:lnR w="12700" cap="flat" cmpd="sng" algn="ctr">
+                          <a:noFill/>
+                          <a:prstDash val="solid"/>
+                          <a:round/>
+                          <a:headEnd type="none" w="med" len="med"/>
+                          <a:tailEnd type="none" w="med" len="med"/>
+                        </a:lnR>
+                        <a:lnT w="12700" cap="flat" cmpd="sng" algn="ctr">
+                          <a:noFill/>
+                          <a:prstDash val="solid"/>
+                          <a:round/>
+                          <a:headEnd type="none" w="med" len="med"/>
+                          <a:tailEnd type="none" w="med" len="med"/>
+                        </a:lnT>
+                        <a:lnB w="12700" cap="flat" cmpd="sng" algn="ctr">
+                          <a:noFill/>
+                          <a:prstDash val="solid"/>
+                          <a:round/>
+                          <a:headEnd type="none" w="med" len="med"/>
+                          <a:tailEnd type="none" w="med" len="med"/>
+                        </a:lnB>
+                        <a:lnTlToBr w="12700" cmpd="sng">
+                          <a:noFill/>
+                          <a:prstDash val="solid"/>
+                        </a:lnTlToBr>
+                        <a:lnBlToTr w="12700" cmpd="sng">
+                          <a:noFill/>
+                          <a:prstDash val="solid"/>
+                        </a:lnBlToTr>
+                        <a:noFill/>
+                      </a:tcPr>
+                    </a:tc>
+                    <a:tc>
+                      <a:txBody>
+                        <a:bodyPr/>
+                        <a:lstStyle/>
+                        <a:p>
+                          <a:endParaRPr lang="en-US"/>
+                        </a:p>
+                      </a:txBody>
+                      <a:tcPr marL="124041" marR="124041" marT="62021" marB="62021">
+                        <a:lnL w="12700" cap="flat" cmpd="sng" algn="ctr">
+                          <a:noFill/>
+                          <a:prstDash val="solid"/>
+                          <a:round/>
+                          <a:headEnd type="none" w="med" len="med"/>
+                          <a:tailEnd type="none" w="med" len="med"/>
+                        </a:lnL>
+                        <a:lnR w="12700" cap="flat" cmpd="sng" algn="ctr">
+                          <a:noFill/>
+                          <a:prstDash val="solid"/>
+                          <a:round/>
+                          <a:headEnd type="none" w="med" len="med"/>
+                          <a:tailEnd type="none" w="med" len="med"/>
+                        </a:lnR>
+                        <a:lnT w="12700" cap="flat" cmpd="sng" algn="ctr">
+                          <a:noFill/>
+                          <a:prstDash val="solid"/>
+                          <a:round/>
+                          <a:headEnd type="none" w="med" len="med"/>
+                          <a:tailEnd type="none" w="med" len="med"/>
+                        </a:lnT>
+                        <a:lnB w="12700" cap="flat" cmpd="sng" algn="ctr">
+                          <a:noFill/>
+                          <a:prstDash val="solid"/>
+                          <a:round/>
+                          <a:headEnd type="none" w="med" len="med"/>
+                          <a:tailEnd type="none" w="med" len="med"/>
+                        </a:lnB>
+                        <a:lnTlToBr w="12700" cmpd="sng">
+                          <a:noFill/>
+                          <a:prstDash val="solid"/>
+                        </a:lnTlToBr>
+                        <a:lnBlToTr w="12700" cmpd="sng">
+                          <a:noFill/>
+                          <a:prstDash val="solid"/>
+                        </a:lnBlToTr>
+                        <a:blipFill>
+                          <a:blip r:embed="rId4"/>
+                          <a:stretch>
+                            <a:fillRect l="-100000" t="-602410" b="-21687"/>
+                          </a:stretch>
+                        </a:blipFill>
+                      </a:tcPr>
+                    </a:tc>
+                    <a:extLst>
+                      <a:ext uri="{0D108BD9-81ED-4DB2-BD59-A6C34878D82A}">
+                        <a16:rowId xmlns:a16="http://schemas.microsoft.com/office/drawing/2014/main" val="2106922570"/>
+                      </a:ext>
+                    </a:extLst>
+                  </a:tr>
+                </a:tbl>
+              </a:graphicData>
+            </a:graphic>
+          </p:graphicFrame>
+        </mc:Fallback>
+      </mc:AlternateContent>
+    </p:spTree>
+    <p:extLst>
+      <p:ext uri="{BB962C8B-B14F-4D97-AF65-F5344CB8AC3E}">
+        <p14:creationId xmlns:p14="http://schemas.microsoft.com/office/powerpoint/2010/main" val="1100695722"/>
+      </p:ext>
+    </p:extLst>
+  </p:cSld>
+  <p:clrMapOvr>
+    <a:masterClrMapping/>
+  </p:clrMapOvr>
 </p:sld>
 </file>
 

</xml_diff>